<commit_message>
Changed SVG text to shapes to ensure font consistency
</commit_message>
<xml_diff>
--- a/frontend/logo.pptx
+++ b/frontend/logo.pptx
@@ -118,6 +118,11 @@
       </a:defRPr>
     </a:lvl9pPr>
   </p:defaultTextStyle>
+  <p:extLst>
+    <p:ext uri="{EFAFB233-063F-42B5-8137-9DF3F51BA10A}">
+      <p15:sldGuideLst xmlns:p15="http://schemas.microsoft.com/office/powerpoint/2012/main"/>
+    </p:ext>
+  </p:extLst>
 </p:presentation>
 </file>
 
@@ -796,10 +801,10 @@
       </p:grpSpPr>
       <p:sp>
         <p:nvSpPr>
-          <p:cNvPr id="3" name="Arrow: Up 2">
+          <p:cNvPr id="2" name="Rectangle 1">
             <a:extLst>
               <a:ext uri="{FF2B5EF4-FFF2-40B4-BE49-F238E27FC236}">
-                <a16:creationId xmlns:a16="http://schemas.microsoft.com/office/drawing/2014/main" id="{761123E9-063E-72BD-B3E0-63C5460103E5}"/>
+                <a16:creationId xmlns:a16="http://schemas.microsoft.com/office/drawing/2014/main" id="{8806F9DB-CD37-8A2C-CE1A-365C3BBEE49A}"/>
               </a:ext>
             </a:extLst>
           </p:cNvPr>
@@ -808,63 +813,8 @@
         </p:nvSpPr>
         <p:spPr>
           <a:xfrm>
-            <a:off x="1943070" y="4122776"/>
-            <a:ext cx="989901" cy="1275126"/>
-          </a:xfrm>
-          <a:prstGeom prst="upArrow">
-            <a:avLst>
-              <a:gd name="adj1" fmla="val 52581"/>
-              <a:gd name="adj2" fmla="val 60140"/>
-            </a:avLst>
-          </a:prstGeom>
-          <a:solidFill>
-            <a:schemeClr val="tx1"/>
-          </a:solidFill>
-          <a:ln>
-            <a:noFill/>
-          </a:ln>
-        </p:spPr>
-        <p:style>
-          <a:lnRef idx="2">
-            <a:schemeClr val="accent1">
-              <a:shade val="50000"/>
-            </a:schemeClr>
-          </a:lnRef>
-          <a:fillRef idx="1">
-            <a:schemeClr val="accent1"/>
-          </a:fillRef>
-          <a:effectRef idx="0">
-            <a:schemeClr val="accent1"/>
-          </a:effectRef>
-          <a:fontRef idx="minor">
-            <a:schemeClr val="lt1"/>
-          </a:fontRef>
-        </p:style>
-        <p:txBody>
-          <a:bodyPr rtlCol="0" anchor="ctr"/>
-          <a:lstStyle/>
-          <a:p>
-            <a:pPr algn="ctr"/>
-            <a:endParaRPr lang="en-US"/>
-          </a:p>
-        </p:txBody>
-      </p:sp>
-      <p:sp>
-        <p:nvSpPr>
-          <p:cNvPr id="7" name="Rectangle 6">
-            <a:extLst>
-              <a:ext uri="{FF2B5EF4-FFF2-40B4-BE49-F238E27FC236}">
-                <a16:creationId xmlns:a16="http://schemas.microsoft.com/office/drawing/2014/main" id="{4CF89BB6-F56D-F426-0B42-052112F74C95}"/>
-              </a:ext>
-            </a:extLst>
-          </p:cNvPr>
-          <p:cNvSpPr/>
-          <p:nvPr/>
-        </p:nvSpPr>
-        <p:spPr>
-          <a:xfrm>
-            <a:off x="1943070" y="5677120"/>
-            <a:ext cx="1070063" cy="268448"/>
+            <a:off x="9277350" y="2223083"/>
+            <a:ext cx="663804" cy="897622"/>
           </a:xfrm>
           <a:prstGeom prst="rect">
             <a:avLst/>
@@ -898,46 +848,6 @@
           <a:p>
             <a:pPr algn="ctr"/>
             <a:endParaRPr lang="en-US"/>
-          </a:p>
-        </p:txBody>
-      </p:sp>
-      <p:sp>
-        <p:nvSpPr>
-          <p:cNvPr id="8" name="TextBox 7">
-            <a:extLst>
-              <a:ext uri="{FF2B5EF4-FFF2-40B4-BE49-F238E27FC236}">
-                <a16:creationId xmlns:a16="http://schemas.microsoft.com/office/drawing/2014/main" id="{D8ADC93C-B880-4FA0-7F6D-7AE72605100D}"/>
-              </a:ext>
-            </a:extLst>
-          </p:cNvPr>
-          <p:cNvSpPr txBox="1"/>
-          <p:nvPr/>
-        </p:nvSpPr>
-        <p:spPr>
-          <a:xfrm>
-            <a:off x="2773581" y="4147943"/>
-            <a:ext cx="1479892" cy="2215991"/>
-          </a:xfrm>
-          <a:prstGeom prst="rect">
-            <a:avLst/>
-          </a:prstGeom>
-          <a:noFill/>
-        </p:spPr>
-        <p:txBody>
-          <a:bodyPr wrap="none" rtlCol="0">
-            <a:spAutoFit/>
-          </a:bodyPr>
-          <a:lstStyle/>
-          <a:p>
-            <a:r>
-              <a:rPr lang="en-ZA" sz="13800" dirty="0">
-                <a:latin typeface="Nura Black" pitchFamily="2" charset="0"/>
-              </a:rPr>
-              <a:t>P</a:t>
-            </a:r>
-            <a:endParaRPr lang="en-US" sz="13800" dirty="0">
-              <a:latin typeface="Nura Black" pitchFamily="2" charset="0"/>
-            </a:endParaRPr>
           </a:p>
         </p:txBody>
       </p:sp>
@@ -1130,85 +1040,6 @@
           </p:txBody>
         </p:sp>
       </p:grpSp>
-      <p:sp>
-        <p:nvSpPr>
-          <p:cNvPr id="15" name="TextBox 14">
-            <a:extLst>
-              <a:ext uri="{FF2B5EF4-FFF2-40B4-BE49-F238E27FC236}">
-                <a16:creationId xmlns:a16="http://schemas.microsoft.com/office/drawing/2014/main" id="{350EB463-B23E-2A18-89BF-B629A9422CF9}"/>
-              </a:ext>
-            </a:extLst>
-          </p:cNvPr>
-          <p:cNvSpPr txBox="1"/>
-          <p:nvPr/>
-        </p:nvSpPr>
-        <p:spPr>
-          <a:xfrm>
-            <a:off x="1699312" y="3687055"/>
-            <a:ext cx="2627642" cy="1200329"/>
-          </a:xfrm>
-          <a:prstGeom prst="rect">
-            <a:avLst/>
-          </a:prstGeom>
-        </p:spPr>
-        <p:txBody>
-          <a:bodyPr wrap="none" rtlCol="0">
-            <a:spAutoFit/>
-          </a:bodyPr>
-          <a:lstStyle/>
-          <a:p>
-            <a:r>
-              <a:rPr lang="en-ZA" sz="7200" dirty="0">
-                <a:latin typeface="Nura Black" pitchFamily="2" charset="0"/>
-              </a:rPr>
-              <a:t>WAY</a:t>
-            </a:r>
-            <a:endParaRPr lang="en-US" sz="7200" dirty="0">
-              <a:latin typeface="Nura Black" pitchFamily="2" charset="0"/>
-            </a:endParaRPr>
-          </a:p>
-        </p:txBody>
-      </p:sp>
-      <p:sp>
-        <p:nvSpPr>
-          <p:cNvPr id="18" name="TextBox 17">
-            <a:extLst>
-              <a:ext uri="{FF2B5EF4-FFF2-40B4-BE49-F238E27FC236}">
-                <a16:creationId xmlns:a16="http://schemas.microsoft.com/office/drawing/2014/main" id="{4672E2CE-A24F-04E9-4AEE-EA06CCEE0456}"/>
-              </a:ext>
-            </a:extLst>
-          </p:cNvPr>
-          <p:cNvSpPr txBox="1"/>
-          <p:nvPr/>
-        </p:nvSpPr>
-        <p:spPr>
-          <a:xfrm rot="16200000">
-            <a:off x="357674" y="4460425"/>
-            <a:ext cx="2193229" cy="1015663"/>
-          </a:xfrm>
-          <a:prstGeom prst="rect">
-            <a:avLst/>
-          </a:prstGeom>
-          <a:noFill/>
-        </p:spPr>
-        <p:txBody>
-          <a:bodyPr wrap="none" rtlCol="0">
-            <a:spAutoFit/>
-          </a:bodyPr>
-          <a:lstStyle/>
-          <a:p>
-            <a:r>
-              <a:rPr lang="en-ZA" sz="6000" dirty="0">
-                <a:latin typeface="Nura Black" pitchFamily="2" charset="0"/>
-              </a:rPr>
-              <a:t>THIS</a:t>
-            </a:r>
-            <a:endParaRPr lang="en-US" sz="6000" dirty="0">
-              <a:latin typeface="Nura Black" pitchFamily="2" charset="0"/>
-            </a:endParaRPr>
-          </a:p>
-        </p:txBody>
-      </p:sp>
       <p:grpSp>
         <p:nvGrpSpPr>
           <p:cNvPr id="37" name="Group 36">
@@ -1223,7 +1054,7 @@
         </p:nvGrpSpPr>
         <p:grpSpPr>
           <a:xfrm>
-            <a:off x="4723238" y="233292"/>
+            <a:off x="521737" y="314631"/>
             <a:ext cx="3490870" cy="2676879"/>
             <a:chOff x="4723238" y="233292"/>
             <a:chExt cx="3490870" cy="2676879"/>
@@ -1638,7 +1469,7 @@
         </p:nvGrpSpPr>
         <p:grpSpPr>
           <a:xfrm>
-            <a:off x="4723238" y="3203942"/>
+            <a:off x="5918231" y="2741441"/>
             <a:ext cx="2727029" cy="3112794"/>
             <a:chOff x="2905635" y="1507973"/>
             <a:chExt cx="2727029" cy="3112794"/>
@@ -1834,6 +1665,1913 @@
           </p:txBody>
         </p:sp>
       </p:grpSp>
+      <p:sp>
+        <p:nvSpPr>
+          <p:cNvPr id="23" name="Arrow: Up 22">
+            <a:extLst>
+              <a:ext uri="{FF2B5EF4-FFF2-40B4-BE49-F238E27FC236}">
+                <a16:creationId xmlns:a16="http://schemas.microsoft.com/office/drawing/2014/main" id="{C373E527-051E-B283-9A2B-CC82AE45791C}"/>
+              </a:ext>
+            </a:extLst>
+          </p:cNvPr>
+          <p:cNvSpPr/>
+          <p:nvPr/>
+        </p:nvSpPr>
+        <p:spPr>
+          <a:xfrm>
+            <a:off x="8783202" y="1432708"/>
+            <a:ext cx="989901" cy="1275126"/>
+          </a:xfrm>
+          <a:prstGeom prst="upArrow">
+            <a:avLst>
+              <a:gd name="adj1" fmla="val 52581"/>
+              <a:gd name="adj2" fmla="val 60140"/>
+            </a:avLst>
+          </a:prstGeom>
+          <a:solidFill>
+            <a:schemeClr val="tx1"/>
+          </a:solidFill>
+          <a:ln>
+            <a:noFill/>
+          </a:ln>
+        </p:spPr>
+        <p:style>
+          <a:lnRef idx="2">
+            <a:schemeClr val="accent1">
+              <a:shade val="50000"/>
+            </a:schemeClr>
+          </a:lnRef>
+          <a:fillRef idx="1">
+            <a:schemeClr val="accent1"/>
+          </a:fillRef>
+          <a:effectRef idx="0">
+            <a:schemeClr val="accent1"/>
+          </a:effectRef>
+          <a:fontRef idx="minor">
+            <a:schemeClr val="lt1"/>
+          </a:fontRef>
+        </p:style>
+        <p:txBody>
+          <a:bodyPr rtlCol="0" anchor="ctr"/>
+          <a:lstStyle/>
+          <a:p>
+            <a:pPr algn="ctr"/>
+            <a:endParaRPr lang="en-US"/>
+          </a:p>
+        </p:txBody>
+      </p:sp>
+      <p:sp>
+        <p:nvSpPr>
+          <p:cNvPr id="26" name="Freeform: Shape 25">
+            <a:extLst>
+              <a:ext uri="{FF2B5EF4-FFF2-40B4-BE49-F238E27FC236}">
+                <a16:creationId xmlns:a16="http://schemas.microsoft.com/office/drawing/2014/main" id="{AE74674F-7D62-BC7E-543F-AD0B03F59F14}"/>
+              </a:ext>
+            </a:extLst>
+          </p:cNvPr>
+          <p:cNvSpPr/>
+          <p:nvPr/>
+        </p:nvSpPr>
+        <p:spPr>
+          <a:xfrm>
+            <a:off x="8783201" y="2029375"/>
+            <a:ext cx="2134750" cy="1226918"/>
+          </a:xfrm>
+          <a:custGeom>
+            <a:avLst/>
+            <a:gdLst>
+              <a:gd name="connsiteX0" fmla="*/ 1405669 w 2134750"/>
+              <a:gd name="connsiteY0" fmla="*/ 290932 h 1229300"/>
+              <a:gd name="connsiteX1" fmla="*/ 1405669 w 2134750"/>
+              <a:gd name="connsiteY1" fmla="*/ 687019 h 1229300"/>
+              <a:gd name="connsiteX2" fmla="*/ 1566908 w 2134750"/>
+              <a:gd name="connsiteY2" fmla="*/ 687019 h 1229300"/>
+              <a:gd name="connsiteX3" fmla="*/ 1679950 w 2134750"/>
+              <a:gd name="connsiteY3" fmla="*/ 634441 h 1229300"/>
+              <a:gd name="connsiteX4" fmla="*/ 1721137 w 2134750"/>
+              <a:gd name="connsiteY4" fmla="*/ 490728 h 1229300"/>
+              <a:gd name="connsiteX5" fmla="*/ 1679950 w 2134750"/>
+              <a:gd name="connsiteY5" fmla="*/ 343509 h 1229300"/>
+              <a:gd name="connsiteX6" fmla="*/ 1566908 w 2134750"/>
+              <a:gd name="connsiteY6" fmla="*/ 290932 h 1229300"/>
+              <a:gd name="connsiteX7" fmla="*/ 1405669 w 2134750"/>
+              <a:gd name="connsiteY7" fmla="*/ 290932 h 1229300"/>
+              <a:gd name="connsiteX8" fmla="*/ 992055 w 2134750"/>
+              <a:gd name="connsiteY8" fmla="*/ 0 h 1229300"/>
+              <a:gd name="connsiteX9" fmla="*/ 1714126 w 2134750"/>
+              <a:gd name="connsiteY9" fmla="*/ 0 h 1229300"/>
+              <a:gd name="connsiteX10" fmla="*/ 2023460 w 2134750"/>
+              <a:gd name="connsiteY10" fmla="*/ 129692 h 1229300"/>
+              <a:gd name="connsiteX11" fmla="*/ 2134750 w 2134750"/>
+              <a:gd name="connsiteY11" fmla="*/ 490728 h 1229300"/>
+              <a:gd name="connsiteX12" fmla="*/ 2023460 w 2134750"/>
+              <a:gd name="connsiteY12" fmla="*/ 849134 h 1229300"/>
+              <a:gd name="connsiteX13" fmla="*/ 1714126 w 2134750"/>
+              <a:gd name="connsiteY13" fmla="*/ 977951 h 1229300"/>
+              <a:gd name="connsiteX14" fmla="*/ 1405669 w 2134750"/>
+              <a:gd name="connsiteY14" fmla="*/ 977951 h 1229300"/>
+              <a:gd name="connsiteX15" fmla="*/ 1405669 w 2134750"/>
+              <a:gd name="connsiteY15" fmla="*/ 1226820 h 1229300"/>
+              <a:gd name="connsiteX16" fmla="*/ 1070063 w 2134750"/>
+              <a:gd name="connsiteY16" fmla="*/ 1226820 h 1229300"/>
+              <a:gd name="connsiteX17" fmla="*/ 0 w 2134750"/>
+              <a:gd name="connsiteY17" fmla="*/ 1229300 h 1229300"/>
+              <a:gd name="connsiteX18" fmla="*/ 0 w 2134750"/>
+              <a:gd name="connsiteY18" fmla="*/ 960852 h 1229300"/>
+              <a:gd name="connsiteX19" fmla="*/ 992055 w 2134750"/>
+              <a:gd name="connsiteY19" fmla="*/ 960852 h 1229300"/>
+              <a:gd name="connsiteX20" fmla="*/ 992055 w 2134750"/>
+              <a:gd name="connsiteY20" fmla="*/ 0 h 1229300"/>
+              <a:gd name="connsiteX0" fmla="*/ 1405669 w 2134750"/>
+              <a:gd name="connsiteY0" fmla="*/ 290932 h 1229300"/>
+              <a:gd name="connsiteX1" fmla="*/ 1405669 w 2134750"/>
+              <a:gd name="connsiteY1" fmla="*/ 687019 h 1229300"/>
+              <a:gd name="connsiteX2" fmla="*/ 1566908 w 2134750"/>
+              <a:gd name="connsiteY2" fmla="*/ 687019 h 1229300"/>
+              <a:gd name="connsiteX3" fmla="*/ 1679950 w 2134750"/>
+              <a:gd name="connsiteY3" fmla="*/ 634441 h 1229300"/>
+              <a:gd name="connsiteX4" fmla="*/ 1721137 w 2134750"/>
+              <a:gd name="connsiteY4" fmla="*/ 490728 h 1229300"/>
+              <a:gd name="connsiteX5" fmla="*/ 1679950 w 2134750"/>
+              <a:gd name="connsiteY5" fmla="*/ 343509 h 1229300"/>
+              <a:gd name="connsiteX6" fmla="*/ 1566908 w 2134750"/>
+              <a:gd name="connsiteY6" fmla="*/ 290932 h 1229300"/>
+              <a:gd name="connsiteX7" fmla="*/ 1405669 w 2134750"/>
+              <a:gd name="connsiteY7" fmla="*/ 290932 h 1229300"/>
+              <a:gd name="connsiteX8" fmla="*/ 992055 w 2134750"/>
+              <a:gd name="connsiteY8" fmla="*/ 0 h 1229300"/>
+              <a:gd name="connsiteX9" fmla="*/ 1714126 w 2134750"/>
+              <a:gd name="connsiteY9" fmla="*/ 0 h 1229300"/>
+              <a:gd name="connsiteX10" fmla="*/ 2023460 w 2134750"/>
+              <a:gd name="connsiteY10" fmla="*/ 129692 h 1229300"/>
+              <a:gd name="connsiteX11" fmla="*/ 2134750 w 2134750"/>
+              <a:gd name="connsiteY11" fmla="*/ 490728 h 1229300"/>
+              <a:gd name="connsiteX12" fmla="*/ 2023460 w 2134750"/>
+              <a:gd name="connsiteY12" fmla="*/ 849134 h 1229300"/>
+              <a:gd name="connsiteX13" fmla="*/ 1714126 w 2134750"/>
+              <a:gd name="connsiteY13" fmla="*/ 977951 h 1229300"/>
+              <a:gd name="connsiteX14" fmla="*/ 1405669 w 2134750"/>
+              <a:gd name="connsiteY14" fmla="*/ 977951 h 1229300"/>
+              <a:gd name="connsiteX15" fmla="*/ 1405669 w 2134750"/>
+              <a:gd name="connsiteY15" fmla="*/ 1226820 h 1229300"/>
+              <a:gd name="connsiteX16" fmla="*/ 0 w 2134750"/>
+              <a:gd name="connsiteY16" fmla="*/ 1229300 h 1229300"/>
+              <a:gd name="connsiteX17" fmla="*/ 0 w 2134750"/>
+              <a:gd name="connsiteY17" fmla="*/ 960852 h 1229300"/>
+              <a:gd name="connsiteX18" fmla="*/ 992055 w 2134750"/>
+              <a:gd name="connsiteY18" fmla="*/ 960852 h 1229300"/>
+              <a:gd name="connsiteX19" fmla="*/ 992055 w 2134750"/>
+              <a:gd name="connsiteY19" fmla="*/ 0 h 1229300"/>
+              <a:gd name="connsiteX0" fmla="*/ 1405669 w 2134750"/>
+              <a:gd name="connsiteY0" fmla="*/ 290932 h 1226820"/>
+              <a:gd name="connsiteX1" fmla="*/ 1405669 w 2134750"/>
+              <a:gd name="connsiteY1" fmla="*/ 687019 h 1226820"/>
+              <a:gd name="connsiteX2" fmla="*/ 1566908 w 2134750"/>
+              <a:gd name="connsiteY2" fmla="*/ 687019 h 1226820"/>
+              <a:gd name="connsiteX3" fmla="*/ 1679950 w 2134750"/>
+              <a:gd name="connsiteY3" fmla="*/ 634441 h 1226820"/>
+              <a:gd name="connsiteX4" fmla="*/ 1721137 w 2134750"/>
+              <a:gd name="connsiteY4" fmla="*/ 490728 h 1226820"/>
+              <a:gd name="connsiteX5" fmla="*/ 1679950 w 2134750"/>
+              <a:gd name="connsiteY5" fmla="*/ 343509 h 1226820"/>
+              <a:gd name="connsiteX6" fmla="*/ 1566908 w 2134750"/>
+              <a:gd name="connsiteY6" fmla="*/ 290932 h 1226820"/>
+              <a:gd name="connsiteX7" fmla="*/ 1405669 w 2134750"/>
+              <a:gd name="connsiteY7" fmla="*/ 290932 h 1226820"/>
+              <a:gd name="connsiteX8" fmla="*/ 992055 w 2134750"/>
+              <a:gd name="connsiteY8" fmla="*/ 0 h 1226820"/>
+              <a:gd name="connsiteX9" fmla="*/ 1714126 w 2134750"/>
+              <a:gd name="connsiteY9" fmla="*/ 0 h 1226820"/>
+              <a:gd name="connsiteX10" fmla="*/ 2023460 w 2134750"/>
+              <a:gd name="connsiteY10" fmla="*/ 129692 h 1226820"/>
+              <a:gd name="connsiteX11" fmla="*/ 2134750 w 2134750"/>
+              <a:gd name="connsiteY11" fmla="*/ 490728 h 1226820"/>
+              <a:gd name="connsiteX12" fmla="*/ 2023460 w 2134750"/>
+              <a:gd name="connsiteY12" fmla="*/ 849134 h 1226820"/>
+              <a:gd name="connsiteX13" fmla="*/ 1714126 w 2134750"/>
+              <a:gd name="connsiteY13" fmla="*/ 977951 h 1226820"/>
+              <a:gd name="connsiteX14" fmla="*/ 1405669 w 2134750"/>
+              <a:gd name="connsiteY14" fmla="*/ 977951 h 1226820"/>
+              <a:gd name="connsiteX15" fmla="*/ 1405669 w 2134750"/>
+              <a:gd name="connsiteY15" fmla="*/ 1226820 h 1226820"/>
+              <a:gd name="connsiteX16" fmla="*/ 0 w 2134750"/>
+              <a:gd name="connsiteY16" fmla="*/ 1222156 h 1226820"/>
+              <a:gd name="connsiteX17" fmla="*/ 0 w 2134750"/>
+              <a:gd name="connsiteY17" fmla="*/ 960852 h 1226820"/>
+              <a:gd name="connsiteX18" fmla="*/ 992055 w 2134750"/>
+              <a:gd name="connsiteY18" fmla="*/ 960852 h 1226820"/>
+              <a:gd name="connsiteX19" fmla="*/ 992055 w 2134750"/>
+              <a:gd name="connsiteY19" fmla="*/ 0 h 1226820"/>
+              <a:gd name="connsiteX0" fmla="*/ 1405669 w 2134750"/>
+              <a:gd name="connsiteY0" fmla="*/ 290932 h 1226918"/>
+              <a:gd name="connsiteX1" fmla="*/ 1405669 w 2134750"/>
+              <a:gd name="connsiteY1" fmla="*/ 687019 h 1226918"/>
+              <a:gd name="connsiteX2" fmla="*/ 1566908 w 2134750"/>
+              <a:gd name="connsiteY2" fmla="*/ 687019 h 1226918"/>
+              <a:gd name="connsiteX3" fmla="*/ 1679950 w 2134750"/>
+              <a:gd name="connsiteY3" fmla="*/ 634441 h 1226918"/>
+              <a:gd name="connsiteX4" fmla="*/ 1721137 w 2134750"/>
+              <a:gd name="connsiteY4" fmla="*/ 490728 h 1226918"/>
+              <a:gd name="connsiteX5" fmla="*/ 1679950 w 2134750"/>
+              <a:gd name="connsiteY5" fmla="*/ 343509 h 1226918"/>
+              <a:gd name="connsiteX6" fmla="*/ 1566908 w 2134750"/>
+              <a:gd name="connsiteY6" fmla="*/ 290932 h 1226918"/>
+              <a:gd name="connsiteX7" fmla="*/ 1405669 w 2134750"/>
+              <a:gd name="connsiteY7" fmla="*/ 290932 h 1226918"/>
+              <a:gd name="connsiteX8" fmla="*/ 992055 w 2134750"/>
+              <a:gd name="connsiteY8" fmla="*/ 0 h 1226918"/>
+              <a:gd name="connsiteX9" fmla="*/ 1714126 w 2134750"/>
+              <a:gd name="connsiteY9" fmla="*/ 0 h 1226918"/>
+              <a:gd name="connsiteX10" fmla="*/ 2023460 w 2134750"/>
+              <a:gd name="connsiteY10" fmla="*/ 129692 h 1226918"/>
+              <a:gd name="connsiteX11" fmla="*/ 2134750 w 2134750"/>
+              <a:gd name="connsiteY11" fmla="*/ 490728 h 1226918"/>
+              <a:gd name="connsiteX12" fmla="*/ 2023460 w 2134750"/>
+              <a:gd name="connsiteY12" fmla="*/ 849134 h 1226918"/>
+              <a:gd name="connsiteX13" fmla="*/ 1714126 w 2134750"/>
+              <a:gd name="connsiteY13" fmla="*/ 977951 h 1226918"/>
+              <a:gd name="connsiteX14" fmla="*/ 1405669 w 2134750"/>
+              <a:gd name="connsiteY14" fmla="*/ 977951 h 1226918"/>
+              <a:gd name="connsiteX15" fmla="*/ 1405669 w 2134750"/>
+              <a:gd name="connsiteY15" fmla="*/ 1226820 h 1226918"/>
+              <a:gd name="connsiteX16" fmla="*/ 0 w 2134750"/>
+              <a:gd name="connsiteY16" fmla="*/ 1226918 h 1226918"/>
+              <a:gd name="connsiteX17" fmla="*/ 0 w 2134750"/>
+              <a:gd name="connsiteY17" fmla="*/ 960852 h 1226918"/>
+              <a:gd name="connsiteX18" fmla="*/ 992055 w 2134750"/>
+              <a:gd name="connsiteY18" fmla="*/ 960852 h 1226918"/>
+              <a:gd name="connsiteX19" fmla="*/ 992055 w 2134750"/>
+              <a:gd name="connsiteY19" fmla="*/ 0 h 1226918"/>
+            </a:gdLst>
+            <a:ahLst/>
+            <a:cxnLst>
+              <a:cxn ang="0">
+                <a:pos x="connsiteX0" y="connsiteY0"/>
+              </a:cxn>
+              <a:cxn ang="0">
+                <a:pos x="connsiteX1" y="connsiteY1"/>
+              </a:cxn>
+              <a:cxn ang="0">
+                <a:pos x="connsiteX2" y="connsiteY2"/>
+              </a:cxn>
+              <a:cxn ang="0">
+                <a:pos x="connsiteX3" y="connsiteY3"/>
+              </a:cxn>
+              <a:cxn ang="0">
+                <a:pos x="connsiteX4" y="connsiteY4"/>
+              </a:cxn>
+              <a:cxn ang="0">
+                <a:pos x="connsiteX5" y="connsiteY5"/>
+              </a:cxn>
+              <a:cxn ang="0">
+                <a:pos x="connsiteX6" y="connsiteY6"/>
+              </a:cxn>
+              <a:cxn ang="0">
+                <a:pos x="connsiteX7" y="connsiteY7"/>
+              </a:cxn>
+              <a:cxn ang="0">
+                <a:pos x="connsiteX8" y="connsiteY8"/>
+              </a:cxn>
+              <a:cxn ang="0">
+                <a:pos x="connsiteX9" y="connsiteY9"/>
+              </a:cxn>
+              <a:cxn ang="0">
+                <a:pos x="connsiteX10" y="connsiteY10"/>
+              </a:cxn>
+              <a:cxn ang="0">
+                <a:pos x="connsiteX11" y="connsiteY11"/>
+              </a:cxn>
+              <a:cxn ang="0">
+                <a:pos x="connsiteX12" y="connsiteY12"/>
+              </a:cxn>
+              <a:cxn ang="0">
+                <a:pos x="connsiteX13" y="connsiteY13"/>
+              </a:cxn>
+              <a:cxn ang="0">
+                <a:pos x="connsiteX14" y="connsiteY14"/>
+              </a:cxn>
+              <a:cxn ang="0">
+                <a:pos x="connsiteX15" y="connsiteY15"/>
+              </a:cxn>
+              <a:cxn ang="0">
+                <a:pos x="connsiteX16" y="connsiteY16"/>
+              </a:cxn>
+              <a:cxn ang="0">
+                <a:pos x="connsiteX17" y="connsiteY17"/>
+              </a:cxn>
+              <a:cxn ang="0">
+                <a:pos x="connsiteX18" y="connsiteY18"/>
+              </a:cxn>
+              <a:cxn ang="0">
+                <a:pos x="connsiteX19" y="connsiteY19"/>
+              </a:cxn>
+            </a:cxnLst>
+            <a:rect l="l" t="t" r="r" b="b"/>
+            <a:pathLst>
+              <a:path w="2134750" h="1226918">
+                <a:moveTo>
+                  <a:pt x="1405669" y="290932"/>
+                </a:moveTo>
+                <a:lnTo>
+                  <a:pt x="1405669" y="687019"/>
+                </a:lnTo>
+                <a:lnTo>
+                  <a:pt x="1566908" y="687019"/>
+                </a:lnTo>
+                <a:cubicBezTo>
+                  <a:pt x="1614812" y="687019"/>
+                  <a:pt x="1652493" y="669493"/>
+                  <a:pt x="1679950" y="634441"/>
+                </a:cubicBezTo>
+                <a:cubicBezTo>
+                  <a:pt x="1707408" y="599389"/>
+                  <a:pt x="1721137" y="551485"/>
+                  <a:pt x="1721137" y="490728"/>
+                </a:cubicBezTo>
+                <a:cubicBezTo>
+                  <a:pt x="1721137" y="427634"/>
+                  <a:pt x="1707408" y="378561"/>
+                  <a:pt x="1679950" y="343509"/>
+                </a:cubicBezTo>
+                <a:cubicBezTo>
+                  <a:pt x="1652493" y="308457"/>
+                  <a:pt x="1614812" y="290932"/>
+                  <a:pt x="1566908" y="290932"/>
+                </a:cubicBezTo>
+                <a:lnTo>
+                  <a:pt x="1405669" y="290932"/>
+                </a:lnTo>
+                <a:close/>
+                <a:moveTo>
+                  <a:pt x="992055" y="0"/>
+                </a:moveTo>
+                <a:lnTo>
+                  <a:pt x="1714126" y="0"/>
+                </a:lnTo>
+                <a:cubicBezTo>
+                  <a:pt x="1846155" y="0"/>
+                  <a:pt x="1949267" y="43231"/>
+                  <a:pt x="2023460" y="129692"/>
+                </a:cubicBezTo>
+                <a:cubicBezTo>
+                  <a:pt x="2097653" y="216154"/>
+                  <a:pt x="2134750" y="336499"/>
+                  <a:pt x="2134750" y="490728"/>
+                </a:cubicBezTo>
+                <a:cubicBezTo>
+                  <a:pt x="2134750" y="643788"/>
+                  <a:pt x="2097653" y="763257"/>
+                  <a:pt x="2023460" y="849134"/>
+                </a:cubicBezTo>
+                <a:cubicBezTo>
+                  <a:pt x="1949267" y="935012"/>
+                  <a:pt x="1846155" y="977951"/>
+                  <a:pt x="1714126" y="977951"/>
+                </a:cubicBezTo>
+                <a:lnTo>
+                  <a:pt x="1405669" y="977951"/>
+                </a:lnTo>
+                <a:lnTo>
+                  <a:pt x="1405669" y="1226820"/>
+                </a:lnTo>
+                <a:lnTo>
+                  <a:pt x="0" y="1226918"/>
+                </a:lnTo>
+                <a:lnTo>
+                  <a:pt x="0" y="960852"/>
+                </a:lnTo>
+                <a:lnTo>
+                  <a:pt x="992055" y="960852"/>
+                </a:lnTo>
+                <a:lnTo>
+                  <a:pt x="992055" y="0"/>
+                </a:lnTo>
+                <a:close/>
+              </a:path>
+            </a:pathLst>
+          </a:custGeom>
+          <a:solidFill>
+            <a:schemeClr val="tx1"/>
+          </a:solidFill>
+          <a:ln>
+            <a:noFill/>
+          </a:ln>
+        </p:spPr>
+        <p:style>
+          <a:lnRef idx="2">
+            <a:schemeClr val="accent1">
+              <a:shade val="50000"/>
+            </a:schemeClr>
+          </a:lnRef>
+          <a:fillRef idx="1">
+            <a:schemeClr val="accent1"/>
+          </a:fillRef>
+          <a:effectRef idx="0">
+            <a:schemeClr val="accent1"/>
+          </a:effectRef>
+          <a:fontRef idx="minor">
+            <a:schemeClr val="lt1"/>
+          </a:fontRef>
+        </p:style>
+        <p:txBody>
+          <a:bodyPr wrap="square" rtlCol="0" anchor="ctr">
+            <a:noAutofit/>
+          </a:bodyPr>
+          <a:lstStyle/>
+          <a:p>
+            <a:pPr algn="ctr"/>
+            <a:endParaRPr lang="en-US"/>
+          </a:p>
+        </p:txBody>
+      </p:sp>
+      <p:sp>
+        <p:nvSpPr>
+          <p:cNvPr id="27" name="TextBox 26">
+            <a:extLst>
+              <a:ext uri="{FF2B5EF4-FFF2-40B4-BE49-F238E27FC236}">
+                <a16:creationId xmlns:a16="http://schemas.microsoft.com/office/drawing/2014/main" id="{C89CD29D-8074-FB92-96B9-8D19CEF5501E}"/>
+              </a:ext>
+            </a:extLst>
+          </p:cNvPr>
+          <p:cNvSpPr txBox="1"/>
+          <p:nvPr/>
+        </p:nvSpPr>
+        <p:spPr>
+          <a:xfrm>
+            <a:off x="8615150" y="1458470"/>
+            <a:ext cx="1326004" cy="1862048"/>
+          </a:xfrm>
+          <a:prstGeom prst="rect">
+            <a:avLst/>
+          </a:prstGeom>
+        </p:spPr>
+        <p:txBody>
+          <a:bodyPr wrap="none" rtlCol="0">
+            <a:spAutoFit/>
+          </a:bodyPr>
+          <a:lstStyle/>
+          <a:p>
+            <a:r>
+              <a:rPr lang="en-ZA" sz="11500" dirty="0">
+                <a:solidFill>
+                  <a:schemeClr val="bg1"/>
+                </a:solidFill>
+                <a:latin typeface="Nura Black" pitchFamily="2" charset="0"/>
+              </a:rPr>
+              <a:t>U</a:t>
+            </a:r>
+            <a:endParaRPr lang="en-US" sz="11500" dirty="0">
+              <a:solidFill>
+                <a:schemeClr val="bg1"/>
+              </a:solidFill>
+              <a:latin typeface="Nura Black" pitchFamily="2" charset="0"/>
+            </a:endParaRPr>
+          </a:p>
+        </p:txBody>
+      </p:sp>
+      <p:grpSp>
+        <p:nvGrpSpPr>
+          <p:cNvPr id="5" name="Group 4">
+            <a:extLst>
+              <a:ext uri="{FF2B5EF4-FFF2-40B4-BE49-F238E27FC236}">
+                <a16:creationId xmlns:a16="http://schemas.microsoft.com/office/drawing/2014/main" id="{D6D4A469-5AFB-9C06-1251-B4EB92312036}"/>
+              </a:ext>
+            </a:extLst>
+          </p:cNvPr>
+          <p:cNvGrpSpPr/>
+          <p:nvPr/>
+        </p:nvGrpSpPr>
+        <p:grpSpPr>
+          <a:xfrm>
+            <a:off x="1342263" y="3987986"/>
+            <a:ext cx="3831042" cy="1961277"/>
+            <a:chOff x="1342263" y="3987986"/>
+            <a:chExt cx="3831042" cy="1961277"/>
+          </a:xfrm>
+        </p:grpSpPr>
+        <p:sp>
+          <p:nvSpPr>
+            <p:cNvPr id="3" name="Arrow: Up 2">
+              <a:extLst>
+                <a:ext uri="{FF2B5EF4-FFF2-40B4-BE49-F238E27FC236}">
+                  <a16:creationId xmlns:a16="http://schemas.microsoft.com/office/drawing/2014/main" id="{761123E9-063E-72BD-B3E0-63C5460103E5}"/>
+                </a:ext>
+              </a:extLst>
+            </p:cNvPr>
+            <p:cNvSpPr/>
+            <p:nvPr/>
+          </p:nvSpPr>
+          <p:spPr>
+            <a:xfrm>
+              <a:off x="1943070" y="4122775"/>
+              <a:ext cx="989901" cy="1362963"/>
+            </a:xfrm>
+            <a:prstGeom prst="upArrow">
+              <a:avLst>
+                <a:gd name="adj1" fmla="val 52581"/>
+                <a:gd name="adj2" fmla="val 60140"/>
+              </a:avLst>
+            </a:prstGeom>
+            <a:solidFill>
+              <a:schemeClr val="tx1"/>
+            </a:solidFill>
+            <a:ln>
+              <a:noFill/>
+            </a:ln>
+          </p:spPr>
+          <p:style>
+            <a:lnRef idx="2">
+              <a:schemeClr val="accent1">
+                <a:shade val="50000"/>
+              </a:schemeClr>
+            </a:lnRef>
+            <a:fillRef idx="1">
+              <a:schemeClr val="accent1"/>
+            </a:fillRef>
+            <a:effectRef idx="0">
+              <a:schemeClr val="accent1"/>
+            </a:effectRef>
+            <a:fontRef idx="minor">
+              <a:schemeClr val="lt1"/>
+            </a:fontRef>
+          </p:style>
+          <p:txBody>
+            <a:bodyPr rtlCol="0" anchor="ctr"/>
+            <a:lstStyle/>
+            <a:p>
+              <a:pPr algn="ctr"/>
+              <a:endParaRPr lang="en-US"/>
+            </a:p>
+          </p:txBody>
+        </p:sp>
+        <p:sp>
+          <p:nvSpPr>
+            <p:cNvPr id="40" name="TextBox 39">
+              <a:extLst>
+                <a:ext uri="{FF2B5EF4-FFF2-40B4-BE49-F238E27FC236}">
+                  <a16:creationId xmlns:a16="http://schemas.microsoft.com/office/drawing/2014/main" id="{CFEFCA0B-AA72-409D-7762-8578E7B2513B}"/>
+                </a:ext>
+              </a:extLst>
+            </p:cNvPr>
+            <p:cNvSpPr txBox="1"/>
+            <p:nvPr/>
+          </p:nvSpPr>
+          <p:spPr>
+            <a:xfrm>
+              <a:off x="1342263" y="3987986"/>
+              <a:ext cx="3831042" cy="1949812"/>
+            </a:xfrm>
+            <a:custGeom>
+              <a:avLst/>
+              <a:gdLst/>
+              <a:ahLst/>
+              <a:cxnLst/>
+              <a:rect l="l" t="t" r="r" b="b"/>
+              <a:pathLst>
+                <a:path w="3831042" h="1949812">
+                  <a:moveTo>
+                    <a:pt x="12192" y="1426318"/>
+                  </a:moveTo>
+                  <a:lnTo>
+                    <a:pt x="146304" y="1426318"/>
+                  </a:lnTo>
+                  <a:lnTo>
+                    <a:pt x="146304" y="1597768"/>
+                  </a:lnTo>
+                  <a:lnTo>
+                    <a:pt x="545592" y="1597768"/>
+                  </a:lnTo>
+                  <a:lnTo>
+                    <a:pt x="545592" y="1777600"/>
+                  </a:lnTo>
+                  <a:lnTo>
+                    <a:pt x="146304" y="1777600"/>
+                  </a:lnTo>
+                  <a:lnTo>
+                    <a:pt x="146304" y="1949812"/>
+                  </a:lnTo>
+                  <a:lnTo>
+                    <a:pt x="12192" y="1949812"/>
+                  </a:lnTo>
+                  <a:close/>
+                  <a:moveTo>
+                    <a:pt x="12192" y="845293"/>
+                  </a:moveTo>
+                  <a:lnTo>
+                    <a:pt x="545592" y="845293"/>
+                  </a:lnTo>
+                  <a:lnTo>
+                    <a:pt x="545592" y="1025125"/>
+                  </a:lnTo>
+                  <a:lnTo>
+                    <a:pt x="345948" y="1025125"/>
+                  </a:lnTo>
+                  <a:lnTo>
+                    <a:pt x="345948" y="1188955"/>
+                  </a:lnTo>
+                  <a:lnTo>
+                    <a:pt x="545592" y="1188955"/>
+                  </a:lnTo>
+                  <a:lnTo>
+                    <a:pt x="545592" y="1368787"/>
+                  </a:lnTo>
+                  <a:lnTo>
+                    <a:pt x="12192" y="1368787"/>
+                  </a:lnTo>
+                  <a:lnTo>
+                    <a:pt x="12192" y="1188955"/>
+                  </a:lnTo>
+                  <a:lnTo>
+                    <a:pt x="211836" y="1188955"/>
+                  </a:lnTo>
+                  <a:lnTo>
+                    <a:pt x="211836" y="1025125"/>
+                  </a:lnTo>
+                  <a:lnTo>
+                    <a:pt x="12192" y="1025125"/>
+                  </a:lnTo>
+                  <a:close/>
+                  <a:moveTo>
+                    <a:pt x="12192" y="607930"/>
+                  </a:moveTo>
+                  <a:lnTo>
+                    <a:pt x="545592" y="607930"/>
+                  </a:lnTo>
+                  <a:lnTo>
+                    <a:pt x="545592" y="787762"/>
+                  </a:lnTo>
+                  <a:lnTo>
+                    <a:pt x="12192" y="787762"/>
+                  </a:lnTo>
+                  <a:close/>
+                  <a:moveTo>
+                    <a:pt x="2792436" y="194767"/>
+                  </a:moveTo>
+                  <a:cubicBezTo>
+                    <a:pt x="2760737" y="194767"/>
+                    <a:pt x="2735896" y="205740"/>
+                    <a:pt x="2717912" y="227686"/>
+                  </a:cubicBezTo>
+                  <a:cubicBezTo>
+                    <a:pt x="2699929" y="249631"/>
+                    <a:pt x="2690938" y="280111"/>
+                    <a:pt x="2690938" y="319126"/>
+                  </a:cubicBezTo>
+                  <a:lnTo>
+                    <a:pt x="2690938" y="388620"/>
+                  </a:lnTo>
+                  <a:lnTo>
+                    <a:pt x="2893934" y="388620"/>
+                  </a:lnTo>
+                  <a:lnTo>
+                    <a:pt x="2893934" y="319126"/>
+                  </a:lnTo>
+                  <a:cubicBezTo>
+                    <a:pt x="2893934" y="280111"/>
+                    <a:pt x="2884943" y="249631"/>
+                    <a:pt x="2866960" y="227686"/>
+                  </a:cubicBezTo>
+                  <a:cubicBezTo>
+                    <a:pt x="2848976" y="205740"/>
+                    <a:pt x="2824135" y="194767"/>
+                    <a:pt x="2792436" y="194767"/>
+                  </a:cubicBezTo>
+                  <a:close/>
+                  <a:moveTo>
+                    <a:pt x="364998" y="30715"/>
+                  </a:moveTo>
+                  <a:cubicBezTo>
+                    <a:pt x="425450" y="30715"/>
+                    <a:pt x="472694" y="53702"/>
+                    <a:pt x="506730" y="99676"/>
+                  </a:cubicBezTo>
+                  <a:cubicBezTo>
+                    <a:pt x="540766" y="145650"/>
+                    <a:pt x="557784" y="209531"/>
+                    <a:pt x="557784" y="291319"/>
+                  </a:cubicBezTo>
+                  <a:cubicBezTo>
+                    <a:pt x="557784" y="372599"/>
+                    <a:pt x="540766" y="435972"/>
+                    <a:pt x="506730" y="481438"/>
+                  </a:cubicBezTo>
+                  <a:cubicBezTo>
+                    <a:pt x="472694" y="526904"/>
+                    <a:pt x="425450" y="549637"/>
+                    <a:pt x="364998" y="549637"/>
+                  </a:cubicBezTo>
+                  <a:lnTo>
+                    <a:pt x="364998" y="369805"/>
+                  </a:lnTo>
+                  <a:cubicBezTo>
+                    <a:pt x="385826" y="369805"/>
+                    <a:pt x="402082" y="362947"/>
+                    <a:pt x="413766" y="349231"/>
+                  </a:cubicBezTo>
+                  <a:cubicBezTo>
+                    <a:pt x="425450" y="335515"/>
+                    <a:pt x="431292" y="316211"/>
+                    <a:pt x="431292" y="291319"/>
+                  </a:cubicBezTo>
+                  <a:cubicBezTo>
+                    <a:pt x="431292" y="265919"/>
+                    <a:pt x="427228" y="246107"/>
+                    <a:pt x="419100" y="231883"/>
+                  </a:cubicBezTo>
+                  <a:cubicBezTo>
+                    <a:pt x="410972" y="217659"/>
+                    <a:pt x="399796" y="210547"/>
+                    <a:pt x="385572" y="210547"/>
+                  </a:cubicBezTo>
+                  <a:cubicBezTo>
+                    <a:pt x="371348" y="210547"/>
+                    <a:pt x="361823" y="218802"/>
+                    <a:pt x="356997" y="235312"/>
+                  </a:cubicBezTo>
+                  <a:cubicBezTo>
+                    <a:pt x="352171" y="251822"/>
+                    <a:pt x="348234" y="278365"/>
+                    <a:pt x="345186" y="314941"/>
+                  </a:cubicBezTo>
+                  <a:cubicBezTo>
+                    <a:pt x="341122" y="362185"/>
+                    <a:pt x="335153" y="401428"/>
+                    <a:pt x="327279" y="432670"/>
+                  </a:cubicBezTo>
+                  <a:cubicBezTo>
+                    <a:pt x="319405" y="463912"/>
+                    <a:pt x="302768" y="491217"/>
+                    <a:pt x="277368" y="514585"/>
+                  </a:cubicBezTo>
+                  <a:cubicBezTo>
+                    <a:pt x="251968" y="537953"/>
+                    <a:pt x="214376" y="549637"/>
+                    <a:pt x="164592" y="549637"/>
+                  </a:cubicBezTo>
+                  <a:cubicBezTo>
+                    <a:pt x="112776" y="549637"/>
+                    <a:pt x="72390" y="527158"/>
+                    <a:pt x="43434" y="482200"/>
+                  </a:cubicBezTo>
+                  <a:cubicBezTo>
+                    <a:pt x="14478" y="437242"/>
+                    <a:pt x="0" y="374631"/>
+                    <a:pt x="0" y="294367"/>
+                  </a:cubicBezTo>
+                  <a:cubicBezTo>
+                    <a:pt x="0" y="213087"/>
+                    <a:pt x="18288" y="149714"/>
+                    <a:pt x="54864" y="104248"/>
+                  </a:cubicBezTo>
+                  <a:cubicBezTo>
+                    <a:pt x="91440" y="58782"/>
+                    <a:pt x="142494" y="36049"/>
+                    <a:pt x="208026" y="36049"/>
+                  </a:cubicBezTo>
+                  <a:lnTo>
+                    <a:pt x="208026" y="215881"/>
+                  </a:lnTo>
+                  <a:cubicBezTo>
+                    <a:pt x="182626" y="215881"/>
+                    <a:pt x="162687" y="223120"/>
+                    <a:pt x="148209" y="237598"/>
+                  </a:cubicBezTo>
+                  <a:cubicBezTo>
+                    <a:pt x="133731" y="252076"/>
+                    <a:pt x="126492" y="272269"/>
+                    <a:pt x="126492" y="298177"/>
+                  </a:cubicBezTo>
+                  <a:cubicBezTo>
+                    <a:pt x="126492" y="327133"/>
+                    <a:pt x="130683" y="347834"/>
+                    <a:pt x="139065" y="360280"/>
+                  </a:cubicBezTo>
+                  <a:cubicBezTo>
+                    <a:pt x="147447" y="372726"/>
+                    <a:pt x="158242" y="378949"/>
+                    <a:pt x="171450" y="378949"/>
+                  </a:cubicBezTo>
+                  <a:cubicBezTo>
+                    <a:pt x="184150" y="378949"/>
+                    <a:pt x="194056" y="373361"/>
+                    <a:pt x="201168" y="362185"/>
+                  </a:cubicBezTo>
+                  <a:cubicBezTo>
+                    <a:pt x="208280" y="351009"/>
+                    <a:pt x="213487" y="336912"/>
+                    <a:pt x="216789" y="319894"/>
+                  </a:cubicBezTo>
+                  <a:cubicBezTo>
+                    <a:pt x="220091" y="302876"/>
+                    <a:pt x="223266" y="279381"/>
+                    <a:pt x="226314" y="249409"/>
+                  </a:cubicBezTo>
+                  <a:cubicBezTo>
+                    <a:pt x="231394" y="203689"/>
+                    <a:pt x="237490" y="166351"/>
+                    <a:pt x="244602" y="137395"/>
+                  </a:cubicBezTo>
+                  <a:cubicBezTo>
+                    <a:pt x="251714" y="108439"/>
+                    <a:pt x="264795" y="83420"/>
+                    <a:pt x="283845" y="62338"/>
+                  </a:cubicBezTo>
+                  <a:cubicBezTo>
+                    <a:pt x="302895" y="41256"/>
+                    <a:pt x="329946" y="30715"/>
+                    <a:pt x="364998" y="30715"/>
+                  </a:cubicBezTo>
+                  <a:close/>
+                  <a:moveTo>
+                    <a:pt x="3179989" y="11887"/>
+                  </a:moveTo>
+                  <a:lnTo>
+                    <a:pt x="3395788" y="11887"/>
+                  </a:lnTo>
+                  <a:lnTo>
+                    <a:pt x="3505516" y="256946"/>
+                  </a:lnTo>
+                  <a:lnTo>
+                    <a:pt x="3615244" y="11887"/>
+                  </a:lnTo>
+                  <a:lnTo>
+                    <a:pt x="3831042" y="11887"/>
+                  </a:lnTo>
+                  <a:lnTo>
+                    <a:pt x="3613415" y="424282"/>
+                  </a:lnTo>
+                  <a:lnTo>
+                    <a:pt x="3613415" y="651967"/>
+                  </a:lnTo>
+                  <a:lnTo>
+                    <a:pt x="3397616" y="651967"/>
+                  </a:lnTo>
+                  <a:lnTo>
+                    <a:pt x="3397616" y="424282"/>
+                  </a:lnTo>
+                  <a:close/>
+                  <a:moveTo>
+                    <a:pt x="1484539" y="11887"/>
+                  </a:moveTo>
+                  <a:lnTo>
+                    <a:pt x="1700338" y="11887"/>
+                  </a:lnTo>
+                  <a:lnTo>
+                    <a:pt x="1701252" y="378562"/>
+                  </a:lnTo>
+                  <a:cubicBezTo>
+                    <a:pt x="1701252" y="406603"/>
+                    <a:pt x="1707043" y="428701"/>
+                    <a:pt x="1718626" y="444856"/>
+                  </a:cubicBezTo>
+                  <a:cubicBezTo>
+                    <a:pt x="1730208" y="461010"/>
+                    <a:pt x="1746362" y="469087"/>
+                    <a:pt x="1767089" y="469087"/>
+                  </a:cubicBezTo>
+                  <a:cubicBezTo>
+                    <a:pt x="1787815" y="469087"/>
+                    <a:pt x="1804122" y="461162"/>
+                    <a:pt x="1816009" y="445313"/>
+                  </a:cubicBezTo>
+                  <a:cubicBezTo>
+                    <a:pt x="1827896" y="429463"/>
+                    <a:pt x="1833840" y="407213"/>
+                    <a:pt x="1833840" y="378562"/>
+                  </a:cubicBezTo>
+                  <a:lnTo>
+                    <a:pt x="1833840" y="11887"/>
+                  </a:lnTo>
+                  <a:lnTo>
+                    <a:pt x="2048724" y="11887"/>
+                  </a:lnTo>
+                  <a:lnTo>
+                    <a:pt x="2048724" y="378562"/>
+                  </a:lnTo>
+                  <a:cubicBezTo>
+                    <a:pt x="2048724" y="407213"/>
+                    <a:pt x="2054668" y="429463"/>
+                    <a:pt x="2066555" y="445313"/>
+                  </a:cubicBezTo>
+                  <a:cubicBezTo>
+                    <a:pt x="2078442" y="461162"/>
+                    <a:pt x="2095054" y="469087"/>
+                    <a:pt x="2116390" y="469087"/>
+                  </a:cubicBezTo>
+                  <a:cubicBezTo>
+                    <a:pt x="2137726" y="469087"/>
+                    <a:pt x="2154337" y="461162"/>
+                    <a:pt x="2166224" y="445313"/>
+                  </a:cubicBezTo>
+                  <a:cubicBezTo>
+                    <a:pt x="2178112" y="429463"/>
+                    <a:pt x="2184055" y="407213"/>
+                    <a:pt x="2184055" y="378562"/>
+                  </a:cubicBezTo>
+                  <a:lnTo>
+                    <a:pt x="2184055" y="11887"/>
+                  </a:lnTo>
+                  <a:lnTo>
+                    <a:pt x="2398939" y="11887"/>
+                  </a:lnTo>
+                  <a:lnTo>
+                    <a:pt x="2398939" y="343814"/>
+                  </a:lnTo>
+                  <a:cubicBezTo>
+                    <a:pt x="2398939" y="410870"/>
+                    <a:pt x="2387662" y="468630"/>
+                    <a:pt x="2365106" y="517093"/>
+                  </a:cubicBezTo>
+                  <a:cubicBezTo>
+                    <a:pt x="2342551" y="565556"/>
+                    <a:pt x="2310090" y="602590"/>
+                    <a:pt x="2267723" y="628193"/>
+                  </a:cubicBezTo>
+                  <a:cubicBezTo>
+                    <a:pt x="2225356" y="653796"/>
+                    <a:pt x="2174911" y="666598"/>
+                    <a:pt x="2116390" y="666598"/>
+                  </a:cubicBezTo>
+                  <a:cubicBezTo>
+                    <a:pt x="2073718" y="666598"/>
+                    <a:pt x="2036837" y="656082"/>
+                    <a:pt x="2005747" y="635051"/>
+                  </a:cubicBezTo>
+                  <a:cubicBezTo>
+                    <a:pt x="1974658" y="614020"/>
+                    <a:pt x="1953322" y="589178"/>
+                    <a:pt x="1941739" y="560527"/>
+                  </a:cubicBezTo>
+                  <a:cubicBezTo>
+                    <a:pt x="1930766" y="589178"/>
+                    <a:pt x="1909735" y="614020"/>
+                    <a:pt x="1878646" y="635051"/>
+                  </a:cubicBezTo>
+                  <a:cubicBezTo>
+                    <a:pt x="1847556" y="656082"/>
+                    <a:pt x="1810370" y="666598"/>
+                    <a:pt x="1767089" y="666598"/>
+                  </a:cubicBezTo>
+                  <a:cubicBezTo>
+                    <a:pt x="1708567" y="666598"/>
+                    <a:pt x="1658123" y="653796"/>
+                    <a:pt x="1615756" y="628193"/>
+                  </a:cubicBezTo>
+                  <a:cubicBezTo>
+                    <a:pt x="1573388" y="602590"/>
+                    <a:pt x="1540927" y="565556"/>
+                    <a:pt x="1518372" y="517093"/>
+                  </a:cubicBezTo>
+                  <a:cubicBezTo>
+                    <a:pt x="1495817" y="468630"/>
+                    <a:pt x="1484539" y="410870"/>
+                    <a:pt x="1484539" y="343814"/>
+                  </a:cubicBezTo>
+                  <a:close/>
+                  <a:moveTo>
+                    <a:pt x="2792436" y="0"/>
+                  </a:moveTo>
+                  <a:cubicBezTo>
+                    <a:pt x="2858273" y="0"/>
+                    <a:pt x="2914966" y="12649"/>
+                    <a:pt x="2962515" y="37948"/>
+                  </a:cubicBezTo>
+                  <a:cubicBezTo>
+                    <a:pt x="3010063" y="63246"/>
+                    <a:pt x="3046487" y="99822"/>
+                    <a:pt x="3071785" y="147676"/>
+                  </a:cubicBezTo>
+                  <a:cubicBezTo>
+                    <a:pt x="3097084" y="195529"/>
+                    <a:pt x="3109733" y="252679"/>
+                    <a:pt x="3109733" y="319126"/>
+                  </a:cubicBezTo>
+                  <a:lnTo>
+                    <a:pt x="3109733" y="651967"/>
+                  </a:lnTo>
+                  <a:lnTo>
+                    <a:pt x="2893934" y="651967"/>
+                  </a:lnTo>
+                  <a:lnTo>
+                    <a:pt x="2893934" y="549554"/>
+                  </a:lnTo>
+                  <a:lnTo>
+                    <a:pt x="2690938" y="549554"/>
+                  </a:lnTo>
+                  <a:lnTo>
+                    <a:pt x="2690938" y="651967"/>
+                  </a:lnTo>
+                  <a:lnTo>
+                    <a:pt x="2475139" y="651967"/>
+                  </a:lnTo>
+                  <a:lnTo>
+                    <a:pt x="2475139" y="319126"/>
+                  </a:lnTo>
+                  <a:cubicBezTo>
+                    <a:pt x="2475139" y="252679"/>
+                    <a:pt x="2487788" y="195529"/>
+                    <a:pt x="2513087" y="147676"/>
+                  </a:cubicBezTo>
+                  <a:cubicBezTo>
+                    <a:pt x="2538385" y="99822"/>
+                    <a:pt x="2574809" y="63246"/>
+                    <a:pt x="2622358" y="37948"/>
+                  </a:cubicBezTo>
+                  <a:cubicBezTo>
+                    <a:pt x="2669907" y="12649"/>
+                    <a:pt x="2726599" y="0"/>
+                    <a:pt x="2792436" y="0"/>
+                  </a:cubicBezTo>
+                  <a:close/>
+                </a:path>
+              </a:pathLst>
+            </a:custGeom>
+            <a:solidFill>
+              <a:schemeClr val="tx1"/>
+            </a:solidFill>
+            <a:ln>
+              <a:noFill/>
+            </a:ln>
+            <a:effectLst/>
+          </p:spPr>
+          <p:txBody>
+            <a:bodyPr rot="0" spcFirstLastPara="0" vertOverflow="overflow" horzOverflow="overflow" vert="horz" wrap="square" lIns="91440" tIns="45720" rIns="91440" bIns="45720" numCol="1" spcCol="0" rtlCol="0" fromWordArt="0" anchor="t" anchorCtr="0" forceAA="0" compatLnSpc="1">
+              <a:prstTxWarp prst="textNoShape">
+                <a:avLst/>
+              </a:prstTxWarp>
+              <a:noAutofit/>
+            </a:bodyPr>
+            <a:lstStyle/>
+            <a:p>
+              <a:endParaRPr lang="en-US" sz="7200" dirty="0">
+                <a:latin typeface="Nura Black" pitchFamily="2" charset="0"/>
+              </a:endParaRPr>
+            </a:p>
+          </p:txBody>
+        </p:sp>
+        <p:sp>
+          <p:nvSpPr>
+            <p:cNvPr id="29" name="Freeform: Shape 28">
+              <a:extLst>
+                <a:ext uri="{FF2B5EF4-FFF2-40B4-BE49-F238E27FC236}">
+                  <a16:creationId xmlns:a16="http://schemas.microsoft.com/office/drawing/2014/main" id="{92F5580B-F9F3-41FF-B3BA-B7C166DC61A2}"/>
+                </a:ext>
+              </a:extLst>
+            </p:cNvPr>
+            <p:cNvSpPr/>
+            <p:nvPr/>
+          </p:nvSpPr>
+          <p:spPr>
+            <a:xfrm>
+              <a:off x="1937640" y="4722345"/>
+              <a:ext cx="2134750" cy="1226918"/>
+            </a:xfrm>
+            <a:custGeom>
+              <a:avLst/>
+              <a:gdLst>
+                <a:gd name="connsiteX0" fmla="*/ 1405669 w 2134750"/>
+                <a:gd name="connsiteY0" fmla="*/ 290932 h 1229300"/>
+                <a:gd name="connsiteX1" fmla="*/ 1405669 w 2134750"/>
+                <a:gd name="connsiteY1" fmla="*/ 687019 h 1229300"/>
+                <a:gd name="connsiteX2" fmla="*/ 1566908 w 2134750"/>
+                <a:gd name="connsiteY2" fmla="*/ 687019 h 1229300"/>
+                <a:gd name="connsiteX3" fmla="*/ 1679950 w 2134750"/>
+                <a:gd name="connsiteY3" fmla="*/ 634441 h 1229300"/>
+                <a:gd name="connsiteX4" fmla="*/ 1721137 w 2134750"/>
+                <a:gd name="connsiteY4" fmla="*/ 490728 h 1229300"/>
+                <a:gd name="connsiteX5" fmla="*/ 1679950 w 2134750"/>
+                <a:gd name="connsiteY5" fmla="*/ 343509 h 1229300"/>
+                <a:gd name="connsiteX6" fmla="*/ 1566908 w 2134750"/>
+                <a:gd name="connsiteY6" fmla="*/ 290932 h 1229300"/>
+                <a:gd name="connsiteX7" fmla="*/ 1405669 w 2134750"/>
+                <a:gd name="connsiteY7" fmla="*/ 290932 h 1229300"/>
+                <a:gd name="connsiteX8" fmla="*/ 992055 w 2134750"/>
+                <a:gd name="connsiteY8" fmla="*/ 0 h 1229300"/>
+                <a:gd name="connsiteX9" fmla="*/ 1714126 w 2134750"/>
+                <a:gd name="connsiteY9" fmla="*/ 0 h 1229300"/>
+                <a:gd name="connsiteX10" fmla="*/ 2023460 w 2134750"/>
+                <a:gd name="connsiteY10" fmla="*/ 129692 h 1229300"/>
+                <a:gd name="connsiteX11" fmla="*/ 2134750 w 2134750"/>
+                <a:gd name="connsiteY11" fmla="*/ 490728 h 1229300"/>
+                <a:gd name="connsiteX12" fmla="*/ 2023460 w 2134750"/>
+                <a:gd name="connsiteY12" fmla="*/ 849134 h 1229300"/>
+                <a:gd name="connsiteX13" fmla="*/ 1714126 w 2134750"/>
+                <a:gd name="connsiteY13" fmla="*/ 977951 h 1229300"/>
+                <a:gd name="connsiteX14" fmla="*/ 1405669 w 2134750"/>
+                <a:gd name="connsiteY14" fmla="*/ 977951 h 1229300"/>
+                <a:gd name="connsiteX15" fmla="*/ 1405669 w 2134750"/>
+                <a:gd name="connsiteY15" fmla="*/ 1226820 h 1229300"/>
+                <a:gd name="connsiteX16" fmla="*/ 1070063 w 2134750"/>
+                <a:gd name="connsiteY16" fmla="*/ 1226820 h 1229300"/>
+                <a:gd name="connsiteX17" fmla="*/ 0 w 2134750"/>
+                <a:gd name="connsiteY17" fmla="*/ 1229300 h 1229300"/>
+                <a:gd name="connsiteX18" fmla="*/ 0 w 2134750"/>
+                <a:gd name="connsiteY18" fmla="*/ 960852 h 1229300"/>
+                <a:gd name="connsiteX19" fmla="*/ 992055 w 2134750"/>
+                <a:gd name="connsiteY19" fmla="*/ 960852 h 1229300"/>
+                <a:gd name="connsiteX20" fmla="*/ 992055 w 2134750"/>
+                <a:gd name="connsiteY20" fmla="*/ 0 h 1229300"/>
+                <a:gd name="connsiteX0" fmla="*/ 1405669 w 2134750"/>
+                <a:gd name="connsiteY0" fmla="*/ 290932 h 1229300"/>
+                <a:gd name="connsiteX1" fmla="*/ 1405669 w 2134750"/>
+                <a:gd name="connsiteY1" fmla="*/ 687019 h 1229300"/>
+                <a:gd name="connsiteX2" fmla="*/ 1566908 w 2134750"/>
+                <a:gd name="connsiteY2" fmla="*/ 687019 h 1229300"/>
+                <a:gd name="connsiteX3" fmla="*/ 1679950 w 2134750"/>
+                <a:gd name="connsiteY3" fmla="*/ 634441 h 1229300"/>
+                <a:gd name="connsiteX4" fmla="*/ 1721137 w 2134750"/>
+                <a:gd name="connsiteY4" fmla="*/ 490728 h 1229300"/>
+                <a:gd name="connsiteX5" fmla="*/ 1679950 w 2134750"/>
+                <a:gd name="connsiteY5" fmla="*/ 343509 h 1229300"/>
+                <a:gd name="connsiteX6" fmla="*/ 1566908 w 2134750"/>
+                <a:gd name="connsiteY6" fmla="*/ 290932 h 1229300"/>
+                <a:gd name="connsiteX7" fmla="*/ 1405669 w 2134750"/>
+                <a:gd name="connsiteY7" fmla="*/ 290932 h 1229300"/>
+                <a:gd name="connsiteX8" fmla="*/ 992055 w 2134750"/>
+                <a:gd name="connsiteY8" fmla="*/ 0 h 1229300"/>
+                <a:gd name="connsiteX9" fmla="*/ 1714126 w 2134750"/>
+                <a:gd name="connsiteY9" fmla="*/ 0 h 1229300"/>
+                <a:gd name="connsiteX10" fmla="*/ 2023460 w 2134750"/>
+                <a:gd name="connsiteY10" fmla="*/ 129692 h 1229300"/>
+                <a:gd name="connsiteX11" fmla="*/ 2134750 w 2134750"/>
+                <a:gd name="connsiteY11" fmla="*/ 490728 h 1229300"/>
+                <a:gd name="connsiteX12" fmla="*/ 2023460 w 2134750"/>
+                <a:gd name="connsiteY12" fmla="*/ 849134 h 1229300"/>
+                <a:gd name="connsiteX13" fmla="*/ 1714126 w 2134750"/>
+                <a:gd name="connsiteY13" fmla="*/ 977951 h 1229300"/>
+                <a:gd name="connsiteX14" fmla="*/ 1405669 w 2134750"/>
+                <a:gd name="connsiteY14" fmla="*/ 977951 h 1229300"/>
+                <a:gd name="connsiteX15" fmla="*/ 1405669 w 2134750"/>
+                <a:gd name="connsiteY15" fmla="*/ 1226820 h 1229300"/>
+                <a:gd name="connsiteX16" fmla="*/ 0 w 2134750"/>
+                <a:gd name="connsiteY16" fmla="*/ 1229300 h 1229300"/>
+                <a:gd name="connsiteX17" fmla="*/ 0 w 2134750"/>
+                <a:gd name="connsiteY17" fmla="*/ 960852 h 1229300"/>
+                <a:gd name="connsiteX18" fmla="*/ 992055 w 2134750"/>
+                <a:gd name="connsiteY18" fmla="*/ 960852 h 1229300"/>
+                <a:gd name="connsiteX19" fmla="*/ 992055 w 2134750"/>
+                <a:gd name="connsiteY19" fmla="*/ 0 h 1229300"/>
+                <a:gd name="connsiteX0" fmla="*/ 1405669 w 2134750"/>
+                <a:gd name="connsiteY0" fmla="*/ 290932 h 1226820"/>
+                <a:gd name="connsiteX1" fmla="*/ 1405669 w 2134750"/>
+                <a:gd name="connsiteY1" fmla="*/ 687019 h 1226820"/>
+                <a:gd name="connsiteX2" fmla="*/ 1566908 w 2134750"/>
+                <a:gd name="connsiteY2" fmla="*/ 687019 h 1226820"/>
+                <a:gd name="connsiteX3" fmla="*/ 1679950 w 2134750"/>
+                <a:gd name="connsiteY3" fmla="*/ 634441 h 1226820"/>
+                <a:gd name="connsiteX4" fmla="*/ 1721137 w 2134750"/>
+                <a:gd name="connsiteY4" fmla="*/ 490728 h 1226820"/>
+                <a:gd name="connsiteX5" fmla="*/ 1679950 w 2134750"/>
+                <a:gd name="connsiteY5" fmla="*/ 343509 h 1226820"/>
+                <a:gd name="connsiteX6" fmla="*/ 1566908 w 2134750"/>
+                <a:gd name="connsiteY6" fmla="*/ 290932 h 1226820"/>
+                <a:gd name="connsiteX7" fmla="*/ 1405669 w 2134750"/>
+                <a:gd name="connsiteY7" fmla="*/ 290932 h 1226820"/>
+                <a:gd name="connsiteX8" fmla="*/ 992055 w 2134750"/>
+                <a:gd name="connsiteY8" fmla="*/ 0 h 1226820"/>
+                <a:gd name="connsiteX9" fmla="*/ 1714126 w 2134750"/>
+                <a:gd name="connsiteY9" fmla="*/ 0 h 1226820"/>
+                <a:gd name="connsiteX10" fmla="*/ 2023460 w 2134750"/>
+                <a:gd name="connsiteY10" fmla="*/ 129692 h 1226820"/>
+                <a:gd name="connsiteX11" fmla="*/ 2134750 w 2134750"/>
+                <a:gd name="connsiteY11" fmla="*/ 490728 h 1226820"/>
+                <a:gd name="connsiteX12" fmla="*/ 2023460 w 2134750"/>
+                <a:gd name="connsiteY12" fmla="*/ 849134 h 1226820"/>
+                <a:gd name="connsiteX13" fmla="*/ 1714126 w 2134750"/>
+                <a:gd name="connsiteY13" fmla="*/ 977951 h 1226820"/>
+                <a:gd name="connsiteX14" fmla="*/ 1405669 w 2134750"/>
+                <a:gd name="connsiteY14" fmla="*/ 977951 h 1226820"/>
+                <a:gd name="connsiteX15" fmla="*/ 1405669 w 2134750"/>
+                <a:gd name="connsiteY15" fmla="*/ 1226820 h 1226820"/>
+                <a:gd name="connsiteX16" fmla="*/ 0 w 2134750"/>
+                <a:gd name="connsiteY16" fmla="*/ 1222156 h 1226820"/>
+                <a:gd name="connsiteX17" fmla="*/ 0 w 2134750"/>
+                <a:gd name="connsiteY17" fmla="*/ 960852 h 1226820"/>
+                <a:gd name="connsiteX18" fmla="*/ 992055 w 2134750"/>
+                <a:gd name="connsiteY18" fmla="*/ 960852 h 1226820"/>
+                <a:gd name="connsiteX19" fmla="*/ 992055 w 2134750"/>
+                <a:gd name="connsiteY19" fmla="*/ 0 h 1226820"/>
+                <a:gd name="connsiteX0" fmla="*/ 1405669 w 2134750"/>
+                <a:gd name="connsiteY0" fmla="*/ 290932 h 1226918"/>
+                <a:gd name="connsiteX1" fmla="*/ 1405669 w 2134750"/>
+                <a:gd name="connsiteY1" fmla="*/ 687019 h 1226918"/>
+                <a:gd name="connsiteX2" fmla="*/ 1566908 w 2134750"/>
+                <a:gd name="connsiteY2" fmla="*/ 687019 h 1226918"/>
+                <a:gd name="connsiteX3" fmla="*/ 1679950 w 2134750"/>
+                <a:gd name="connsiteY3" fmla="*/ 634441 h 1226918"/>
+                <a:gd name="connsiteX4" fmla="*/ 1721137 w 2134750"/>
+                <a:gd name="connsiteY4" fmla="*/ 490728 h 1226918"/>
+                <a:gd name="connsiteX5" fmla="*/ 1679950 w 2134750"/>
+                <a:gd name="connsiteY5" fmla="*/ 343509 h 1226918"/>
+                <a:gd name="connsiteX6" fmla="*/ 1566908 w 2134750"/>
+                <a:gd name="connsiteY6" fmla="*/ 290932 h 1226918"/>
+                <a:gd name="connsiteX7" fmla="*/ 1405669 w 2134750"/>
+                <a:gd name="connsiteY7" fmla="*/ 290932 h 1226918"/>
+                <a:gd name="connsiteX8" fmla="*/ 992055 w 2134750"/>
+                <a:gd name="connsiteY8" fmla="*/ 0 h 1226918"/>
+                <a:gd name="connsiteX9" fmla="*/ 1714126 w 2134750"/>
+                <a:gd name="connsiteY9" fmla="*/ 0 h 1226918"/>
+                <a:gd name="connsiteX10" fmla="*/ 2023460 w 2134750"/>
+                <a:gd name="connsiteY10" fmla="*/ 129692 h 1226918"/>
+                <a:gd name="connsiteX11" fmla="*/ 2134750 w 2134750"/>
+                <a:gd name="connsiteY11" fmla="*/ 490728 h 1226918"/>
+                <a:gd name="connsiteX12" fmla="*/ 2023460 w 2134750"/>
+                <a:gd name="connsiteY12" fmla="*/ 849134 h 1226918"/>
+                <a:gd name="connsiteX13" fmla="*/ 1714126 w 2134750"/>
+                <a:gd name="connsiteY13" fmla="*/ 977951 h 1226918"/>
+                <a:gd name="connsiteX14" fmla="*/ 1405669 w 2134750"/>
+                <a:gd name="connsiteY14" fmla="*/ 977951 h 1226918"/>
+                <a:gd name="connsiteX15" fmla="*/ 1405669 w 2134750"/>
+                <a:gd name="connsiteY15" fmla="*/ 1226820 h 1226918"/>
+                <a:gd name="connsiteX16" fmla="*/ 0 w 2134750"/>
+                <a:gd name="connsiteY16" fmla="*/ 1226918 h 1226918"/>
+                <a:gd name="connsiteX17" fmla="*/ 0 w 2134750"/>
+                <a:gd name="connsiteY17" fmla="*/ 960852 h 1226918"/>
+                <a:gd name="connsiteX18" fmla="*/ 992055 w 2134750"/>
+                <a:gd name="connsiteY18" fmla="*/ 960852 h 1226918"/>
+                <a:gd name="connsiteX19" fmla="*/ 992055 w 2134750"/>
+                <a:gd name="connsiteY19" fmla="*/ 0 h 1226918"/>
+              </a:gdLst>
+              <a:ahLst/>
+              <a:cxnLst>
+                <a:cxn ang="0">
+                  <a:pos x="connsiteX0" y="connsiteY0"/>
+                </a:cxn>
+                <a:cxn ang="0">
+                  <a:pos x="connsiteX1" y="connsiteY1"/>
+                </a:cxn>
+                <a:cxn ang="0">
+                  <a:pos x="connsiteX2" y="connsiteY2"/>
+                </a:cxn>
+                <a:cxn ang="0">
+                  <a:pos x="connsiteX3" y="connsiteY3"/>
+                </a:cxn>
+                <a:cxn ang="0">
+                  <a:pos x="connsiteX4" y="connsiteY4"/>
+                </a:cxn>
+                <a:cxn ang="0">
+                  <a:pos x="connsiteX5" y="connsiteY5"/>
+                </a:cxn>
+                <a:cxn ang="0">
+                  <a:pos x="connsiteX6" y="connsiteY6"/>
+                </a:cxn>
+                <a:cxn ang="0">
+                  <a:pos x="connsiteX7" y="connsiteY7"/>
+                </a:cxn>
+                <a:cxn ang="0">
+                  <a:pos x="connsiteX8" y="connsiteY8"/>
+                </a:cxn>
+                <a:cxn ang="0">
+                  <a:pos x="connsiteX9" y="connsiteY9"/>
+                </a:cxn>
+                <a:cxn ang="0">
+                  <a:pos x="connsiteX10" y="connsiteY10"/>
+                </a:cxn>
+                <a:cxn ang="0">
+                  <a:pos x="connsiteX11" y="connsiteY11"/>
+                </a:cxn>
+                <a:cxn ang="0">
+                  <a:pos x="connsiteX12" y="connsiteY12"/>
+                </a:cxn>
+                <a:cxn ang="0">
+                  <a:pos x="connsiteX13" y="connsiteY13"/>
+                </a:cxn>
+                <a:cxn ang="0">
+                  <a:pos x="connsiteX14" y="connsiteY14"/>
+                </a:cxn>
+                <a:cxn ang="0">
+                  <a:pos x="connsiteX15" y="connsiteY15"/>
+                </a:cxn>
+                <a:cxn ang="0">
+                  <a:pos x="connsiteX16" y="connsiteY16"/>
+                </a:cxn>
+                <a:cxn ang="0">
+                  <a:pos x="connsiteX17" y="connsiteY17"/>
+                </a:cxn>
+                <a:cxn ang="0">
+                  <a:pos x="connsiteX18" y="connsiteY18"/>
+                </a:cxn>
+                <a:cxn ang="0">
+                  <a:pos x="connsiteX19" y="connsiteY19"/>
+                </a:cxn>
+              </a:cxnLst>
+              <a:rect l="l" t="t" r="r" b="b"/>
+              <a:pathLst>
+                <a:path w="2134750" h="1226918">
+                  <a:moveTo>
+                    <a:pt x="1405669" y="290932"/>
+                  </a:moveTo>
+                  <a:lnTo>
+                    <a:pt x="1405669" y="687019"/>
+                  </a:lnTo>
+                  <a:lnTo>
+                    <a:pt x="1566908" y="687019"/>
+                  </a:lnTo>
+                  <a:cubicBezTo>
+                    <a:pt x="1614812" y="687019"/>
+                    <a:pt x="1652493" y="669493"/>
+                    <a:pt x="1679950" y="634441"/>
+                  </a:cubicBezTo>
+                  <a:cubicBezTo>
+                    <a:pt x="1707408" y="599389"/>
+                    <a:pt x="1721137" y="551485"/>
+                    <a:pt x="1721137" y="490728"/>
+                  </a:cubicBezTo>
+                  <a:cubicBezTo>
+                    <a:pt x="1721137" y="427634"/>
+                    <a:pt x="1707408" y="378561"/>
+                    <a:pt x="1679950" y="343509"/>
+                  </a:cubicBezTo>
+                  <a:cubicBezTo>
+                    <a:pt x="1652493" y="308457"/>
+                    <a:pt x="1614812" y="290932"/>
+                    <a:pt x="1566908" y="290932"/>
+                  </a:cubicBezTo>
+                  <a:lnTo>
+                    <a:pt x="1405669" y="290932"/>
+                  </a:lnTo>
+                  <a:close/>
+                  <a:moveTo>
+                    <a:pt x="992055" y="0"/>
+                  </a:moveTo>
+                  <a:lnTo>
+                    <a:pt x="1714126" y="0"/>
+                  </a:lnTo>
+                  <a:cubicBezTo>
+                    <a:pt x="1846155" y="0"/>
+                    <a:pt x="1949267" y="43231"/>
+                    <a:pt x="2023460" y="129692"/>
+                  </a:cubicBezTo>
+                  <a:cubicBezTo>
+                    <a:pt x="2097653" y="216154"/>
+                    <a:pt x="2134750" y="336499"/>
+                    <a:pt x="2134750" y="490728"/>
+                  </a:cubicBezTo>
+                  <a:cubicBezTo>
+                    <a:pt x="2134750" y="643788"/>
+                    <a:pt x="2097653" y="763257"/>
+                    <a:pt x="2023460" y="849134"/>
+                  </a:cubicBezTo>
+                  <a:cubicBezTo>
+                    <a:pt x="1949267" y="935012"/>
+                    <a:pt x="1846155" y="977951"/>
+                    <a:pt x="1714126" y="977951"/>
+                  </a:cubicBezTo>
+                  <a:lnTo>
+                    <a:pt x="1405669" y="977951"/>
+                  </a:lnTo>
+                  <a:lnTo>
+                    <a:pt x="1405669" y="1226820"/>
+                  </a:lnTo>
+                  <a:lnTo>
+                    <a:pt x="0" y="1226918"/>
+                  </a:lnTo>
+                  <a:lnTo>
+                    <a:pt x="0" y="960852"/>
+                  </a:lnTo>
+                  <a:lnTo>
+                    <a:pt x="992055" y="960852"/>
+                  </a:lnTo>
+                  <a:lnTo>
+                    <a:pt x="992055" y="0"/>
+                  </a:lnTo>
+                  <a:close/>
+                </a:path>
+              </a:pathLst>
+            </a:custGeom>
+            <a:solidFill>
+              <a:schemeClr val="tx1"/>
+            </a:solidFill>
+            <a:ln>
+              <a:noFill/>
+            </a:ln>
+          </p:spPr>
+          <p:style>
+            <a:lnRef idx="2">
+              <a:schemeClr val="accent1">
+                <a:shade val="50000"/>
+              </a:schemeClr>
+            </a:lnRef>
+            <a:fillRef idx="1">
+              <a:schemeClr val="accent1"/>
+            </a:fillRef>
+            <a:effectRef idx="0">
+              <a:schemeClr val="accent1"/>
+            </a:effectRef>
+            <a:fontRef idx="minor">
+              <a:schemeClr val="lt1"/>
+            </a:fontRef>
+          </p:style>
+          <p:txBody>
+            <a:bodyPr wrap="square" rtlCol="0" anchor="ctr">
+              <a:noAutofit/>
+            </a:bodyPr>
+            <a:lstStyle/>
+            <a:p>
+              <a:pPr algn="ctr"/>
+              <a:endParaRPr lang="en-US"/>
+            </a:p>
+          </p:txBody>
+        </p:sp>
+      </p:grpSp>
+      <p:sp>
+        <p:nvSpPr>
+          <p:cNvPr id="30" name="Arrow: Up 29">
+            <a:extLst>
+              <a:ext uri="{FF2B5EF4-FFF2-40B4-BE49-F238E27FC236}">
+                <a16:creationId xmlns:a16="http://schemas.microsoft.com/office/drawing/2014/main" id="{EBA33DE8-3C49-C50A-7E4F-B229F659FBA7}"/>
+              </a:ext>
+            </a:extLst>
+          </p:cNvPr>
+          <p:cNvSpPr/>
+          <p:nvPr/>
+        </p:nvSpPr>
+        <p:spPr>
+          <a:xfrm>
+            <a:off x="5034055" y="615564"/>
+            <a:ext cx="989901" cy="1362963"/>
+          </a:xfrm>
+          <a:prstGeom prst="upArrow">
+            <a:avLst>
+              <a:gd name="adj1" fmla="val 52581"/>
+              <a:gd name="adj2" fmla="val 60140"/>
+            </a:avLst>
+          </a:prstGeom>
+          <a:solidFill>
+            <a:schemeClr val="tx1"/>
+          </a:solidFill>
+          <a:ln>
+            <a:noFill/>
+          </a:ln>
+        </p:spPr>
+        <p:style>
+          <a:lnRef idx="2">
+            <a:schemeClr val="accent1">
+              <a:shade val="50000"/>
+            </a:schemeClr>
+          </a:lnRef>
+          <a:fillRef idx="1">
+            <a:schemeClr val="accent1"/>
+          </a:fillRef>
+          <a:effectRef idx="0">
+            <a:schemeClr val="accent1"/>
+          </a:effectRef>
+          <a:fontRef idx="minor">
+            <a:schemeClr val="lt1"/>
+          </a:fontRef>
+        </p:style>
+        <p:txBody>
+          <a:bodyPr rtlCol="0" anchor="ctr"/>
+          <a:lstStyle/>
+          <a:p>
+            <a:pPr algn="ctr"/>
+            <a:endParaRPr lang="en-US"/>
+          </a:p>
+        </p:txBody>
+      </p:sp>
+      <p:sp>
+        <p:nvSpPr>
+          <p:cNvPr id="32" name="TextBox 31">
+            <a:extLst>
+              <a:ext uri="{FF2B5EF4-FFF2-40B4-BE49-F238E27FC236}">
+                <a16:creationId xmlns:a16="http://schemas.microsoft.com/office/drawing/2014/main" id="{3A5B2AC6-B41E-A35C-23BF-D85FD7DDECD6}"/>
+              </a:ext>
+            </a:extLst>
+          </p:cNvPr>
+          <p:cNvSpPr txBox="1"/>
+          <p:nvPr/>
+        </p:nvSpPr>
+        <p:spPr>
+          <a:xfrm>
+            <a:off x="5789771" y="172623"/>
+            <a:ext cx="2627642" cy="1200329"/>
+          </a:xfrm>
+          <a:prstGeom prst="rect">
+            <a:avLst/>
+          </a:prstGeom>
+        </p:spPr>
+        <p:txBody>
+          <a:bodyPr wrap="none" rtlCol="0">
+            <a:spAutoFit/>
+          </a:bodyPr>
+          <a:lstStyle/>
+          <a:p>
+            <a:r>
+              <a:rPr lang="en-ZA" sz="7200" dirty="0">
+                <a:latin typeface="Nura Black" pitchFamily="2" charset="0"/>
+              </a:rPr>
+              <a:t>WAY</a:t>
+            </a:r>
+            <a:endParaRPr lang="en-US" sz="7200" dirty="0">
+              <a:latin typeface="Nura Black" pitchFamily="2" charset="0"/>
+            </a:endParaRPr>
+          </a:p>
+        </p:txBody>
+      </p:sp>
+      <p:sp>
+        <p:nvSpPr>
+          <p:cNvPr id="38" name="TextBox 37">
+            <a:extLst>
+              <a:ext uri="{FF2B5EF4-FFF2-40B4-BE49-F238E27FC236}">
+                <a16:creationId xmlns:a16="http://schemas.microsoft.com/office/drawing/2014/main" id="{4FFBCFFB-17FE-72B3-AEC4-C58BC2992D58}"/>
+              </a:ext>
+            </a:extLst>
+          </p:cNvPr>
+          <p:cNvSpPr txBox="1"/>
+          <p:nvPr/>
+        </p:nvSpPr>
+        <p:spPr>
+          <a:xfrm rot="16200000">
+            <a:off x="3582337" y="948062"/>
+            <a:ext cx="2193229" cy="1015663"/>
+          </a:xfrm>
+          <a:prstGeom prst="rect">
+            <a:avLst/>
+          </a:prstGeom>
+          <a:noFill/>
+        </p:spPr>
+        <p:txBody>
+          <a:bodyPr wrap="none" rtlCol="0">
+            <a:spAutoFit/>
+          </a:bodyPr>
+          <a:lstStyle/>
+          <a:p>
+            <a:r>
+              <a:rPr lang="en-ZA" sz="6000" dirty="0">
+                <a:latin typeface="Nura Black" pitchFamily="2" charset="0"/>
+              </a:rPr>
+              <a:t>THIS</a:t>
+            </a:r>
+            <a:endParaRPr lang="en-US" sz="6000" dirty="0">
+              <a:latin typeface="Nura Black" pitchFamily="2" charset="0"/>
+            </a:endParaRPr>
+          </a:p>
+        </p:txBody>
+      </p:sp>
+      <p:sp>
+        <p:nvSpPr>
+          <p:cNvPr id="39" name="Freeform: Shape 38">
+            <a:extLst>
+              <a:ext uri="{FF2B5EF4-FFF2-40B4-BE49-F238E27FC236}">
+                <a16:creationId xmlns:a16="http://schemas.microsoft.com/office/drawing/2014/main" id="{18902F83-0D3D-09D9-92C9-B8A909623B3D}"/>
+              </a:ext>
+            </a:extLst>
+          </p:cNvPr>
+          <p:cNvSpPr/>
+          <p:nvPr/>
+        </p:nvSpPr>
+        <p:spPr>
+          <a:xfrm>
+            <a:off x="5028625" y="1215134"/>
+            <a:ext cx="2134750" cy="1226918"/>
+          </a:xfrm>
+          <a:custGeom>
+            <a:avLst/>
+            <a:gdLst>
+              <a:gd name="connsiteX0" fmla="*/ 1405669 w 2134750"/>
+              <a:gd name="connsiteY0" fmla="*/ 290932 h 1229300"/>
+              <a:gd name="connsiteX1" fmla="*/ 1405669 w 2134750"/>
+              <a:gd name="connsiteY1" fmla="*/ 687019 h 1229300"/>
+              <a:gd name="connsiteX2" fmla="*/ 1566908 w 2134750"/>
+              <a:gd name="connsiteY2" fmla="*/ 687019 h 1229300"/>
+              <a:gd name="connsiteX3" fmla="*/ 1679950 w 2134750"/>
+              <a:gd name="connsiteY3" fmla="*/ 634441 h 1229300"/>
+              <a:gd name="connsiteX4" fmla="*/ 1721137 w 2134750"/>
+              <a:gd name="connsiteY4" fmla="*/ 490728 h 1229300"/>
+              <a:gd name="connsiteX5" fmla="*/ 1679950 w 2134750"/>
+              <a:gd name="connsiteY5" fmla="*/ 343509 h 1229300"/>
+              <a:gd name="connsiteX6" fmla="*/ 1566908 w 2134750"/>
+              <a:gd name="connsiteY6" fmla="*/ 290932 h 1229300"/>
+              <a:gd name="connsiteX7" fmla="*/ 1405669 w 2134750"/>
+              <a:gd name="connsiteY7" fmla="*/ 290932 h 1229300"/>
+              <a:gd name="connsiteX8" fmla="*/ 992055 w 2134750"/>
+              <a:gd name="connsiteY8" fmla="*/ 0 h 1229300"/>
+              <a:gd name="connsiteX9" fmla="*/ 1714126 w 2134750"/>
+              <a:gd name="connsiteY9" fmla="*/ 0 h 1229300"/>
+              <a:gd name="connsiteX10" fmla="*/ 2023460 w 2134750"/>
+              <a:gd name="connsiteY10" fmla="*/ 129692 h 1229300"/>
+              <a:gd name="connsiteX11" fmla="*/ 2134750 w 2134750"/>
+              <a:gd name="connsiteY11" fmla="*/ 490728 h 1229300"/>
+              <a:gd name="connsiteX12" fmla="*/ 2023460 w 2134750"/>
+              <a:gd name="connsiteY12" fmla="*/ 849134 h 1229300"/>
+              <a:gd name="connsiteX13" fmla="*/ 1714126 w 2134750"/>
+              <a:gd name="connsiteY13" fmla="*/ 977951 h 1229300"/>
+              <a:gd name="connsiteX14" fmla="*/ 1405669 w 2134750"/>
+              <a:gd name="connsiteY14" fmla="*/ 977951 h 1229300"/>
+              <a:gd name="connsiteX15" fmla="*/ 1405669 w 2134750"/>
+              <a:gd name="connsiteY15" fmla="*/ 1226820 h 1229300"/>
+              <a:gd name="connsiteX16" fmla="*/ 1070063 w 2134750"/>
+              <a:gd name="connsiteY16" fmla="*/ 1226820 h 1229300"/>
+              <a:gd name="connsiteX17" fmla="*/ 0 w 2134750"/>
+              <a:gd name="connsiteY17" fmla="*/ 1229300 h 1229300"/>
+              <a:gd name="connsiteX18" fmla="*/ 0 w 2134750"/>
+              <a:gd name="connsiteY18" fmla="*/ 960852 h 1229300"/>
+              <a:gd name="connsiteX19" fmla="*/ 992055 w 2134750"/>
+              <a:gd name="connsiteY19" fmla="*/ 960852 h 1229300"/>
+              <a:gd name="connsiteX20" fmla="*/ 992055 w 2134750"/>
+              <a:gd name="connsiteY20" fmla="*/ 0 h 1229300"/>
+              <a:gd name="connsiteX0" fmla="*/ 1405669 w 2134750"/>
+              <a:gd name="connsiteY0" fmla="*/ 290932 h 1229300"/>
+              <a:gd name="connsiteX1" fmla="*/ 1405669 w 2134750"/>
+              <a:gd name="connsiteY1" fmla="*/ 687019 h 1229300"/>
+              <a:gd name="connsiteX2" fmla="*/ 1566908 w 2134750"/>
+              <a:gd name="connsiteY2" fmla="*/ 687019 h 1229300"/>
+              <a:gd name="connsiteX3" fmla="*/ 1679950 w 2134750"/>
+              <a:gd name="connsiteY3" fmla="*/ 634441 h 1229300"/>
+              <a:gd name="connsiteX4" fmla="*/ 1721137 w 2134750"/>
+              <a:gd name="connsiteY4" fmla="*/ 490728 h 1229300"/>
+              <a:gd name="connsiteX5" fmla="*/ 1679950 w 2134750"/>
+              <a:gd name="connsiteY5" fmla="*/ 343509 h 1229300"/>
+              <a:gd name="connsiteX6" fmla="*/ 1566908 w 2134750"/>
+              <a:gd name="connsiteY6" fmla="*/ 290932 h 1229300"/>
+              <a:gd name="connsiteX7" fmla="*/ 1405669 w 2134750"/>
+              <a:gd name="connsiteY7" fmla="*/ 290932 h 1229300"/>
+              <a:gd name="connsiteX8" fmla="*/ 992055 w 2134750"/>
+              <a:gd name="connsiteY8" fmla="*/ 0 h 1229300"/>
+              <a:gd name="connsiteX9" fmla="*/ 1714126 w 2134750"/>
+              <a:gd name="connsiteY9" fmla="*/ 0 h 1229300"/>
+              <a:gd name="connsiteX10" fmla="*/ 2023460 w 2134750"/>
+              <a:gd name="connsiteY10" fmla="*/ 129692 h 1229300"/>
+              <a:gd name="connsiteX11" fmla="*/ 2134750 w 2134750"/>
+              <a:gd name="connsiteY11" fmla="*/ 490728 h 1229300"/>
+              <a:gd name="connsiteX12" fmla="*/ 2023460 w 2134750"/>
+              <a:gd name="connsiteY12" fmla="*/ 849134 h 1229300"/>
+              <a:gd name="connsiteX13" fmla="*/ 1714126 w 2134750"/>
+              <a:gd name="connsiteY13" fmla="*/ 977951 h 1229300"/>
+              <a:gd name="connsiteX14" fmla="*/ 1405669 w 2134750"/>
+              <a:gd name="connsiteY14" fmla="*/ 977951 h 1229300"/>
+              <a:gd name="connsiteX15" fmla="*/ 1405669 w 2134750"/>
+              <a:gd name="connsiteY15" fmla="*/ 1226820 h 1229300"/>
+              <a:gd name="connsiteX16" fmla="*/ 0 w 2134750"/>
+              <a:gd name="connsiteY16" fmla="*/ 1229300 h 1229300"/>
+              <a:gd name="connsiteX17" fmla="*/ 0 w 2134750"/>
+              <a:gd name="connsiteY17" fmla="*/ 960852 h 1229300"/>
+              <a:gd name="connsiteX18" fmla="*/ 992055 w 2134750"/>
+              <a:gd name="connsiteY18" fmla="*/ 960852 h 1229300"/>
+              <a:gd name="connsiteX19" fmla="*/ 992055 w 2134750"/>
+              <a:gd name="connsiteY19" fmla="*/ 0 h 1229300"/>
+              <a:gd name="connsiteX0" fmla="*/ 1405669 w 2134750"/>
+              <a:gd name="connsiteY0" fmla="*/ 290932 h 1226820"/>
+              <a:gd name="connsiteX1" fmla="*/ 1405669 w 2134750"/>
+              <a:gd name="connsiteY1" fmla="*/ 687019 h 1226820"/>
+              <a:gd name="connsiteX2" fmla="*/ 1566908 w 2134750"/>
+              <a:gd name="connsiteY2" fmla="*/ 687019 h 1226820"/>
+              <a:gd name="connsiteX3" fmla="*/ 1679950 w 2134750"/>
+              <a:gd name="connsiteY3" fmla="*/ 634441 h 1226820"/>
+              <a:gd name="connsiteX4" fmla="*/ 1721137 w 2134750"/>
+              <a:gd name="connsiteY4" fmla="*/ 490728 h 1226820"/>
+              <a:gd name="connsiteX5" fmla="*/ 1679950 w 2134750"/>
+              <a:gd name="connsiteY5" fmla="*/ 343509 h 1226820"/>
+              <a:gd name="connsiteX6" fmla="*/ 1566908 w 2134750"/>
+              <a:gd name="connsiteY6" fmla="*/ 290932 h 1226820"/>
+              <a:gd name="connsiteX7" fmla="*/ 1405669 w 2134750"/>
+              <a:gd name="connsiteY7" fmla="*/ 290932 h 1226820"/>
+              <a:gd name="connsiteX8" fmla="*/ 992055 w 2134750"/>
+              <a:gd name="connsiteY8" fmla="*/ 0 h 1226820"/>
+              <a:gd name="connsiteX9" fmla="*/ 1714126 w 2134750"/>
+              <a:gd name="connsiteY9" fmla="*/ 0 h 1226820"/>
+              <a:gd name="connsiteX10" fmla="*/ 2023460 w 2134750"/>
+              <a:gd name="connsiteY10" fmla="*/ 129692 h 1226820"/>
+              <a:gd name="connsiteX11" fmla="*/ 2134750 w 2134750"/>
+              <a:gd name="connsiteY11" fmla="*/ 490728 h 1226820"/>
+              <a:gd name="connsiteX12" fmla="*/ 2023460 w 2134750"/>
+              <a:gd name="connsiteY12" fmla="*/ 849134 h 1226820"/>
+              <a:gd name="connsiteX13" fmla="*/ 1714126 w 2134750"/>
+              <a:gd name="connsiteY13" fmla="*/ 977951 h 1226820"/>
+              <a:gd name="connsiteX14" fmla="*/ 1405669 w 2134750"/>
+              <a:gd name="connsiteY14" fmla="*/ 977951 h 1226820"/>
+              <a:gd name="connsiteX15" fmla="*/ 1405669 w 2134750"/>
+              <a:gd name="connsiteY15" fmla="*/ 1226820 h 1226820"/>
+              <a:gd name="connsiteX16" fmla="*/ 0 w 2134750"/>
+              <a:gd name="connsiteY16" fmla="*/ 1222156 h 1226820"/>
+              <a:gd name="connsiteX17" fmla="*/ 0 w 2134750"/>
+              <a:gd name="connsiteY17" fmla="*/ 960852 h 1226820"/>
+              <a:gd name="connsiteX18" fmla="*/ 992055 w 2134750"/>
+              <a:gd name="connsiteY18" fmla="*/ 960852 h 1226820"/>
+              <a:gd name="connsiteX19" fmla="*/ 992055 w 2134750"/>
+              <a:gd name="connsiteY19" fmla="*/ 0 h 1226820"/>
+              <a:gd name="connsiteX0" fmla="*/ 1405669 w 2134750"/>
+              <a:gd name="connsiteY0" fmla="*/ 290932 h 1226918"/>
+              <a:gd name="connsiteX1" fmla="*/ 1405669 w 2134750"/>
+              <a:gd name="connsiteY1" fmla="*/ 687019 h 1226918"/>
+              <a:gd name="connsiteX2" fmla="*/ 1566908 w 2134750"/>
+              <a:gd name="connsiteY2" fmla="*/ 687019 h 1226918"/>
+              <a:gd name="connsiteX3" fmla="*/ 1679950 w 2134750"/>
+              <a:gd name="connsiteY3" fmla="*/ 634441 h 1226918"/>
+              <a:gd name="connsiteX4" fmla="*/ 1721137 w 2134750"/>
+              <a:gd name="connsiteY4" fmla="*/ 490728 h 1226918"/>
+              <a:gd name="connsiteX5" fmla="*/ 1679950 w 2134750"/>
+              <a:gd name="connsiteY5" fmla="*/ 343509 h 1226918"/>
+              <a:gd name="connsiteX6" fmla="*/ 1566908 w 2134750"/>
+              <a:gd name="connsiteY6" fmla="*/ 290932 h 1226918"/>
+              <a:gd name="connsiteX7" fmla="*/ 1405669 w 2134750"/>
+              <a:gd name="connsiteY7" fmla="*/ 290932 h 1226918"/>
+              <a:gd name="connsiteX8" fmla="*/ 992055 w 2134750"/>
+              <a:gd name="connsiteY8" fmla="*/ 0 h 1226918"/>
+              <a:gd name="connsiteX9" fmla="*/ 1714126 w 2134750"/>
+              <a:gd name="connsiteY9" fmla="*/ 0 h 1226918"/>
+              <a:gd name="connsiteX10" fmla="*/ 2023460 w 2134750"/>
+              <a:gd name="connsiteY10" fmla="*/ 129692 h 1226918"/>
+              <a:gd name="connsiteX11" fmla="*/ 2134750 w 2134750"/>
+              <a:gd name="connsiteY11" fmla="*/ 490728 h 1226918"/>
+              <a:gd name="connsiteX12" fmla="*/ 2023460 w 2134750"/>
+              <a:gd name="connsiteY12" fmla="*/ 849134 h 1226918"/>
+              <a:gd name="connsiteX13" fmla="*/ 1714126 w 2134750"/>
+              <a:gd name="connsiteY13" fmla="*/ 977951 h 1226918"/>
+              <a:gd name="connsiteX14" fmla="*/ 1405669 w 2134750"/>
+              <a:gd name="connsiteY14" fmla="*/ 977951 h 1226918"/>
+              <a:gd name="connsiteX15" fmla="*/ 1405669 w 2134750"/>
+              <a:gd name="connsiteY15" fmla="*/ 1226820 h 1226918"/>
+              <a:gd name="connsiteX16" fmla="*/ 0 w 2134750"/>
+              <a:gd name="connsiteY16" fmla="*/ 1226918 h 1226918"/>
+              <a:gd name="connsiteX17" fmla="*/ 0 w 2134750"/>
+              <a:gd name="connsiteY17" fmla="*/ 960852 h 1226918"/>
+              <a:gd name="connsiteX18" fmla="*/ 992055 w 2134750"/>
+              <a:gd name="connsiteY18" fmla="*/ 960852 h 1226918"/>
+              <a:gd name="connsiteX19" fmla="*/ 992055 w 2134750"/>
+              <a:gd name="connsiteY19" fmla="*/ 0 h 1226918"/>
+            </a:gdLst>
+            <a:ahLst/>
+            <a:cxnLst>
+              <a:cxn ang="0">
+                <a:pos x="connsiteX0" y="connsiteY0"/>
+              </a:cxn>
+              <a:cxn ang="0">
+                <a:pos x="connsiteX1" y="connsiteY1"/>
+              </a:cxn>
+              <a:cxn ang="0">
+                <a:pos x="connsiteX2" y="connsiteY2"/>
+              </a:cxn>
+              <a:cxn ang="0">
+                <a:pos x="connsiteX3" y="connsiteY3"/>
+              </a:cxn>
+              <a:cxn ang="0">
+                <a:pos x="connsiteX4" y="connsiteY4"/>
+              </a:cxn>
+              <a:cxn ang="0">
+                <a:pos x="connsiteX5" y="connsiteY5"/>
+              </a:cxn>
+              <a:cxn ang="0">
+                <a:pos x="connsiteX6" y="connsiteY6"/>
+              </a:cxn>
+              <a:cxn ang="0">
+                <a:pos x="connsiteX7" y="connsiteY7"/>
+              </a:cxn>
+              <a:cxn ang="0">
+                <a:pos x="connsiteX8" y="connsiteY8"/>
+              </a:cxn>
+              <a:cxn ang="0">
+                <a:pos x="connsiteX9" y="connsiteY9"/>
+              </a:cxn>
+              <a:cxn ang="0">
+                <a:pos x="connsiteX10" y="connsiteY10"/>
+              </a:cxn>
+              <a:cxn ang="0">
+                <a:pos x="connsiteX11" y="connsiteY11"/>
+              </a:cxn>
+              <a:cxn ang="0">
+                <a:pos x="connsiteX12" y="connsiteY12"/>
+              </a:cxn>
+              <a:cxn ang="0">
+                <a:pos x="connsiteX13" y="connsiteY13"/>
+              </a:cxn>
+              <a:cxn ang="0">
+                <a:pos x="connsiteX14" y="connsiteY14"/>
+              </a:cxn>
+              <a:cxn ang="0">
+                <a:pos x="connsiteX15" y="connsiteY15"/>
+              </a:cxn>
+              <a:cxn ang="0">
+                <a:pos x="connsiteX16" y="connsiteY16"/>
+              </a:cxn>
+              <a:cxn ang="0">
+                <a:pos x="connsiteX17" y="connsiteY17"/>
+              </a:cxn>
+              <a:cxn ang="0">
+                <a:pos x="connsiteX18" y="connsiteY18"/>
+              </a:cxn>
+              <a:cxn ang="0">
+                <a:pos x="connsiteX19" y="connsiteY19"/>
+              </a:cxn>
+            </a:cxnLst>
+            <a:rect l="l" t="t" r="r" b="b"/>
+            <a:pathLst>
+              <a:path w="2134750" h="1226918">
+                <a:moveTo>
+                  <a:pt x="1405669" y="290932"/>
+                </a:moveTo>
+                <a:lnTo>
+                  <a:pt x="1405669" y="687019"/>
+                </a:lnTo>
+                <a:lnTo>
+                  <a:pt x="1566908" y="687019"/>
+                </a:lnTo>
+                <a:cubicBezTo>
+                  <a:pt x="1614812" y="687019"/>
+                  <a:pt x="1652493" y="669493"/>
+                  <a:pt x="1679950" y="634441"/>
+                </a:cubicBezTo>
+                <a:cubicBezTo>
+                  <a:pt x="1707408" y="599389"/>
+                  <a:pt x="1721137" y="551485"/>
+                  <a:pt x="1721137" y="490728"/>
+                </a:cubicBezTo>
+                <a:cubicBezTo>
+                  <a:pt x="1721137" y="427634"/>
+                  <a:pt x="1707408" y="378561"/>
+                  <a:pt x="1679950" y="343509"/>
+                </a:cubicBezTo>
+                <a:cubicBezTo>
+                  <a:pt x="1652493" y="308457"/>
+                  <a:pt x="1614812" y="290932"/>
+                  <a:pt x="1566908" y="290932"/>
+                </a:cubicBezTo>
+                <a:lnTo>
+                  <a:pt x="1405669" y="290932"/>
+                </a:lnTo>
+                <a:close/>
+                <a:moveTo>
+                  <a:pt x="992055" y="0"/>
+                </a:moveTo>
+                <a:lnTo>
+                  <a:pt x="1714126" y="0"/>
+                </a:lnTo>
+                <a:cubicBezTo>
+                  <a:pt x="1846155" y="0"/>
+                  <a:pt x="1949267" y="43231"/>
+                  <a:pt x="2023460" y="129692"/>
+                </a:cubicBezTo>
+                <a:cubicBezTo>
+                  <a:pt x="2097653" y="216154"/>
+                  <a:pt x="2134750" y="336499"/>
+                  <a:pt x="2134750" y="490728"/>
+                </a:cubicBezTo>
+                <a:cubicBezTo>
+                  <a:pt x="2134750" y="643788"/>
+                  <a:pt x="2097653" y="763257"/>
+                  <a:pt x="2023460" y="849134"/>
+                </a:cubicBezTo>
+                <a:cubicBezTo>
+                  <a:pt x="1949267" y="935012"/>
+                  <a:pt x="1846155" y="977951"/>
+                  <a:pt x="1714126" y="977951"/>
+                </a:cubicBezTo>
+                <a:lnTo>
+                  <a:pt x="1405669" y="977951"/>
+                </a:lnTo>
+                <a:lnTo>
+                  <a:pt x="1405669" y="1226820"/>
+                </a:lnTo>
+                <a:lnTo>
+                  <a:pt x="0" y="1226918"/>
+                </a:lnTo>
+                <a:lnTo>
+                  <a:pt x="0" y="960852"/>
+                </a:lnTo>
+                <a:lnTo>
+                  <a:pt x="992055" y="960852"/>
+                </a:lnTo>
+                <a:lnTo>
+                  <a:pt x="992055" y="0"/>
+                </a:lnTo>
+                <a:close/>
+              </a:path>
+            </a:pathLst>
+          </a:custGeom>
+          <a:solidFill>
+            <a:schemeClr val="tx1"/>
+          </a:solidFill>
+          <a:ln>
+            <a:noFill/>
+          </a:ln>
+        </p:spPr>
+        <p:style>
+          <a:lnRef idx="2">
+            <a:schemeClr val="accent1">
+              <a:shade val="50000"/>
+            </a:schemeClr>
+          </a:lnRef>
+          <a:fillRef idx="1">
+            <a:schemeClr val="accent1"/>
+          </a:fillRef>
+          <a:effectRef idx="0">
+            <a:schemeClr val="accent1"/>
+          </a:effectRef>
+          <a:fontRef idx="minor">
+            <a:schemeClr val="lt1"/>
+          </a:fontRef>
+        </p:style>
+        <p:txBody>
+          <a:bodyPr wrap="square" rtlCol="0" anchor="ctr">
+            <a:noAutofit/>
+          </a:bodyPr>
+          <a:lstStyle/>
+          <a:p>
+            <a:pPr algn="ctr"/>
+            <a:endParaRPr lang="en-US"/>
+          </a:p>
+        </p:txBody>
+      </p:sp>
     </p:spTree>
     <p:extLst>
       <p:ext uri="{BB962C8B-B14F-4D97-AF65-F5344CB8AC3E}">
@@ -2104,7 +3842,7 @@
         </p:nvGrpSpPr>
         <p:grpSpPr>
           <a:xfrm>
-            <a:off x="6559338" y="1986779"/>
+            <a:off x="4745067" y="304703"/>
             <a:ext cx="3490870" cy="2676879"/>
             <a:chOff x="4723238" y="233292"/>
             <a:chExt cx="3490870" cy="2676879"/>
@@ -2526,6 +4264,1728 @@
                 </a:solidFill>
                 <a:latin typeface="Nura Black" pitchFamily="2" charset="0"/>
               </a:endParaRPr>
+            </a:p>
+          </p:txBody>
+        </p:sp>
+      </p:grpSp>
+      <p:grpSp>
+        <p:nvGrpSpPr>
+          <p:cNvPr id="15" name="Group 14">
+            <a:extLst>
+              <a:ext uri="{FF2B5EF4-FFF2-40B4-BE49-F238E27FC236}">
+                <a16:creationId xmlns:a16="http://schemas.microsoft.com/office/drawing/2014/main" id="{AEB9B208-6464-641F-0D48-9B3FCDAE386B}"/>
+              </a:ext>
+            </a:extLst>
+          </p:cNvPr>
+          <p:cNvGrpSpPr/>
+          <p:nvPr/>
+        </p:nvGrpSpPr>
+        <p:grpSpPr>
+          <a:xfrm>
+            <a:off x="686048" y="3267980"/>
+            <a:ext cx="2478177" cy="2946870"/>
+            <a:chOff x="618078" y="248340"/>
+            <a:chExt cx="2478177" cy="2946870"/>
+          </a:xfrm>
+        </p:grpSpPr>
+        <p:sp>
+          <p:nvSpPr>
+            <p:cNvPr id="16" name="Arrow: Up 15">
+              <a:extLst>
+                <a:ext uri="{FF2B5EF4-FFF2-40B4-BE49-F238E27FC236}">
+                  <a16:creationId xmlns:a16="http://schemas.microsoft.com/office/drawing/2014/main" id="{E34F1FAA-EA6E-4440-DBE2-A80D9543E55D}"/>
+                </a:ext>
+              </a:extLst>
+            </p:cNvPr>
+            <p:cNvSpPr/>
+            <p:nvPr/>
+          </p:nvSpPr>
+          <p:spPr>
+            <a:xfrm>
+              <a:off x="1326822" y="248340"/>
+              <a:ext cx="989901" cy="1275126"/>
+            </a:xfrm>
+            <a:prstGeom prst="upArrow">
+              <a:avLst>
+                <a:gd name="adj1" fmla="val 52581"/>
+                <a:gd name="adj2" fmla="val 60140"/>
+              </a:avLst>
+            </a:prstGeom>
+            <a:solidFill>
+              <a:schemeClr val="bg1"/>
+            </a:solidFill>
+            <a:ln>
+              <a:noFill/>
+            </a:ln>
+          </p:spPr>
+          <p:style>
+            <a:lnRef idx="2">
+              <a:schemeClr val="accent1">
+                <a:shade val="50000"/>
+              </a:schemeClr>
+            </a:lnRef>
+            <a:fillRef idx="1">
+              <a:schemeClr val="accent1"/>
+            </a:fillRef>
+            <a:effectRef idx="0">
+              <a:schemeClr val="accent1"/>
+            </a:effectRef>
+            <a:fontRef idx="minor">
+              <a:schemeClr val="lt1"/>
+            </a:fontRef>
+          </p:style>
+          <p:txBody>
+            <a:bodyPr rtlCol="0" anchor="ctr"/>
+            <a:lstStyle/>
+            <a:p>
+              <a:pPr algn="ctr"/>
+              <a:endParaRPr lang="en-US">
+                <a:solidFill>
+                  <a:schemeClr val="bg1"/>
+                </a:solidFill>
+              </a:endParaRPr>
+            </a:p>
+          </p:txBody>
+        </p:sp>
+        <p:sp>
+          <p:nvSpPr>
+            <p:cNvPr id="17" name="Rectangle 16">
+              <a:extLst>
+                <a:ext uri="{FF2B5EF4-FFF2-40B4-BE49-F238E27FC236}">
+                  <a16:creationId xmlns:a16="http://schemas.microsoft.com/office/drawing/2014/main" id="{E4FFEE99-2CBA-CBDE-0525-99BFEF32B6EB}"/>
+                </a:ext>
+              </a:extLst>
+            </p:cNvPr>
+            <p:cNvSpPr/>
+            <p:nvPr/>
+          </p:nvSpPr>
+          <p:spPr>
+            <a:xfrm>
+              <a:off x="1326822" y="1793158"/>
+              <a:ext cx="1070063" cy="268448"/>
+            </a:xfrm>
+            <a:prstGeom prst="rect">
+              <a:avLst/>
+            </a:prstGeom>
+            <a:solidFill>
+              <a:schemeClr val="bg1"/>
+            </a:solidFill>
+            <a:ln>
+              <a:noFill/>
+            </a:ln>
+          </p:spPr>
+          <p:style>
+            <a:lnRef idx="2">
+              <a:schemeClr val="accent1">
+                <a:shade val="50000"/>
+              </a:schemeClr>
+            </a:lnRef>
+            <a:fillRef idx="1">
+              <a:schemeClr val="accent1"/>
+            </a:fillRef>
+            <a:effectRef idx="0">
+              <a:schemeClr val="accent1"/>
+            </a:effectRef>
+            <a:fontRef idx="minor">
+              <a:schemeClr val="lt1"/>
+            </a:fontRef>
+          </p:style>
+          <p:txBody>
+            <a:bodyPr rtlCol="0" anchor="ctr"/>
+            <a:lstStyle/>
+            <a:p>
+              <a:pPr algn="ctr"/>
+              <a:endParaRPr lang="en-US">
+                <a:solidFill>
+                  <a:schemeClr val="bg1"/>
+                </a:solidFill>
+              </a:endParaRPr>
+            </a:p>
+          </p:txBody>
+        </p:sp>
+        <p:sp>
+          <p:nvSpPr>
+            <p:cNvPr id="18" name="TextBox 17">
+              <a:extLst>
+                <a:ext uri="{FF2B5EF4-FFF2-40B4-BE49-F238E27FC236}">
+                  <a16:creationId xmlns:a16="http://schemas.microsoft.com/office/drawing/2014/main" id="{BD80D2CD-7983-2211-9DB5-4F4CA1CA5E12}"/>
+                </a:ext>
+              </a:extLst>
+            </p:cNvPr>
+            <p:cNvSpPr txBox="1"/>
+            <p:nvPr/>
+          </p:nvSpPr>
+          <p:spPr>
+            <a:xfrm>
+              <a:off x="618078" y="2332850"/>
+              <a:ext cx="2478177" cy="862360"/>
+            </a:xfrm>
+            <a:custGeom>
+              <a:avLst/>
+              <a:gdLst/>
+              <a:ahLst/>
+              <a:cxnLst/>
+              <a:rect l="l" t="t" r="r" b="b"/>
+              <a:pathLst>
+                <a:path w="2478177" h="862360">
+                  <a:moveTo>
+                    <a:pt x="1488009" y="527080"/>
+                  </a:moveTo>
+                  <a:lnTo>
+                    <a:pt x="1488009" y="664849"/>
+                  </a:lnTo>
+                  <a:lnTo>
+                    <a:pt x="1544092" y="664849"/>
+                  </a:lnTo>
+                  <a:cubicBezTo>
+                    <a:pt x="1560754" y="664849"/>
+                    <a:pt x="1573861" y="658753"/>
+                    <a:pt x="1583411" y="646561"/>
+                  </a:cubicBezTo>
+                  <a:cubicBezTo>
+                    <a:pt x="1592962" y="634369"/>
+                    <a:pt x="1597737" y="617707"/>
+                    <a:pt x="1597737" y="596574"/>
+                  </a:cubicBezTo>
+                  <a:cubicBezTo>
+                    <a:pt x="1597737" y="574629"/>
+                    <a:pt x="1592962" y="557560"/>
+                    <a:pt x="1583411" y="545368"/>
+                  </a:cubicBezTo>
+                  <a:cubicBezTo>
+                    <a:pt x="1573861" y="533176"/>
+                    <a:pt x="1560754" y="527080"/>
+                    <a:pt x="1544092" y="527080"/>
+                  </a:cubicBezTo>
+                  <a:close/>
+                  <a:moveTo>
+                    <a:pt x="867893" y="427715"/>
+                  </a:moveTo>
+                  <a:lnTo>
+                    <a:pt x="1011759" y="427715"/>
+                  </a:lnTo>
+                  <a:lnTo>
+                    <a:pt x="1011759" y="649609"/>
+                  </a:lnTo>
+                  <a:cubicBezTo>
+                    <a:pt x="1011759" y="675619"/>
+                    <a:pt x="1017753" y="695939"/>
+                    <a:pt x="1029742" y="710569"/>
+                  </a:cubicBezTo>
+                  <a:cubicBezTo>
+                    <a:pt x="1041731" y="725200"/>
+                    <a:pt x="1058291" y="732515"/>
+                    <a:pt x="1079424" y="732515"/>
+                  </a:cubicBezTo>
+                  <a:cubicBezTo>
+                    <a:pt x="1100557" y="732515"/>
+                    <a:pt x="1117118" y="725200"/>
+                    <a:pt x="1129107" y="710569"/>
+                  </a:cubicBezTo>
+                  <a:cubicBezTo>
+                    <a:pt x="1141095" y="695939"/>
+                    <a:pt x="1147090" y="675619"/>
+                    <a:pt x="1147090" y="649609"/>
+                  </a:cubicBezTo>
+                  <a:lnTo>
+                    <a:pt x="1147090" y="427715"/>
+                  </a:lnTo>
+                  <a:lnTo>
+                    <a:pt x="1290956" y="427715"/>
+                  </a:lnTo>
+                  <a:lnTo>
+                    <a:pt x="1290956" y="649609"/>
+                  </a:lnTo>
+                  <a:cubicBezTo>
+                    <a:pt x="1290956" y="693907"/>
+                    <a:pt x="1282523" y="732007"/>
+                    <a:pt x="1265657" y="763909"/>
+                  </a:cubicBezTo>
+                  <a:cubicBezTo>
+                    <a:pt x="1248791" y="795812"/>
+                    <a:pt x="1224509" y="820196"/>
+                    <a:pt x="1192810" y="837061"/>
+                  </a:cubicBezTo>
+                  <a:cubicBezTo>
+                    <a:pt x="1161111" y="853927"/>
+                    <a:pt x="1123316" y="862360"/>
+                    <a:pt x="1079424" y="862360"/>
+                  </a:cubicBezTo>
+                  <a:cubicBezTo>
+                    <a:pt x="1035533" y="862360"/>
+                    <a:pt x="997738" y="853927"/>
+                    <a:pt x="966039" y="837061"/>
+                  </a:cubicBezTo>
+                  <a:cubicBezTo>
+                    <a:pt x="934339" y="820196"/>
+                    <a:pt x="910057" y="795812"/>
+                    <a:pt x="893191" y="763909"/>
+                  </a:cubicBezTo>
+                  <a:cubicBezTo>
+                    <a:pt x="876326" y="732007"/>
+                    <a:pt x="867893" y="693907"/>
+                    <a:pt x="867893" y="649609"/>
+                  </a:cubicBezTo>
+                  <a:close/>
+                  <a:moveTo>
+                    <a:pt x="1344143" y="425886"/>
+                  </a:moveTo>
+                  <a:lnTo>
+                    <a:pt x="1595298" y="425886"/>
+                  </a:lnTo>
+                  <a:cubicBezTo>
+                    <a:pt x="1641222" y="425886"/>
+                    <a:pt x="1677086" y="440923"/>
+                    <a:pt x="1702893" y="470997"/>
+                  </a:cubicBezTo>
+                  <a:cubicBezTo>
+                    <a:pt x="1728699" y="501070"/>
+                    <a:pt x="1741602" y="542929"/>
+                    <a:pt x="1741602" y="596574"/>
+                  </a:cubicBezTo>
+                  <a:cubicBezTo>
+                    <a:pt x="1741602" y="649813"/>
+                    <a:pt x="1728699" y="691367"/>
+                    <a:pt x="1702893" y="721237"/>
+                  </a:cubicBezTo>
+                  <a:cubicBezTo>
+                    <a:pt x="1677086" y="751108"/>
+                    <a:pt x="1641222" y="766043"/>
+                    <a:pt x="1595298" y="766043"/>
+                  </a:cubicBezTo>
+                  <a:lnTo>
+                    <a:pt x="1488009" y="766043"/>
+                  </a:lnTo>
+                  <a:lnTo>
+                    <a:pt x="1488009" y="852606"/>
+                  </a:lnTo>
+                  <a:lnTo>
+                    <a:pt x="1344143" y="852606"/>
+                  </a:lnTo>
+                  <a:close/>
+                  <a:moveTo>
+                    <a:pt x="1958874" y="98755"/>
+                  </a:moveTo>
+                  <a:cubicBezTo>
+                    <a:pt x="1943024" y="98755"/>
+                    <a:pt x="1930603" y="104242"/>
+                    <a:pt x="1921612" y="115214"/>
+                  </a:cubicBezTo>
+                  <a:cubicBezTo>
+                    <a:pt x="1912620" y="126187"/>
+                    <a:pt x="1908124" y="141427"/>
+                    <a:pt x="1908124" y="160934"/>
+                  </a:cubicBezTo>
+                  <a:lnTo>
+                    <a:pt x="1908124" y="195682"/>
+                  </a:lnTo>
+                  <a:lnTo>
+                    <a:pt x="2009623" y="195682"/>
+                  </a:lnTo>
+                  <a:lnTo>
+                    <a:pt x="2009623" y="160934"/>
+                  </a:lnTo>
+                  <a:cubicBezTo>
+                    <a:pt x="2009623" y="141427"/>
+                    <a:pt x="2005127" y="126187"/>
+                    <a:pt x="1996135" y="115214"/>
+                  </a:cubicBezTo>
+                  <a:cubicBezTo>
+                    <a:pt x="1987144" y="104242"/>
+                    <a:pt x="1974723" y="98755"/>
+                    <a:pt x="1958874" y="98755"/>
+                  </a:cubicBezTo>
+                  <a:close/>
+                  <a:moveTo>
+                    <a:pt x="2152650" y="7315"/>
+                  </a:moveTo>
+                  <a:lnTo>
+                    <a:pt x="2260549" y="7315"/>
+                  </a:lnTo>
+                  <a:lnTo>
+                    <a:pt x="2315413" y="129845"/>
+                  </a:lnTo>
+                  <a:lnTo>
+                    <a:pt x="2370277" y="7315"/>
+                  </a:lnTo>
+                  <a:lnTo>
+                    <a:pt x="2478177" y="7315"/>
+                  </a:lnTo>
+                  <a:lnTo>
+                    <a:pt x="2369363" y="213512"/>
+                  </a:lnTo>
+                  <a:lnTo>
+                    <a:pt x="2369363" y="327355"/>
+                  </a:lnTo>
+                  <a:lnTo>
+                    <a:pt x="2261464" y="327355"/>
+                  </a:lnTo>
+                  <a:lnTo>
+                    <a:pt x="2261464" y="213512"/>
+                  </a:lnTo>
+                  <a:close/>
+                  <a:moveTo>
+                    <a:pt x="1304925" y="7315"/>
+                  </a:moveTo>
+                  <a:lnTo>
+                    <a:pt x="1412824" y="7315"/>
+                  </a:lnTo>
+                  <a:lnTo>
+                    <a:pt x="1413281" y="190652"/>
+                  </a:lnTo>
+                  <a:cubicBezTo>
+                    <a:pt x="1413281" y="204673"/>
+                    <a:pt x="1416177" y="215722"/>
+                    <a:pt x="1421968" y="223799"/>
+                  </a:cubicBezTo>
+                  <a:cubicBezTo>
+                    <a:pt x="1427759" y="231877"/>
+                    <a:pt x="1435837" y="235915"/>
+                    <a:pt x="1446200" y="235915"/>
+                  </a:cubicBezTo>
+                  <a:cubicBezTo>
+                    <a:pt x="1456563" y="235915"/>
+                    <a:pt x="1464716" y="231953"/>
+                    <a:pt x="1470660" y="224028"/>
+                  </a:cubicBezTo>
+                  <a:cubicBezTo>
+                    <a:pt x="1476604" y="216103"/>
+                    <a:pt x="1479576" y="204978"/>
+                    <a:pt x="1479576" y="190652"/>
+                  </a:cubicBezTo>
+                  <a:lnTo>
+                    <a:pt x="1479576" y="7315"/>
+                  </a:lnTo>
+                  <a:lnTo>
+                    <a:pt x="1587018" y="7315"/>
+                  </a:lnTo>
+                  <a:lnTo>
+                    <a:pt x="1587018" y="190652"/>
+                  </a:lnTo>
+                  <a:cubicBezTo>
+                    <a:pt x="1587018" y="204978"/>
+                    <a:pt x="1589989" y="216103"/>
+                    <a:pt x="1595933" y="224028"/>
+                  </a:cubicBezTo>
+                  <a:cubicBezTo>
+                    <a:pt x="1601877" y="231953"/>
+                    <a:pt x="1610182" y="235915"/>
+                    <a:pt x="1620850" y="235915"/>
+                  </a:cubicBezTo>
+                  <a:cubicBezTo>
+                    <a:pt x="1631518" y="235915"/>
+                    <a:pt x="1639824" y="231953"/>
+                    <a:pt x="1645768" y="224028"/>
+                  </a:cubicBezTo>
+                  <a:cubicBezTo>
+                    <a:pt x="1651711" y="216103"/>
+                    <a:pt x="1654683" y="204978"/>
+                    <a:pt x="1654683" y="190652"/>
+                  </a:cubicBezTo>
+                  <a:lnTo>
+                    <a:pt x="1654683" y="7315"/>
+                  </a:lnTo>
+                  <a:lnTo>
+                    <a:pt x="1762125" y="7315"/>
+                  </a:lnTo>
+                  <a:lnTo>
+                    <a:pt x="1762125" y="173279"/>
+                  </a:lnTo>
+                  <a:cubicBezTo>
+                    <a:pt x="1762125" y="206807"/>
+                    <a:pt x="1756486" y="235687"/>
+                    <a:pt x="1745209" y="259918"/>
+                  </a:cubicBezTo>
+                  <a:cubicBezTo>
+                    <a:pt x="1733931" y="284150"/>
+                    <a:pt x="1717701" y="302666"/>
+                    <a:pt x="1696517" y="315468"/>
+                  </a:cubicBezTo>
+                  <a:cubicBezTo>
+                    <a:pt x="1675333" y="328270"/>
+                    <a:pt x="1650111" y="334670"/>
+                    <a:pt x="1620850" y="334670"/>
+                  </a:cubicBezTo>
+                  <a:cubicBezTo>
+                    <a:pt x="1599514" y="334670"/>
+                    <a:pt x="1581074" y="329413"/>
+                    <a:pt x="1565529" y="318897"/>
+                  </a:cubicBezTo>
+                  <a:cubicBezTo>
+                    <a:pt x="1549984" y="308381"/>
+                    <a:pt x="1539316" y="295961"/>
+                    <a:pt x="1533525" y="281635"/>
+                  </a:cubicBezTo>
+                  <a:cubicBezTo>
+                    <a:pt x="1528039" y="295961"/>
+                    <a:pt x="1517523" y="308381"/>
+                    <a:pt x="1501978" y="318897"/>
+                  </a:cubicBezTo>
+                  <a:cubicBezTo>
+                    <a:pt x="1486434" y="329413"/>
+                    <a:pt x="1467841" y="334670"/>
+                    <a:pt x="1446200" y="334670"/>
+                  </a:cubicBezTo>
+                  <a:cubicBezTo>
+                    <a:pt x="1416939" y="334670"/>
+                    <a:pt x="1391717" y="328270"/>
+                    <a:pt x="1370533" y="315468"/>
+                  </a:cubicBezTo>
+                  <a:cubicBezTo>
+                    <a:pt x="1349350" y="302666"/>
+                    <a:pt x="1333119" y="284150"/>
+                    <a:pt x="1321841" y="259918"/>
+                  </a:cubicBezTo>
+                  <a:cubicBezTo>
+                    <a:pt x="1310564" y="235687"/>
+                    <a:pt x="1304925" y="206807"/>
+                    <a:pt x="1304925" y="173279"/>
+                  </a:cubicBezTo>
+                  <a:close/>
+                  <a:moveTo>
+                    <a:pt x="704850" y="7315"/>
+                  </a:moveTo>
+                  <a:lnTo>
+                    <a:pt x="812749" y="7315"/>
+                  </a:lnTo>
+                  <a:lnTo>
+                    <a:pt x="812749" y="327355"/>
+                  </a:lnTo>
+                  <a:lnTo>
+                    <a:pt x="704850" y="327355"/>
+                  </a:lnTo>
+                  <a:close/>
+                  <a:moveTo>
+                    <a:pt x="352425" y="7315"/>
+                  </a:moveTo>
+                  <a:lnTo>
+                    <a:pt x="460324" y="7315"/>
+                  </a:lnTo>
+                  <a:lnTo>
+                    <a:pt x="460324" y="127102"/>
+                  </a:lnTo>
+                  <a:lnTo>
+                    <a:pt x="558622" y="127102"/>
+                  </a:lnTo>
+                  <a:lnTo>
+                    <a:pt x="558622" y="7315"/>
+                  </a:lnTo>
+                  <a:lnTo>
+                    <a:pt x="666522" y="7315"/>
+                  </a:lnTo>
+                  <a:lnTo>
+                    <a:pt x="666522" y="327355"/>
+                  </a:lnTo>
+                  <a:lnTo>
+                    <a:pt x="558622" y="327355"/>
+                  </a:lnTo>
+                  <a:lnTo>
+                    <a:pt x="558622" y="207569"/>
+                  </a:lnTo>
+                  <a:lnTo>
+                    <a:pt x="460324" y="207569"/>
+                  </a:lnTo>
+                  <a:lnTo>
+                    <a:pt x="460324" y="327355"/>
+                  </a:lnTo>
+                  <a:lnTo>
+                    <a:pt x="352425" y="327355"/>
+                  </a:lnTo>
+                  <a:close/>
+                  <a:moveTo>
+                    <a:pt x="0" y="7315"/>
+                  </a:moveTo>
+                  <a:lnTo>
+                    <a:pt x="314096" y="7315"/>
+                  </a:lnTo>
+                  <a:lnTo>
+                    <a:pt x="314096" y="87782"/>
+                  </a:lnTo>
+                  <a:lnTo>
+                    <a:pt x="211227" y="87782"/>
+                  </a:lnTo>
+                  <a:lnTo>
+                    <a:pt x="211227" y="327355"/>
+                  </a:lnTo>
+                  <a:lnTo>
+                    <a:pt x="103327" y="327355"/>
+                  </a:lnTo>
+                  <a:lnTo>
+                    <a:pt x="103327" y="87782"/>
+                  </a:lnTo>
+                  <a:lnTo>
+                    <a:pt x="0" y="87782"/>
+                  </a:lnTo>
+                  <a:close/>
+                  <a:moveTo>
+                    <a:pt x="1958874" y="1372"/>
+                  </a:moveTo>
+                  <a:cubicBezTo>
+                    <a:pt x="1991792" y="1372"/>
+                    <a:pt x="2020138" y="7696"/>
+                    <a:pt x="2043913" y="20345"/>
+                  </a:cubicBezTo>
+                  <a:cubicBezTo>
+                    <a:pt x="2067687" y="32995"/>
+                    <a:pt x="2085899" y="51283"/>
+                    <a:pt x="2098548" y="75209"/>
+                  </a:cubicBezTo>
+                  <a:cubicBezTo>
+                    <a:pt x="2111197" y="99136"/>
+                    <a:pt x="2117522" y="127711"/>
+                    <a:pt x="2117522" y="160934"/>
+                  </a:cubicBezTo>
+                  <a:lnTo>
+                    <a:pt x="2117522" y="327355"/>
+                  </a:lnTo>
+                  <a:lnTo>
+                    <a:pt x="2009623" y="327355"/>
+                  </a:lnTo>
+                  <a:lnTo>
+                    <a:pt x="2009623" y="276149"/>
+                  </a:lnTo>
+                  <a:lnTo>
+                    <a:pt x="1908124" y="276149"/>
+                  </a:lnTo>
+                  <a:lnTo>
+                    <a:pt x="1908124" y="327355"/>
+                  </a:lnTo>
+                  <a:lnTo>
+                    <a:pt x="1800225" y="327355"/>
+                  </a:lnTo>
+                  <a:lnTo>
+                    <a:pt x="1800225" y="160934"/>
+                  </a:lnTo>
+                  <a:cubicBezTo>
+                    <a:pt x="1800225" y="127711"/>
+                    <a:pt x="1806550" y="99136"/>
+                    <a:pt x="1819199" y="75209"/>
+                  </a:cubicBezTo>
+                  <a:cubicBezTo>
+                    <a:pt x="1831848" y="51283"/>
+                    <a:pt x="1850060" y="32995"/>
+                    <a:pt x="1873834" y="20345"/>
+                  </a:cubicBezTo>
+                  <a:cubicBezTo>
+                    <a:pt x="1897609" y="7696"/>
+                    <a:pt x="1925955" y="1372"/>
+                    <a:pt x="1958874" y="1372"/>
+                  </a:cubicBezTo>
+                  <a:close/>
+                  <a:moveTo>
+                    <a:pt x="1000887" y="0"/>
+                  </a:moveTo>
+                  <a:cubicBezTo>
+                    <a:pt x="1049655" y="0"/>
+                    <a:pt x="1087679" y="10973"/>
+                    <a:pt x="1114959" y="32918"/>
+                  </a:cubicBezTo>
+                  <a:cubicBezTo>
+                    <a:pt x="1142238" y="54864"/>
+                    <a:pt x="1155878" y="85496"/>
+                    <a:pt x="1155878" y="124816"/>
+                  </a:cubicBezTo>
+                  <a:lnTo>
+                    <a:pt x="1047979" y="124816"/>
+                  </a:lnTo>
+                  <a:cubicBezTo>
+                    <a:pt x="1047979" y="109576"/>
+                    <a:pt x="1043635" y="97612"/>
+                    <a:pt x="1034949" y="88925"/>
+                  </a:cubicBezTo>
+                  <a:cubicBezTo>
+                    <a:pt x="1026262" y="80239"/>
+                    <a:pt x="1014146" y="75895"/>
+                    <a:pt x="998601" y="75895"/>
+                  </a:cubicBezTo>
+                  <a:cubicBezTo>
+                    <a:pt x="981228" y="75895"/>
+                    <a:pt x="968807" y="78410"/>
+                    <a:pt x="961339" y="83439"/>
+                  </a:cubicBezTo>
+                  <a:cubicBezTo>
+                    <a:pt x="953872" y="88468"/>
+                    <a:pt x="950138" y="94945"/>
+                    <a:pt x="950138" y="102870"/>
+                  </a:cubicBezTo>
+                  <a:cubicBezTo>
+                    <a:pt x="950138" y="110490"/>
+                    <a:pt x="953491" y="116434"/>
+                    <a:pt x="960196" y="120701"/>
+                  </a:cubicBezTo>
+                  <a:cubicBezTo>
+                    <a:pt x="966902" y="124968"/>
+                    <a:pt x="975360" y="128092"/>
+                    <a:pt x="985571" y="130073"/>
+                  </a:cubicBezTo>
+                  <a:cubicBezTo>
+                    <a:pt x="995782" y="132055"/>
+                    <a:pt x="1009879" y="133960"/>
+                    <a:pt x="1027862" y="135788"/>
+                  </a:cubicBezTo>
+                  <a:cubicBezTo>
+                    <a:pt x="1055294" y="138836"/>
+                    <a:pt x="1077697" y="142494"/>
+                    <a:pt x="1095070" y="146761"/>
+                  </a:cubicBezTo>
+                  <a:cubicBezTo>
+                    <a:pt x="1112444" y="151028"/>
+                    <a:pt x="1127455" y="158877"/>
+                    <a:pt x="1140105" y="170307"/>
+                  </a:cubicBezTo>
+                  <a:cubicBezTo>
+                    <a:pt x="1152754" y="181737"/>
+                    <a:pt x="1159078" y="197968"/>
+                    <a:pt x="1159078" y="218999"/>
+                  </a:cubicBezTo>
+                  <a:cubicBezTo>
+                    <a:pt x="1159078" y="255270"/>
+                    <a:pt x="1145286" y="283616"/>
+                    <a:pt x="1117702" y="304038"/>
+                  </a:cubicBezTo>
+                  <a:cubicBezTo>
+                    <a:pt x="1090117" y="324460"/>
+                    <a:pt x="1051789" y="334670"/>
+                    <a:pt x="1002716" y="334670"/>
+                  </a:cubicBezTo>
+                  <a:cubicBezTo>
+                    <a:pt x="953948" y="334670"/>
+                    <a:pt x="915924" y="324460"/>
+                    <a:pt x="888645" y="304038"/>
+                  </a:cubicBezTo>
+                  <a:cubicBezTo>
+                    <a:pt x="861365" y="283616"/>
+                    <a:pt x="847725" y="255270"/>
+                    <a:pt x="847725" y="218999"/>
+                  </a:cubicBezTo>
+                  <a:lnTo>
+                    <a:pt x="955624" y="218999"/>
+                  </a:lnTo>
+                  <a:cubicBezTo>
+                    <a:pt x="955624" y="231496"/>
+                    <a:pt x="959739" y="241249"/>
+                    <a:pt x="967969" y="248260"/>
+                  </a:cubicBezTo>
+                  <a:cubicBezTo>
+                    <a:pt x="976198" y="255270"/>
+                    <a:pt x="987781" y="258775"/>
+                    <a:pt x="1002716" y="258775"/>
+                  </a:cubicBezTo>
+                  <a:cubicBezTo>
+                    <a:pt x="1017956" y="258775"/>
+                    <a:pt x="1029843" y="256337"/>
+                    <a:pt x="1038378" y="251460"/>
+                  </a:cubicBezTo>
+                  <a:cubicBezTo>
+                    <a:pt x="1046912" y="246583"/>
+                    <a:pt x="1051179" y="239878"/>
+                    <a:pt x="1051179" y="231343"/>
+                  </a:cubicBezTo>
+                  <a:cubicBezTo>
+                    <a:pt x="1051179" y="222809"/>
+                    <a:pt x="1046226" y="217094"/>
+                    <a:pt x="1036320" y="214198"/>
+                  </a:cubicBezTo>
+                  <a:cubicBezTo>
+                    <a:pt x="1026414" y="211303"/>
+                    <a:pt x="1010488" y="208940"/>
+                    <a:pt x="988543" y="207112"/>
+                  </a:cubicBezTo>
+                  <a:cubicBezTo>
+                    <a:pt x="960196" y="204673"/>
+                    <a:pt x="936651" y="201092"/>
+                    <a:pt x="917905" y="196367"/>
+                  </a:cubicBezTo>
+                  <a:cubicBezTo>
+                    <a:pt x="899160" y="191643"/>
+                    <a:pt x="882777" y="181661"/>
+                    <a:pt x="868756" y="166421"/>
+                  </a:cubicBezTo>
+                  <a:cubicBezTo>
+                    <a:pt x="854736" y="151181"/>
+                    <a:pt x="847725" y="128626"/>
+                    <a:pt x="847725" y="98755"/>
+                  </a:cubicBezTo>
+                  <a:cubicBezTo>
+                    <a:pt x="847725" y="67666"/>
+                    <a:pt x="861212" y="43434"/>
+                    <a:pt x="888187" y="26060"/>
+                  </a:cubicBezTo>
+                  <a:cubicBezTo>
+                    <a:pt x="915162" y="8687"/>
+                    <a:pt x="952729" y="0"/>
+                    <a:pt x="1000887" y="0"/>
+                  </a:cubicBezTo>
+                  <a:close/>
+                </a:path>
+              </a:pathLst>
+            </a:custGeom>
+            <a:solidFill>
+              <a:schemeClr val="bg1"/>
+            </a:solidFill>
+            <a:ln>
+              <a:noFill/>
+            </a:ln>
+            <a:effectLst/>
+          </p:spPr>
+          <p:txBody>
+            <a:bodyPr rot="0" spcFirstLastPara="0" vertOverflow="overflow" horzOverflow="overflow" vert="horz" wrap="square" lIns="91440" tIns="45720" rIns="91440" bIns="45720" numCol="1" spcCol="0" rtlCol="0" fromWordArt="0" anchor="t" anchorCtr="0" forceAA="0" compatLnSpc="1">
+              <a:prstTxWarp prst="textNoShape">
+                <a:avLst/>
+              </a:prstTxWarp>
+              <a:noAutofit/>
+            </a:bodyPr>
+            <a:lstStyle/>
+            <a:p>
+              <a:pPr algn="ctr"/>
+              <a:endParaRPr lang="en-ZA" sz="3600" dirty="0">
+                <a:solidFill>
+                  <a:schemeClr val="bg1"/>
+                </a:solidFill>
+                <a:latin typeface="Nura Black" pitchFamily="2" charset="0"/>
+              </a:endParaRPr>
+            </a:p>
+          </p:txBody>
+        </p:sp>
+      </p:grpSp>
+      <p:grpSp>
+        <p:nvGrpSpPr>
+          <p:cNvPr id="19" name="Group 18">
+            <a:extLst>
+              <a:ext uri="{FF2B5EF4-FFF2-40B4-BE49-F238E27FC236}">
+                <a16:creationId xmlns:a16="http://schemas.microsoft.com/office/drawing/2014/main" id="{F68644B4-FC8C-7766-00C5-E27CC6753457}"/>
+              </a:ext>
+            </a:extLst>
+          </p:cNvPr>
+          <p:cNvGrpSpPr/>
+          <p:nvPr/>
+        </p:nvGrpSpPr>
+        <p:grpSpPr>
+          <a:xfrm>
+            <a:off x="4404895" y="3872925"/>
+            <a:ext cx="3831042" cy="1961277"/>
+            <a:chOff x="1342263" y="3987986"/>
+            <a:chExt cx="3831042" cy="1961277"/>
+          </a:xfrm>
+          <a:solidFill>
+            <a:schemeClr val="bg1"/>
+          </a:solidFill>
+        </p:grpSpPr>
+        <p:sp>
+          <p:nvSpPr>
+            <p:cNvPr id="20" name="Arrow: Up 19">
+              <a:extLst>
+                <a:ext uri="{FF2B5EF4-FFF2-40B4-BE49-F238E27FC236}">
+                  <a16:creationId xmlns:a16="http://schemas.microsoft.com/office/drawing/2014/main" id="{FE586C3A-C74D-C968-A4AC-7E89341A9580}"/>
+                </a:ext>
+              </a:extLst>
+            </p:cNvPr>
+            <p:cNvSpPr/>
+            <p:nvPr/>
+          </p:nvSpPr>
+          <p:spPr>
+            <a:xfrm>
+              <a:off x="1943070" y="4122775"/>
+              <a:ext cx="989901" cy="1362963"/>
+            </a:xfrm>
+            <a:prstGeom prst="upArrow">
+              <a:avLst>
+                <a:gd name="adj1" fmla="val 52581"/>
+                <a:gd name="adj2" fmla="val 60140"/>
+              </a:avLst>
+            </a:prstGeom>
+            <a:grpFill/>
+            <a:ln>
+              <a:noFill/>
+            </a:ln>
+          </p:spPr>
+          <p:style>
+            <a:lnRef idx="2">
+              <a:schemeClr val="accent1">
+                <a:shade val="50000"/>
+              </a:schemeClr>
+            </a:lnRef>
+            <a:fillRef idx="1">
+              <a:schemeClr val="accent1"/>
+            </a:fillRef>
+            <a:effectRef idx="0">
+              <a:schemeClr val="accent1"/>
+            </a:effectRef>
+            <a:fontRef idx="minor">
+              <a:schemeClr val="lt1"/>
+            </a:fontRef>
+          </p:style>
+          <p:txBody>
+            <a:bodyPr rtlCol="0" anchor="ctr"/>
+            <a:lstStyle/>
+            <a:p>
+              <a:pPr algn="ctr"/>
+              <a:endParaRPr lang="en-US"/>
+            </a:p>
+          </p:txBody>
+        </p:sp>
+        <p:sp>
+          <p:nvSpPr>
+            <p:cNvPr id="21" name="TextBox 20">
+              <a:extLst>
+                <a:ext uri="{FF2B5EF4-FFF2-40B4-BE49-F238E27FC236}">
+                  <a16:creationId xmlns:a16="http://schemas.microsoft.com/office/drawing/2014/main" id="{B026BE7A-3591-4E54-10B6-E20463F40BEA}"/>
+                </a:ext>
+              </a:extLst>
+            </p:cNvPr>
+            <p:cNvSpPr txBox="1"/>
+            <p:nvPr/>
+          </p:nvSpPr>
+          <p:spPr>
+            <a:xfrm>
+              <a:off x="1342263" y="3987986"/>
+              <a:ext cx="3831042" cy="1949812"/>
+            </a:xfrm>
+            <a:custGeom>
+              <a:avLst/>
+              <a:gdLst/>
+              <a:ahLst/>
+              <a:cxnLst/>
+              <a:rect l="l" t="t" r="r" b="b"/>
+              <a:pathLst>
+                <a:path w="3831042" h="1949812">
+                  <a:moveTo>
+                    <a:pt x="12192" y="1426318"/>
+                  </a:moveTo>
+                  <a:lnTo>
+                    <a:pt x="146304" y="1426318"/>
+                  </a:lnTo>
+                  <a:lnTo>
+                    <a:pt x="146304" y="1597768"/>
+                  </a:lnTo>
+                  <a:lnTo>
+                    <a:pt x="545592" y="1597768"/>
+                  </a:lnTo>
+                  <a:lnTo>
+                    <a:pt x="545592" y="1777600"/>
+                  </a:lnTo>
+                  <a:lnTo>
+                    <a:pt x="146304" y="1777600"/>
+                  </a:lnTo>
+                  <a:lnTo>
+                    <a:pt x="146304" y="1949812"/>
+                  </a:lnTo>
+                  <a:lnTo>
+                    <a:pt x="12192" y="1949812"/>
+                  </a:lnTo>
+                  <a:close/>
+                  <a:moveTo>
+                    <a:pt x="12192" y="845293"/>
+                  </a:moveTo>
+                  <a:lnTo>
+                    <a:pt x="545592" y="845293"/>
+                  </a:lnTo>
+                  <a:lnTo>
+                    <a:pt x="545592" y="1025125"/>
+                  </a:lnTo>
+                  <a:lnTo>
+                    <a:pt x="345948" y="1025125"/>
+                  </a:lnTo>
+                  <a:lnTo>
+                    <a:pt x="345948" y="1188955"/>
+                  </a:lnTo>
+                  <a:lnTo>
+                    <a:pt x="545592" y="1188955"/>
+                  </a:lnTo>
+                  <a:lnTo>
+                    <a:pt x="545592" y="1368787"/>
+                  </a:lnTo>
+                  <a:lnTo>
+                    <a:pt x="12192" y="1368787"/>
+                  </a:lnTo>
+                  <a:lnTo>
+                    <a:pt x="12192" y="1188955"/>
+                  </a:lnTo>
+                  <a:lnTo>
+                    <a:pt x="211836" y="1188955"/>
+                  </a:lnTo>
+                  <a:lnTo>
+                    <a:pt x="211836" y="1025125"/>
+                  </a:lnTo>
+                  <a:lnTo>
+                    <a:pt x="12192" y="1025125"/>
+                  </a:lnTo>
+                  <a:close/>
+                  <a:moveTo>
+                    <a:pt x="12192" y="607930"/>
+                  </a:moveTo>
+                  <a:lnTo>
+                    <a:pt x="545592" y="607930"/>
+                  </a:lnTo>
+                  <a:lnTo>
+                    <a:pt x="545592" y="787762"/>
+                  </a:lnTo>
+                  <a:lnTo>
+                    <a:pt x="12192" y="787762"/>
+                  </a:lnTo>
+                  <a:close/>
+                  <a:moveTo>
+                    <a:pt x="2792436" y="194767"/>
+                  </a:moveTo>
+                  <a:cubicBezTo>
+                    <a:pt x="2760737" y="194767"/>
+                    <a:pt x="2735896" y="205740"/>
+                    <a:pt x="2717912" y="227686"/>
+                  </a:cubicBezTo>
+                  <a:cubicBezTo>
+                    <a:pt x="2699929" y="249631"/>
+                    <a:pt x="2690938" y="280111"/>
+                    <a:pt x="2690938" y="319126"/>
+                  </a:cubicBezTo>
+                  <a:lnTo>
+                    <a:pt x="2690938" y="388620"/>
+                  </a:lnTo>
+                  <a:lnTo>
+                    <a:pt x="2893934" y="388620"/>
+                  </a:lnTo>
+                  <a:lnTo>
+                    <a:pt x="2893934" y="319126"/>
+                  </a:lnTo>
+                  <a:cubicBezTo>
+                    <a:pt x="2893934" y="280111"/>
+                    <a:pt x="2884943" y="249631"/>
+                    <a:pt x="2866960" y="227686"/>
+                  </a:cubicBezTo>
+                  <a:cubicBezTo>
+                    <a:pt x="2848976" y="205740"/>
+                    <a:pt x="2824135" y="194767"/>
+                    <a:pt x="2792436" y="194767"/>
+                  </a:cubicBezTo>
+                  <a:close/>
+                  <a:moveTo>
+                    <a:pt x="364998" y="30715"/>
+                  </a:moveTo>
+                  <a:cubicBezTo>
+                    <a:pt x="425450" y="30715"/>
+                    <a:pt x="472694" y="53702"/>
+                    <a:pt x="506730" y="99676"/>
+                  </a:cubicBezTo>
+                  <a:cubicBezTo>
+                    <a:pt x="540766" y="145650"/>
+                    <a:pt x="557784" y="209531"/>
+                    <a:pt x="557784" y="291319"/>
+                  </a:cubicBezTo>
+                  <a:cubicBezTo>
+                    <a:pt x="557784" y="372599"/>
+                    <a:pt x="540766" y="435972"/>
+                    <a:pt x="506730" y="481438"/>
+                  </a:cubicBezTo>
+                  <a:cubicBezTo>
+                    <a:pt x="472694" y="526904"/>
+                    <a:pt x="425450" y="549637"/>
+                    <a:pt x="364998" y="549637"/>
+                  </a:cubicBezTo>
+                  <a:lnTo>
+                    <a:pt x="364998" y="369805"/>
+                  </a:lnTo>
+                  <a:cubicBezTo>
+                    <a:pt x="385826" y="369805"/>
+                    <a:pt x="402082" y="362947"/>
+                    <a:pt x="413766" y="349231"/>
+                  </a:cubicBezTo>
+                  <a:cubicBezTo>
+                    <a:pt x="425450" y="335515"/>
+                    <a:pt x="431292" y="316211"/>
+                    <a:pt x="431292" y="291319"/>
+                  </a:cubicBezTo>
+                  <a:cubicBezTo>
+                    <a:pt x="431292" y="265919"/>
+                    <a:pt x="427228" y="246107"/>
+                    <a:pt x="419100" y="231883"/>
+                  </a:cubicBezTo>
+                  <a:cubicBezTo>
+                    <a:pt x="410972" y="217659"/>
+                    <a:pt x="399796" y="210547"/>
+                    <a:pt x="385572" y="210547"/>
+                  </a:cubicBezTo>
+                  <a:cubicBezTo>
+                    <a:pt x="371348" y="210547"/>
+                    <a:pt x="361823" y="218802"/>
+                    <a:pt x="356997" y="235312"/>
+                  </a:cubicBezTo>
+                  <a:cubicBezTo>
+                    <a:pt x="352171" y="251822"/>
+                    <a:pt x="348234" y="278365"/>
+                    <a:pt x="345186" y="314941"/>
+                  </a:cubicBezTo>
+                  <a:cubicBezTo>
+                    <a:pt x="341122" y="362185"/>
+                    <a:pt x="335153" y="401428"/>
+                    <a:pt x="327279" y="432670"/>
+                  </a:cubicBezTo>
+                  <a:cubicBezTo>
+                    <a:pt x="319405" y="463912"/>
+                    <a:pt x="302768" y="491217"/>
+                    <a:pt x="277368" y="514585"/>
+                  </a:cubicBezTo>
+                  <a:cubicBezTo>
+                    <a:pt x="251968" y="537953"/>
+                    <a:pt x="214376" y="549637"/>
+                    <a:pt x="164592" y="549637"/>
+                  </a:cubicBezTo>
+                  <a:cubicBezTo>
+                    <a:pt x="112776" y="549637"/>
+                    <a:pt x="72390" y="527158"/>
+                    <a:pt x="43434" y="482200"/>
+                  </a:cubicBezTo>
+                  <a:cubicBezTo>
+                    <a:pt x="14478" y="437242"/>
+                    <a:pt x="0" y="374631"/>
+                    <a:pt x="0" y="294367"/>
+                  </a:cubicBezTo>
+                  <a:cubicBezTo>
+                    <a:pt x="0" y="213087"/>
+                    <a:pt x="18288" y="149714"/>
+                    <a:pt x="54864" y="104248"/>
+                  </a:cubicBezTo>
+                  <a:cubicBezTo>
+                    <a:pt x="91440" y="58782"/>
+                    <a:pt x="142494" y="36049"/>
+                    <a:pt x="208026" y="36049"/>
+                  </a:cubicBezTo>
+                  <a:lnTo>
+                    <a:pt x="208026" y="215881"/>
+                  </a:lnTo>
+                  <a:cubicBezTo>
+                    <a:pt x="182626" y="215881"/>
+                    <a:pt x="162687" y="223120"/>
+                    <a:pt x="148209" y="237598"/>
+                  </a:cubicBezTo>
+                  <a:cubicBezTo>
+                    <a:pt x="133731" y="252076"/>
+                    <a:pt x="126492" y="272269"/>
+                    <a:pt x="126492" y="298177"/>
+                  </a:cubicBezTo>
+                  <a:cubicBezTo>
+                    <a:pt x="126492" y="327133"/>
+                    <a:pt x="130683" y="347834"/>
+                    <a:pt x="139065" y="360280"/>
+                  </a:cubicBezTo>
+                  <a:cubicBezTo>
+                    <a:pt x="147447" y="372726"/>
+                    <a:pt x="158242" y="378949"/>
+                    <a:pt x="171450" y="378949"/>
+                  </a:cubicBezTo>
+                  <a:cubicBezTo>
+                    <a:pt x="184150" y="378949"/>
+                    <a:pt x="194056" y="373361"/>
+                    <a:pt x="201168" y="362185"/>
+                  </a:cubicBezTo>
+                  <a:cubicBezTo>
+                    <a:pt x="208280" y="351009"/>
+                    <a:pt x="213487" y="336912"/>
+                    <a:pt x="216789" y="319894"/>
+                  </a:cubicBezTo>
+                  <a:cubicBezTo>
+                    <a:pt x="220091" y="302876"/>
+                    <a:pt x="223266" y="279381"/>
+                    <a:pt x="226314" y="249409"/>
+                  </a:cubicBezTo>
+                  <a:cubicBezTo>
+                    <a:pt x="231394" y="203689"/>
+                    <a:pt x="237490" y="166351"/>
+                    <a:pt x="244602" y="137395"/>
+                  </a:cubicBezTo>
+                  <a:cubicBezTo>
+                    <a:pt x="251714" y="108439"/>
+                    <a:pt x="264795" y="83420"/>
+                    <a:pt x="283845" y="62338"/>
+                  </a:cubicBezTo>
+                  <a:cubicBezTo>
+                    <a:pt x="302895" y="41256"/>
+                    <a:pt x="329946" y="30715"/>
+                    <a:pt x="364998" y="30715"/>
+                  </a:cubicBezTo>
+                  <a:close/>
+                  <a:moveTo>
+                    <a:pt x="3179989" y="11887"/>
+                  </a:moveTo>
+                  <a:lnTo>
+                    <a:pt x="3395788" y="11887"/>
+                  </a:lnTo>
+                  <a:lnTo>
+                    <a:pt x="3505516" y="256946"/>
+                  </a:lnTo>
+                  <a:lnTo>
+                    <a:pt x="3615244" y="11887"/>
+                  </a:lnTo>
+                  <a:lnTo>
+                    <a:pt x="3831042" y="11887"/>
+                  </a:lnTo>
+                  <a:lnTo>
+                    <a:pt x="3613415" y="424282"/>
+                  </a:lnTo>
+                  <a:lnTo>
+                    <a:pt x="3613415" y="651967"/>
+                  </a:lnTo>
+                  <a:lnTo>
+                    <a:pt x="3397616" y="651967"/>
+                  </a:lnTo>
+                  <a:lnTo>
+                    <a:pt x="3397616" y="424282"/>
+                  </a:lnTo>
+                  <a:close/>
+                  <a:moveTo>
+                    <a:pt x="1484539" y="11887"/>
+                  </a:moveTo>
+                  <a:lnTo>
+                    <a:pt x="1700338" y="11887"/>
+                  </a:lnTo>
+                  <a:lnTo>
+                    <a:pt x="1701252" y="378562"/>
+                  </a:lnTo>
+                  <a:cubicBezTo>
+                    <a:pt x="1701252" y="406603"/>
+                    <a:pt x="1707043" y="428701"/>
+                    <a:pt x="1718626" y="444856"/>
+                  </a:cubicBezTo>
+                  <a:cubicBezTo>
+                    <a:pt x="1730208" y="461010"/>
+                    <a:pt x="1746362" y="469087"/>
+                    <a:pt x="1767089" y="469087"/>
+                  </a:cubicBezTo>
+                  <a:cubicBezTo>
+                    <a:pt x="1787815" y="469087"/>
+                    <a:pt x="1804122" y="461162"/>
+                    <a:pt x="1816009" y="445313"/>
+                  </a:cubicBezTo>
+                  <a:cubicBezTo>
+                    <a:pt x="1827896" y="429463"/>
+                    <a:pt x="1833840" y="407213"/>
+                    <a:pt x="1833840" y="378562"/>
+                  </a:cubicBezTo>
+                  <a:lnTo>
+                    <a:pt x="1833840" y="11887"/>
+                  </a:lnTo>
+                  <a:lnTo>
+                    <a:pt x="2048724" y="11887"/>
+                  </a:lnTo>
+                  <a:lnTo>
+                    <a:pt x="2048724" y="378562"/>
+                  </a:lnTo>
+                  <a:cubicBezTo>
+                    <a:pt x="2048724" y="407213"/>
+                    <a:pt x="2054668" y="429463"/>
+                    <a:pt x="2066555" y="445313"/>
+                  </a:cubicBezTo>
+                  <a:cubicBezTo>
+                    <a:pt x="2078442" y="461162"/>
+                    <a:pt x="2095054" y="469087"/>
+                    <a:pt x="2116390" y="469087"/>
+                  </a:cubicBezTo>
+                  <a:cubicBezTo>
+                    <a:pt x="2137726" y="469087"/>
+                    <a:pt x="2154337" y="461162"/>
+                    <a:pt x="2166224" y="445313"/>
+                  </a:cubicBezTo>
+                  <a:cubicBezTo>
+                    <a:pt x="2178112" y="429463"/>
+                    <a:pt x="2184055" y="407213"/>
+                    <a:pt x="2184055" y="378562"/>
+                  </a:cubicBezTo>
+                  <a:lnTo>
+                    <a:pt x="2184055" y="11887"/>
+                  </a:lnTo>
+                  <a:lnTo>
+                    <a:pt x="2398939" y="11887"/>
+                  </a:lnTo>
+                  <a:lnTo>
+                    <a:pt x="2398939" y="343814"/>
+                  </a:lnTo>
+                  <a:cubicBezTo>
+                    <a:pt x="2398939" y="410870"/>
+                    <a:pt x="2387662" y="468630"/>
+                    <a:pt x="2365106" y="517093"/>
+                  </a:cubicBezTo>
+                  <a:cubicBezTo>
+                    <a:pt x="2342551" y="565556"/>
+                    <a:pt x="2310090" y="602590"/>
+                    <a:pt x="2267723" y="628193"/>
+                  </a:cubicBezTo>
+                  <a:cubicBezTo>
+                    <a:pt x="2225356" y="653796"/>
+                    <a:pt x="2174911" y="666598"/>
+                    <a:pt x="2116390" y="666598"/>
+                  </a:cubicBezTo>
+                  <a:cubicBezTo>
+                    <a:pt x="2073718" y="666598"/>
+                    <a:pt x="2036837" y="656082"/>
+                    <a:pt x="2005747" y="635051"/>
+                  </a:cubicBezTo>
+                  <a:cubicBezTo>
+                    <a:pt x="1974658" y="614020"/>
+                    <a:pt x="1953322" y="589178"/>
+                    <a:pt x="1941739" y="560527"/>
+                  </a:cubicBezTo>
+                  <a:cubicBezTo>
+                    <a:pt x="1930766" y="589178"/>
+                    <a:pt x="1909735" y="614020"/>
+                    <a:pt x="1878646" y="635051"/>
+                  </a:cubicBezTo>
+                  <a:cubicBezTo>
+                    <a:pt x="1847556" y="656082"/>
+                    <a:pt x="1810370" y="666598"/>
+                    <a:pt x="1767089" y="666598"/>
+                  </a:cubicBezTo>
+                  <a:cubicBezTo>
+                    <a:pt x="1708567" y="666598"/>
+                    <a:pt x="1658123" y="653796"/>
+                    <a:pt x="1615756" y="628193"/>
+                  </a:cubicBezTo>
+                  <a:cubicBezTo>
+                    <a:pt x="1573388" y="602590"/>
+                    <a:pt x="1540927" y="565556"/>
+                    <a:pt x="1518372" y="517093"/>
+                  </a:cubicBezTo>
+                  <a:cubicBezTo>
+                    <a:pt x="1495817" y="468630"/>
+                    <a:pt x="1484539" y="410870"/>
+                    <a:pt x="1484539" y="343814"/>
+                  </a:cubicBezTo>
+                  <a:close/>
+                  <a:moveTo>
+                    <a:pt x="2792436" y="0"/>
+                  </a:moveTo>
+                  <a:cubicBezTo>
+                    <a:pt x="2858273" y="0"/>
+                    <a:pt x="2914966" y="12649"/>
+                    <a:pt x="2962515" y="37948"/>
+                  </a:cubicBezTo>
+                  <a:cubicBezTo>
+                    <a:pt x="3010063" y="63246"/>
+                    <a:pt x="3046487" y="99822"/>
+                    <a:pt x="3071785" y="147676"/>
+                  </a:cubicBezTo>
+                  <a:cubicBezTo>
+                    <a:pt x="3097084" y="195529"/>
+                    <a:pt x="3109733" y="252679"/>
+                    <a:pt x="3109733" y="319126"/>
+                  </a:cubicBezTo>
+                  <a:lnTo>
+                    <a:pt x="3109733" y="651967"/>
+                  </a:lnTo>
+                  <a:lnTo>
+                    <a:pt x="2893934" y="651967"/>
+                  </a:lnTo>
+                  <a:lnTo>
+                    <a:pt x="2893934" y="549554"/>
+                  </a:lnTo>
+                  <a:lnTo>
+                    <a:pt x="2690938" y="549554"/>
+                  </a:lnTo>
+                  <a:lnTo>
+                    <a:pt x="2690938" y="651967"/>
+                  </a:lnTo>
+                  <a:lnTo>
+                    <a:pt x="2475139" y="651967"/>
+                  </a:lnTo>
+                  <a:lnTo>
+                    <a:pt x="2475139" y="319126"/>
+                  </a:lnTo>
+                  <a:cubicBezTo>
+                    <a:pt x="2475139" y="252679"/>
+                    <a:pt x="2487788" y="195529"/>
+                    <a:pt x="2513087" y="147676"/>
+                  </a:cubicBezTo>
+                  <a:cubicBezTo>
+                    <a:pt x="2538385" y="99822"/>
+                    <a:pt x="2574809" y="63246"/>
+                    <a:pt x="2622358" y="37948"/>
+                  </a:cubicBezTo>
+                  <a:cubicBezTo>
+                    <a:pt x="2669907" y="12649"/>
+                    <a:pt x="2726599" y="0"/>
+                    <a:pt x="2792436" y="0"/>
+                  </a:cubicBezTo>
+                  <a:close/>
+                </a:path>
+              </a:pathLst>
+            </a:custGeom>
+            <a:grpFill/>
+            <a:ln>
+              <a:noFill/>
+            </a:ln>
+            <a:effectLst/>
+          </p:spPr>
+          <p:txBody>
+            <a:bodyPr rot="0" spcFirstLastPara="0" vertOverflow="overflow" horzOverflow="overflow" vert="horz" wrap="square" lIns="91440" tIns="45720" rIns="91440" bIns="45720" numCol="1" spcCol="0" rtlCol="0" fromWordArt="0" anchor="t" anchorCtr="0" forceAA="0" compatLnSpc="1">
+              <a:prstTxWarp prst="textNoShape">
+                <a:avLst/>
+              </a:prstTxWarp>
+              <a:noAutofit/>
+            </a:bodyPr>
+            <a:lstStyle/>
+            <a:p>
+              <a:endParaRPr lang="en-US" sz="7200" dirty="0">
+                <a:latin typeface="Nura Black" pitchFamily="2" charset="0"/>
+              </a:endParaRPr>
+            </a:p>
+          </p:txBody>
+        </p:sp>
+        <p:sp>
+          <p:nvSpPr>
+            <p:cNvPr id="22" name="Freeform: Shape 21">
+              <a:extLst>
+                <a:ext uri="{FF2B5EF4-FFF2-40B4-BE49-F238E27FC236}">
+                  <a16:creationId xmlns:a16="http://schemas.microsoft.com/office/drawing/2014/main" id="{74E76B3E-477E-9E2D-0A92-E173551667D8}"/>
+                </a:ext>
+              </a:extLst>
+            </p:cNvPr>
+            <p:cNvSpPr/>
+            <p:nvPr/>
+          </p:nvSpPr>
+          <p:spPr>
+            <a:xfrm>
+              <a:off x="1937640" y="4722345"/>
+              <a:ext cx="2134750" cy="1226918"/>
+            </a:xfrm>
+            <a:custGeom>
+              <a:avLst/>
+              <a:gdLst>
+                <a:gd name="connsiteX0" fmla="*/ 1405669 w 2134750"/>
+                <a:gd name="connsiteY0" fmla="*/ 290932 h 1229300"/>
+                <a:gd name="connsiteX1" fmla="*/ 1405669 w 2134750"/>
+                <a:gd name="connsiteY1" fmla="*/ 687019 h 1229300"/>
+                <a:gd name="connsiteX2" fmla="*/ 1566908 w 2134750"/>
+                <a:gd name="connsiteY2" fmla="*/ 687019 h 1229300"/>
+                <a:gd name="connsiteX3" fmla="*/ 1679950 w 2134750"/>
+                <a:gd name="connsiteY3" fmla="*/ 634441 h 1229300"/>
+                <a:gd name="connsiteX4" fmla="*/ 1721137 w 2134750"/>
+                <a:gd name="connsiteY4" fmla="*/ 490728 h 1229300"/>
+                <a:gd name="connsiteX5" fmla="*/ 1679950 w 2134750"/>
+                <a:gd name="connsiteY5" fmla="*/ 343509 h 1229300"/>
+                <a:gd name="connsiteX6" fmla="*/ 1566908 w 2134750"/>
+                <a:gd name="connsiteY6" fmla="*/ 290932 h 1229300"/>
+                <a:gd name="connsiteX7" fmla="*/ 1405669 w 2134750"/>
+                <a:gd name="connsiteY7" fmla="*/ 290932 h 1229300"/>
+                <a:gd name="connsiteX8" fmla="*/ 992055 w 2134750"/>
+                <a:gd name="connsiteY8" fmla="*/ 0 h 1229300"/>
+                <a:gd name="connsiteX9" fmla="*/ 1714126 w 2134750"/>
+                <a:gd name="connsiteY9" fmla="*/ 0 h 1229300"/>
+                <a:gd name="connsiteX10" fmla="*/ 2023460 w 2134750"/>
+                <a:gd name="connsiteY10" fmla="*/ 129692 h 1229300"/>
+                <a:gd name="connsiteX11" fmla="*/ 2134750 w 2134750"/>
+                <a:gd name="connsiteY11" fmla="*/ 490728 h 1229300"/>
+                <a:gd name="connsiteX12" fmla="*/ 2023460 w 2134750"/>
+                <a:gd name="connsiteY12" fmla="*/ 849134 h 1229300"/>
+                <a:gd name="connsiteX13" fmla="*/ 1714126 w 2134750"/>
+                <a:gd name="connsiteY13" fmla="*/ 977951 h 1229300"/>
+                <a:gd name="connsiteX14" fmla="*/ 1405669 w 2134750"/>
+                <a:gd name="connsiteY14" fmla="*/ 977951 h 1229300"/>
+                <a:gd name="connsiteX15" fmla="*/ 1405669 w 2134750"/>
+                <a:gd name="connsiteY15" fmla="*/ 1226820 h 1229300"/>
+                <a:gd name="connsiteX16" fmla="*/ 1070063 w 2134750"/>
+                <a:gd name="connsiteY16" fmla="*/ 1226820 h 1229300"/>
+                <a:gd name="connsiteX17" fmla="*/ 0 w 2134750"/>
+                <a:gd name="connsiteY17" fmla="*/ 1229300 h 1229300"/>
+                <a:gd name="connsiteX18" fmla="*/ 0 w 2134750"/>
+                <a:gd name="connsiteY18" fmla="*/ 960852 h 1229300"/>
+                <a:gd name="connsiteX19" fmla="*/ 992055 w 2134750"/>
+                <a:gd name="connsiteY19" fmla="*/ 960852 h 1229300"/>
+                <a:gd name="connsiteX20" fmla="*/ 992055 w 2134750"/>
+                <a:gd name="connsiteY20" fmla="*/ 0 h 1229300"/>
+                <a:gd name="connsiteX0" fmla="*/ 1405669 w 2134750"/>
+                <a:gd name="connsiteY0" fmla="*/ 290932 h 1229300"/>
+                <a:gd name="connsiteX1" fmla="*/ 1405669 w 2134750"/>
+                <a:gd name="connsiteY1" fmla="*/ 687019 h 1229300"/>
+                <a:gd name="connsiteX2" fmla="*/ 1566908 w 2134750"/>
+                <a:gd name="connsiteY2" fmla="*/ 687019 h 1229300"/>
+                <a:gd name="connsiteX3" fmla="*/ 1679950 w 2134750"/>
+                <a:gd name="connsiteY3" fmla="*/ 634441 h 1229300"/>
+                <a:gd name="connsiteX4" fmla="*/ 1721137 w 2134750"/>
+                <a:gd name="connsiteY4" fmla="*/ 490728 h 1229300"/>
+                <a:gd name="connsiteX5" fmla="*/ 1679950 w 2134750"/>
+                <a:gd name="connsiteY5" fmla="*/ 343509 h 1229300"/>
+                <a:gd name="connsiteX6" fmla="*/ 1566908 w 2134750"/>
+                <a:gd name="connsiteY6" fmla="*/ 290932 h 1229300"/>
+                <a:gd name="connsiteX7" fmla="*/ 1405669 w 2134750"/>
+                <a:gd name="connsiteY7" fmla="*/ 290932 h 1229300"/>
+                <a:gd name="connsiteX8" fmla="*/ 992055 w 2134750"/>
+                <a:gd name="connsiteY8" fmla="*/ 0 h 1229300"/>
+                <a:gd name="connsiteX9" fmla="*/ 1714126 w 2134750"/>
+                <a:gd name="connsiteY9" fmla="*/ 0 h 1229300"/>
+                <a:gd name="connsiteX10" fmla="*/ 2023460 w 2134750"/>
+                <a:gd name="connsiteY10" fmla="*/ 129692 h 1229300"/>
+                <a:gd name="connsiteX11" fmla="*/ 2134750 w 2134750"/>
+                <a:gd name="connsiteY11" fmla="*/ 490728 h 1229300"/>
+                <a:gd name="connsiteX12" fmla="*/ 2023460 w 2134750"/>
+                <a:gd name="connsiteY12" fmla="*/ 849134 h 1229300"/>
+                <a:gd name="connsiteX13" fmla="*/ 1714126 w 2134750"/>
+                <a:gd name="connsiteY13" fmla="*/ 977951 h 1229300"/>
+                <a:gd name="connsiteX14" fmla="*/ 1405669 w 2134750"/>
+                <a:gd name="connsiteY14" fmla="*/ 977951 h 1229300"/>
+                <a:gd name="connsiteX15" fmla="*/ 1405669 w 2134750"/>
+                <a:gd name="connsiteY15" fmla="*/ 1226820 h 1229300"/>
+                <a:gd name="connsiteX16" fmla="*/ 0 w 2134750"/>
+                <a:gd name="connsiteY16" fmla="*/ 1229300 h 1229300"/>
+                <a:gd name="connsiteX17" fmla="*/ 0 w 2134750"/>
+                <a:gd name="connsiteY17" fmla="*/ 960852 h 1229300"/>
+                <a:gd name="connsiteX18" fmla="*/ 992055 w 2134750"/>
+                <a:gd name="connsiteY18" fmla="*/ 960852 h 1229300"/>
+                <a:gd name="connsiteX19" fmla="*/ 992055 w 2134750"/>
+                <a:gd name="connsiteY19" fmla="*/ 0 h 1229300"/>
+                <a:gd name="connsiteX0" fmla="*/ 1405669 w 2134750"/>
+                <a:gd name="connsiteY0" fmla="*/ 290932 h 1226820"/>
+                <a:gd name="connsiteX1" fmla="*/ 1405669 w 2134750"/>
+                <a:gd name="connsiteY1" fmla="*/ 687019 h 1226820"/>
+                <a:gd name="connsiteX2" fmla="*/ 1566908 w 2134750"/>
+                <a:gd name="connsiteY2" fmla="*/ 687019 h 1226820"/>
+                <a:gd name="connsiteX3" fmla="*/ 1679950 w 2134750"/>
+                <a:gd name="connsiteY3" fmla="*/ 634441 h 1226820"/>
+                <a:gd name="connsiteX4" fmla="*/ 1721137 w 2134750"/>
+                <a:gd name="connsiteY4" fmla="*/ 490728 h 1226820"/>
+                <a:gd name="connsiteX5" fmla="*/ 1679950 w 2134750"/>
+                <a:gd name="connsiteY5" fmla="*/ 343509 h 1226820"/>
+                <a:gd name="connsiteX6" fmla="*/ 1566908 w 2134750"/>
+                <a:gd name="connsiteY6" fmla="*/ 290932 h 1226820"/>
+                <a:gd name="connsiteX7" fmla="*/ 1405669 w 2134750"/>
+                <a:gd name="connsiteY7" fmla="*/ 290932 h 1226820"/>
+                <a:gd name="connsiteX8" fmla="*/ 992055 w 2134750"/>
+                <a:gd name="connsiteY8" fmla="*/ 0 h 1226820"/>
+                <a:gd name="connsiteX9" fmla="*/ 1714126 w 2134750"/>
+                <a:gd name="connsiteY9" fmla="*/ 0 h 1226820"/>
+                <a:gd name="connsiteX10" fmla="*/ 2023460 w 2134750"/>
+                <a:gd name="connsiteY10" fmla="*/ 129692 h 1226820"/>
+                <a:gd name="connsiteX11" fmla="*/ 2134750 w 2134750"/>
+                <a:gd name="connsiteY11" fmla="*/ 490728 h 1226820"/>
+                <a:gd name="connsiteX12" fmla="*/ 2023460 w 2134750"/>
+                <a:gd name="connsiteY12" fmla="*/ 849134 h 1226820"/>
+                <a:gd name="connsiteX13" fmla="*/ 1714126 w 2134750"/>
+                <a:gd name="connsiteY13" fmla="*/ 977951 h 1226820"/>
+                <a:gd name="connsiteX14" fmla="*/ 1405669 w 2134750"/>
+                <a:gd name="connsiteY14" fmla="*/ 977951 h 1226820"/>
+                <a:gd name="connsiteX15" fmla="*/ 1405669 w 2134750"/>
+                <a:gd name="connsiteY15" fmla="*/ 1226820 h 1226820"/>
+                <a:gd name="connsiteX16" fmla="*/ 0 w 2134750"/>
+                <a:gd name="connsiteY16" fmla="*/ 1222156 h 1226820"/>
+                <a:gd name="connsiteX17" fmla="*/ 0 w 2134750"/>
+                <a:gd name="connsiteY17" fmla="*/ 960852 h 1226820"/>
+                <a:gd name="connsiteX18" fmla="*/ 992055 w 2134750"/>
+                <a:gd name="connsiteY18" fmla="*/ 960852 h 1226820"/>
+                <a:gd name="connsiteX19" fmla="*/ 992055 w 2134750"/>
+                <a:gd name="connsiteY19" fmla="*/ 0 h 1226820"/>
+                <a:gd name="connsiteX0" fmla="*/ 1405669 w 2134750"/>
+                <a:gd name="connsiteY0" fmla="*/ 290932 h 1226918"/>
+                <a:gd name="connsiteX1" fmla="*/ 1405669 w 2134750"/>
+                <a:gd name="connsiteY1" fmla="*/ 687019 h 1226918"/>
+                <a:gd name="connsiteX2" fmla="*/ 1566908 w 2134750"/>
+                <a:gd name="connsiteY2" fmla="*/ 687019 h 1226918"/>
+                <a:gd name="connsiteX3" fmla="*/ 1679950 w 2134750"/>
+                <a:gd name="connsiteY3" fmla="*/ 634441 h 1226918"/>
+                <a:gd name="connsiteX4" fmla="*/ 1721137 w 2134750"/>
+                <a:gd name="connsiteY4" fmla="*/ 490728 h 1226918"/>
+                <a:gd name="connsiteX5" fmla="*/ 1679950 w 2134750"/>
+                <a:gd name="connsiteY5" fmla="*/ 343509 h 1226918"/>
+                <a:gd name="connsiteX6" fmla="*/ 1566908 w 2134750"/>
+                <a:gd name="connsiteY6" fmla="*/ 290932 h 1226918"/>
+                <a:gd name="connsiteX7" fmla="*/ 1405669 w 2134750"/>
+                <a:gd name="connsiteY7" fmla="*/ 290932 h 1226918"/>
+                <a:gd name="connsiteX8" fmla="*/ 992055 w 2134750"/>
+                <a:gd name="connsiteY8" fmla="*/ 0 h 1226918"/>
+                <a:gd name="connsiteX9" fmla="*/ 1714126 w 2134750"/>
+                <a:gd name="connsiteY9" fmla="*/ 0 h 1226918"/>
+                <a:gd name="connsiteX10" fmla="*/ 2023460 w 2134750"/>
+                <a:gd name="connsiteY10" fmla="*/ 129692 h 1226918"/>
+                <a:gd name="connsiteX11" fmla="*/ 2134750 w 2134750"/>
+                <a:gd name="connsiteY11" fmla="*/ 490728 h 1226918"/>
+                <a:gd name="connsiteX12" fmla="*/ 2023460 w 2134750"/>
+                <a:gd name="connsiteY12" fmla="*/ 849134 h 1226918"/>
+                <a:gd name="connsiteX13" fmla="*/ 1714126 w 2134750"/>
+                <a:gd name="connsiteY13" fmla="*/ 977951 h 1226918"/>
+                <a:gd name="connsiteX14" fmla="*/ 1405669 w 2134750"/>
+                <a:gd name="connsiteY14" fmla="*/ 977951 h 1226918"/>
+                <a:gd name="connsiteX15" fmla="*/ 1405669 w 2134750"/>
+                <a:gd name="connsiteY15" fmla="*/ 1226820 h 1226918"/>
+                <a:gd name="connsiteX16" fmla="*/ 0 w 2134750"/>
+                <a:gd name="connsiteY16" fmla="*/ 1226918 h 1226918"/>
+                <a:gd name="connsiteX17" fmla="*/ 0 w 2134750"/>
+                <a:gd name="connsiteY17" fmla="*/ 960852 h 1226918"/>
+                <a:gd name="connsiteX18" fmla="*/ 992055 w 2134750"/>
+                <a:gd name="connsiteY18" fmla="*/ 960852 h 1226918"/>
+                <a:gd name="connsiteX19" fmla="*/ 992055 w 2134750"/>
+                <a:gd name="connsiteY19" fmla="*/ 0 h 1226918"/>
+              </a:gdLst>
+              <a:ahLst/>
+              <a:cxnLst>
+                <a:cxn ang="0">
+                  <a:pos x="connsiteX0" y="connsiteY0"/>
+                </a:cxn>
+                <a:cxn ang="0">
+                  <a:pos x="connsiteX1" y="connsiteY1"/>
+                </a:cxn>
+                <a:cxn ang="0">
+                  <a:pos x="connsiteX2" y="connsiteY2"/>
+                </a:cxn>
+                <a:cxn ang="0">
+                  <a:pos x="connsiteX3" y="connsiteY3"/>
+                </a:cxn>
+                <a:cxn ang="0">
+                  <a:pos x="connsiteX4" y="connsiteY4"/>
+                </a:cxn>
+                <a:cxn ang="0">
+                  <a:pos x="connsiteX5" y="connsiteY5"/>
+                </a:cxn>
+                <a:cxn ang="0">
+                  <a:pos x="connsiteX6" y="connsiteY6"/>
+                </a:cxn>
+                <a:cxn ang="0">
+                  <a:pos x="connsiteX7" y="connsiteY7"/>
+                </a:cxn>
+                <a:cxn ang="0">
+                  <a:pos x="connsiteX8" y="connsiteY8"/>
+                </a:cxn>
+                <a:cxn ang="0">
+                  <a:pos x="connsiteX9" y="connsiteY9"/>
+                </a:cxn>
+                <a:cxn ang="0">
+                  <a:pos x="connsiteX10" y="connsiteY10"/>
+                </a:cxn>
+                <a:cxn ang="0">
+                  <a:pos x="connsiteX11" y="connsiteY11"/>
+                </a:cxn>
+                <a:cxn ang="0">
+                  <a:pos x="connsiteX12" y="connsiteY12"/>
+                </a:cxn>
+                <a:cxn ang="0">
+                  <a:pos x="connsiteX13" y="connsiteY13"/>
+                </a:cxn>
+                <a:cxn ang="0">
+                  <a:pos x="connsiteX14" y="connsiteY14"/>
+                </a:cxn>
+                <a:cxn ang="0">
+                  <a:pos x="connsiteX15" y="connsiteY15"/>
+                </a:cxn>
+                <a:cxn ang="0">
+                  <a:pos x="connsiteX16" y="connsiteY16"/>
+                </a:cxn>
+                <a:cxn ang="0">
+                  <a:pos x="connsiteX17" y="connsiteY17"/>
+                </a:cxn>
+                <a:cxn ang="0">
+                  <a:pos x="connsiteX18" y="connsiteY18"/>
+                </a:cxn>
+                <a:cxn ang="0">
+                  <a:pos x="connsiteX19" y="connsiteY19"/>
+                </a:cxn>
+              </a:cxnLst>
+              <a:rect l="l" t="t" r="r" b="b"/>
+              <a:pathLst>
+                <a:path w="2134750" h="1226918">
+                  <a:moveTo>
+                    <a:pt x="1405669" y="290932"/>
+                  </a:moveTo>
+                  <a:lnTo>
+                    <a:pt x="1405669" y="687019"/>
+                  </a:lnTo>
+                  <a:lnTo>
+                    <a:pt x="1566908" y="687019"/>
+                  </a:lnTo>
+                  <a:cubicBezTo>
+                    <a:pt x="1614812" y="687019"/>
+                    <a:pt x="1652493" y="669493"/>
+                    <a:pt x="1679950" y="634441"/>
+                  </a:cubicBezTo>
+                  <a:cubicBezTo>
+                    <a:pt x="1707408" y="599389"/>
+                    <a:pt x="1721137" y="551485"/>
+                    <a:pt x="1721137" y="490728"/>
+                  </a:cubicBezTo>
+                  <a:cubicBezTo>
+                    <a:pt x="1721137" y="427634"/>
+                    <a:pt x="1707408" y="378561"/>
+                    <a:pt x="1679950" y="343509"/>
+                  </a:cubicBezTo>
+                  <a:cubicBezTo>
+                    <a:pt x="1652493" y="308457"/>
+                    <a:pt x="1614812" y="290932"/>
+                    <a:pt x="1566908" y="290932"/>
+                  </a:cubicBezTo>
+                  <a:lnTo>
+                    <a:pt x="1405669" y="290932"/>
+                  </a:lnTo>
+                  <a:close/>
+                  <a:moveTo>
+                    <a:pt x="992055" y="0"/>
+                  </a:moveTo>
+                  <a:lnTo>
+                    <a:pt x="1714126" y="0"/>
+                  </a:lnTo>
+                  <a:cubicBezTo>
+                    <a:pt x="1846155" y="0"/>
+                    <a:pt x="1949267" y="43231"/>
+                    <a:pt x="2023460" y="129692"/>
+                  </a:cubicBezTo>
+                  <a:cubicBezTo>
+                    <a:pt x="2097653" y="216154"/>
+                    <a:pt x="2134750" y="336499"/>
+                    <a:pt x="2134750" y="490728"/>
+                  </a:cubicBezTo>
+                  <a:cubicBezTo>
+                    <a:pt x="2134750" y="643788"/>
+                    <a:pt x="2097653" y="763257"/>
+                    <a:pt x="2023460" y="849134"/>
+                  </a:cubicBezTo>
+                  <a:cubicBezTo>
+                    <a:pt x="1949267" y="935012"/>
+                    <a:pt x="1846155" y="977951"/>
+                    <a:pt x="1714126" y="977951"/>
+                  </a:cubicBezTo>
+                  <a:lnTo>
+                    <a:pt x="1405669" y="977951"/>
+                  </a:lnTo>
+                  <a:lnTo>
+                    <a:pt x="1405669" y="1226820"/>
+                  </a:lnTo>
+                  <a:lnTo>
+                    <a:pt x="0" y="1226918"/>
+                  </a:lnTo>
+                  <a:lnTo>
+                    <a:pt x="0" y="960852"/>
+                  </a:lnTo>
+                  <a:lnTo>
+                    <a:pt x="992055" y="960852"/>
+                  </a:lnTo>
+                  <a:lnTo>
+                    <a:pt x="992055" y="0"/>
+                  </a:lnTo>
+                  <a:close/>
+                </a:path>
+              </a:pathLst>
+            </a:custGeom>
+            <a:grpFill/>
+            <a:ln>
+              <a:noFill/>
+            </a:ln>
+          </p:spPr>
+          <p:style>
+            <a:lnRef idx="2">
+              <a:schemeClr val="accent1">
+                <a:shade val="50000"/>
+              </a:schemeClr>
+            </a:lnRef>
+            <a:fillRef idx="1">
+              <a:schemeClr val="accent1"/>
+            </a:fillRef>
+            <a:effectRef idx="0">
+              <a:schemeClr val="accent1"/>
+            </a:effectRef>
+            <a:fontRef idx="minor">
+              <a:schemeClr val="lt1"/>
+            </a:fontRef>
+          </p:style>
+          <p:txBody>
+            <a:bodyPr wrap="square" rtlCol="0" anchor="ctr">
+              <a:noAutofit/>
+            </a:bodyPr>
+            <a:lstStyle/>
+            <a:p>
+              <a:pPr algn="ctr"/>
+              <a:endParaRPr lang="en-US"/>
             </a:p>
           </p:txBody>
         </p:sp>

</xml_diff>

<commit_message>
Compressed audio, added QR code to join screen
</commit_message>
<xml_diff>
--- a/frontend/logo.pptx
+++ b/frontend/logo.pptx
@@ -7,20 +7,21 @@
   <p:sldIdLst>
     <p:sldId id="256" r:id="rId2"/>
     <p:sldId id="257" r:id="rId3"/>
+    <p:sldId id="258" r:id="rId4"/>
   </p:sldIdLst>
   <p:sldSz cx="12192000" cy="6858000"/>
   <p:notesSz cx="6858000" cy="9144000"/>
   <p:embeddedFontLst>
     <p:embeddedFont>
       <p:font typeface="Calibri" panose="020F0502020204030204" pitchFamily="34" charset="0"/>
-      <p:regular r:id="rId4"/>
-      <p:bold r:id="rId5"/>
-      <p:italic r:id="rId6"/>
-      <p:boldItalic r:id="rId7"/>
+      <p:regular r:id="rId5"/>
+      <p:bold r:id="rId6"/>
+      <p:italic r:id="rId7"/>
+      <p:boldItalic r:id="rId8"/>
     </p:embeddedFont>
     <p:embeddedFont>
       <p:font typeface="Nura Black" pitchFamily="2" charset="0"/>
-      <p:bold r:id="rId8"/>
+      <p:bold r:id="rId9"/>
     </p:embeddedFont>
   </p:embeddedFontLst>
   <p:defaultTextStyle>
@@ -6003,6 +6004,884 @@
 </p:sld>
 </file>
 
+<file path=ppt/slides/slide3.xml><?xml version="1.0" encoding="utf-8"?>
+<p:sld xmlns:a="http://schemas.openxmlformats.org/drawingml/2006/main" xmlns:r="http://schemas.openxmlformats.org/officeDocument/2006/relationships" xmlns:p="http://schemas.openxmlformats.org/presentationml/2006/main">
+  <p:cSld>
+    <p:spTree>
+      <p:nvGrpSpPr>
+        <p:cNvPr id="1" name=""/>
+        <p:cNvGrpSpPr/>
+        <p:nvPr/>
+      </p:nvGrpSpPr>
+      <p:grpSpPr>
+        <a:xfrm>
+          <a:off x="0" y="0"/>
+          <a:ext cx="0" cy="0"/>
+          <a:chOff x="0" y="0"/>
+          <a:chExt cx="0" cy="0"/>
+        </a:xfrm>
+      </p:grpSpPr>
+      <p:grpSp>
+        <p:nvGrpSpPr>
+          <p:cNvPr id="8" name="Group 7">
+            <a:extLst>
+              <a:ext uri="{FF2B5EF4-FFF2-40B4-BE49-F238E27FC236}">
+                <a16:creationId xmlns:a16="http://schemas.microsoft.com/office/drawing/2014/main" id="{230B8370-8BB0-E42C-776D-350FCE28EC9A}"/>
+              </a:ext>
+            </a:extLst>
+          </p:cNvPr>
+          <p:cNvGrpSpPr/>
+          <p:nvPr/>
+        </p:nvGrpSpPr>
+        <p:grpSpPr>
+          <a:xfrm>
+            <a:off x="2474439" y="1311023"/>
+            <a:ext cx="3621561" cy="3621561"/>
+            <a:chOff x="2474439" y="1311023"/>
+            <a:chExt cx="3621561" cy="3621561"/>
+          </a:xfrm>
+        </p:grpSpPr>
+        <p:sp>
+          <p:nvSpPr>
+            <p:cNvPr id="2" name="Rectangle 1">
+              <a:extLst>
+                <a:ext uri="{FF2B5EF4-FFF2-40B4-BE49-F238E27FC236}">
+                  <a16:creationId xmlns:a16="http://schemas.microsoft.com/office/drawing/2014/main" id="{2D5B66E8-A64F-B67A-963E-52C6BD5999F5}"/>
+                </a:ext>
+              </a:extLst>
+            </p:cNvPr>
+            <p:cNvSpPr/>
+            <p:nvPr/>
+          </p:nvSpPr>
+          <p:spPr>
+            <a:xfrm>
+              <a:off x="2474439" y="1311023"/>
+              <a:ext cx="3621561" cy="3621561"/>
+            </a:xfrm>
+            <a:prstGeom prst="rect">
+              <a:avLst/>
+            </a:prstGeom>
+            <a:noFill/>
+            <a:ln>
+              <a:noFill/>
+            </a:ln>
+          </p:spPr>
+          <p:style>
+            <a:lnRef idx="2">
+              <a:schemeClr val="accent1">
+                <a:shade val="50000"/>
+              </a:schemeClr>
+            </a:lnRef>
+            <a:fillRef idx="1">
+              <a:schemeClr val="accent1"/>
+            </a:fillRef>
+            <a:effectRef idx="0">
+              <a:schemeClr val="accent1"/>
+            </a:effectRef>
+            <a:fontRef idx="minor">
+              <a:schemeClr val="lt1"/>
+            </a:fontRef>
+          </p:style>
+          <p:txBody>
+            <a:bodyPr rtlCol="0" anchor="ctr"/>
+            <a:lstStyle/>
+            <a:p>
+              <a:pPr algn="ctr"/>
+              <a:endParaRPr lang="en-US"/>
+            </a:p>
+          </p:txBody>
+        </p:sp>
+        <p:grpSp>
+          <p:nvGrpSpPr>
+            <p:cNvPr id="3" name="Group 2">
+              <a:extLst>
+                <a:ext uri="{FF2B5EF4-FFF2-40B4-BE49-F238E27FC236}">
+                  <a16:creationId xmlns:a16="http://schemas.microsoft.com/office/drawing/2014/main" id="{14A89EA3-4FDE-FA8C-A46F-39BECD2E28C0}"/>
+                </a:ext>
+              </a:extLst>
+            </p:cNvPr>
+            <p:cNvGrpSpPr/>
+            <p:nvPr/>
+          </p:nvGrpSpPr>
+          <p:grpSpPr>
+            <a:xfrm>
+              <a:off x="3046130" y="1648368"/>
+              <a:ext cx="2478177" cy="2946870"/>
+              <a:chOff x="618078" y="248340"/>
+              <a:chExt cx="2478177" cy="2946870"/>
+            </a:xfrm>
+            <a:solidFill>
+              <a:srgbClr val="800000"/>
+            </a:solidFill>
+          </p:grpSpPr>
+          <p:sp>
+            <p:nvSpPr>
+              <p:cNvPr id="4" name="Arrow: Up 3">
+                <a:extLst>
+                  <a:ext uri="{FF2B5EF4-FFF2-40B4-BE49-F238E27FC236}">
+                    <a16:creationId xmlns:a16="http://schemas.microsoft.com/office/drawing/2014/main" id="{53719CE5-B399-1850-0984-A546F3F79E49}"/>
+                  </a:ext>
+                </a:extLst>
+              </p:cNvPr>
+              <p:cNvSpPr/>
+              <p:nvPr/>
+            </p:nvSpPr>
+            <p:spPr>
+              <a:xfrm>
+                <a:off x="1326822" y="248340"/>
+                <a:ext cx="989901" cy="1275126"/>
+              </a:xfrm>
+              <a:prstGeom prst="upArrow">
+                <a:avLst>
+                  <a:gd name="adj1" fmla="val 52581"/>
+                  <a:gd name="adj2" fmla="val 60140"/>
+                </a:avLst>
+              </a:prstGeom>
+              <a:grpFill/>
+              <a:ln>
+                <a:noFill/>
+              </a:ln>
+            </p:spPr>
+            <p:style>
+              <a:lnRef idx="2">
+                <a:schemeClr val="accent1">
+                  <a:shade val="50000"/>
+                </a:schemeClr>
+              </a:lnRef>
+              <a:fillRef idx="1">
+                <a:schemeClr val="accent1"/>
+              </a:fillRef>
+              <a:effectRef idx="0">
+                <a:schemeClr val="accent1"/>
+              </a:effectRef>
+              <a:fontRef idx="minor">
+                <a:schemeClr val="lt1"/>
+              </a:fontRef>
+            </p:style>
+            <p:txBody>
+              <a:bodyPr rtlCol="0" anchor="ctr"/>
+              <a:lstStyle/>
+              <a:p>
+                <a:pPr algn="ctr"/>
+                <a:endParaRPr lang="en-US">
+                  <a:solidFill>
+                    <a:schemeClr val="bg1"/>
+                  </a:solidFill>
+                </a:endParaRPr>
+              </a:p>
+            </p:txBody>
+          </p:sp>
+          <p:sp>
+            <p:nvSpPr>
+              <p:cNvPr id="5" name="Rectangle 4">
+                <a:extLst>
+                  <a:ext uri="{FF2B5EF4-FFF2-40B4-BE49-F238E27FC236}">
+                    <a16:creationId xmlns:a16="http://schemas.microsoft.com/office/drawing/2014/main" id="{636A615A-CDA8-0B07-44CE-8DCA16FB375A}"/>
+                  </a:ext>
+                </a:extLst>
+              </p:cNvPr>
+              <p:cNvSpPr/>
+              <p:nvPr/>
+            </p:nvSpPr>
+            <p:spPr>
+              <a:xfrm>
+                <a:off x="1326822" y="1793158"/>
+                <a:ext cx="1070063" cy="268448"/>
+              </a:xfrm>
+              <a:prstGeom prst="rect">
+                <a:avLst/>
+              </a:prstGeom>
+              <a:grpFill/>
+              <a:ln>
+                <a:noFill/>
+              </a:ln>
+            </p:spPr>
+            <p:style>
+              <a:lnRef idx="2">
+                <a:schemeClr val="accent1">
+                  <a:shade val="50000"/>
+                </a:schemeClr>
+              </a:lnRef>
+              <a:fillRef idx="1">
+                <a:schemeClr val="accent1"/>
+              </a:fillRef>
+              <a:effectRef idx="0">
+                <a:schemeClr val="accent1"/>
+              </a:effectRef>
+              <a:fontRef idx="minor">
+                <a:schemeClr val="lt1"/>
+              </a:fontRef>
+            </p:style>
+            <p:txBody>
+              <a:bodyPr rtlCol="0" anchor="ctr"/>
+              <a:lstStyle/>
+              <a:p>
+                <a:pPr algn="ctr"/>
+                <a:endParaRPr lang="en-US">
+                  <a:solidFill>
+                    <a:schemeClr val="bg1"/>
+                  </a:solidFill>
+                </a:endParaRPr>
+              </a:p>
+            </p:txBody>
+          </p:sp>
+          <p:sp>
+            <p:nvSpPr>
+              <p:cNvPr id="6" name="TextBox 5">
+                <a:extLst>
+                  <a:ext uri="{FF2B5EF4-FFF2-40B4-BE49-F238E27FC236}">
+                    <a16:creationId xmlns:a16="http://schemas.microsoft.com/office/drawing/2014/main" id="{67F491DA-1BDA-93A5-1025-1A8A803E7D2B}"/>
+                  </a:ext>
+                </a:extLst>
+              </p:cNvPr>
+              <p:cNvSpPr txBox="1"/>
+              <p:nvPr/>
+            </p:nvSpPr>
+            <p:spPr>
+              <a:xfrm>
+                <a:off x="618078" y="2332850"/>
+                <a:ext cx="2478177" cy="862360"/>
+              </a:xfrm>
+              <a:custGeom>
+                <a:avLst/>
+                <a:gdLst/>
+                <a:ahLst/>
+                <a:cxnLst/>
+                <a:rect l="l" t="t" r="r" b="b"/>
+                <a:pathLst>
+                  <a:path w="2478177" h="862360">
+                    <a:moveTo>
+                      <a:pt x="1488009" y="527080"/>
+                    </a:moveTo>
+                    <a:lnTo>
+                      <a:pt x="1488009" y="664849"/>
+                    </a:lnTo>
+                    <a:lnTo>
+                      <a:pt x="1544092" y="664849"/>
+                    </a:lnTo>
+                    <a:cubicBezTo>
+                      <a:pt x="1560754" y="664849"/>
+                      <a:pt x="1573861" y="658753"/>
+                      <a:pt x="1583411" y="646561"/>
+                    </a:cubicBezTo>
+                    <a:cubicBezTo>
+                      <a:pt x="1592962" y="634369"/>
+                      <a:pt x="1597737" y="617707"/>
+                      <a:pt x="1597737" y="596574"/>
+                    </a:cubicBezTo>
+                    <a:cubicBezTo>
+                      <a:pt x="1597737" y="574629"/>
+                      <a:pt x="1592962" y="557560"/>
+                      <a:pt x="1583411" y="545368"/>
+                    </a:cubicBezTo>
+                    <a:cubicBezTo>
+                      <a:pt x="1573861" y="533176"/>
+                      <a:pt x="1560754" y="527080"/>
+                      <a:pt x="1544092" y="527080"/>
+                    </a:cubicBezTo>
+                    <a:close/>
+                    <a:moveTo>
+                      <a:pt x="867893" y="427715"/>
+                    </a:moveTo>
+                    <a:lnTo>
+                      <a:pt x="1011759" y="427715"/>
+                    </a:lnTo>
+                    <a:lnTo>
+                      <a:pt x="1011759" y="649609"/>
+                    </a:lnTo>
+                    <a:cubicBezTo>
+                      <a:pt x="1011759" y="675619"/>
+                      <a:pt x="1017753" y="695939"/>
+                      <a:pt x="1029742" y="710569"/>
+                    </a:cubicBezTo>
+                    <a:cubicBezTo>
+                      <a:pt x="1041731" y="725200"/>
+                      <a:pt x="1058291" y="732515"/>
+                      <a:pt x="1079424" y="732515"/>
+                    </a:cubicBezTo>
+                    <a:cubicBezTo>
+                      <a:pt x="1100557" y="732515"/>
+                      <a:pt x="1117118" y="725200"/>
+                      <a:pt x="1129107" y="710569"/>
+                    </a:cubicBezTo>
+                    <a:cubicBezTo>
+                      <a:pt x="1141095" y="695939"/>
+                      <a:pt x="1147090" y="675619"/>
+                      <a:pt x="1147090" y="649609"/>
+                    </a:cubicBezTo>
+                    <a:lnTo>
+                      <a:pt x="1147090" y="427715"/>
+                    </a:lnTo>
+                    <a:lnTo>
+                      <a:pt x="1290956" y="427715"/>
+                    </a:lnTo>
+                    <a:lnTo>
+                      <a:pt x="1290956" y="649609"/>
+                    </a:lnTo>
+                    <a:cubicBezTo>
+                      <a:pt x="1290956" y="693907"/>
+                      <a:pt x="1282523" y="732007"/>
+                      <a:pt x="1265657" y="763909"/>
+                    </a:cubicBezTo>
+                    <a:cubicBezTo>
+                      <a:pt x="1248791" y="795812"/>
+                      <a:pt x="1224509" y="820196"/>
+                      <a:pt x="1192810" y="837061"/>
+                    </a:cubicBezTo>
+                    <a:cubicBezTo>
+                      <a:pt x="1161111" y="853927"/>
+                      <a:pt x="1123316" y="862360"/>
+                      <a:pt x="1079424" y="862360"/>
+                    </a:cubicBezTo>
+                    <a:cubicBezTo>
+                      <a:pt x="1035533" y="862360"/>
+                      <a:pt x="997738" y="853927"/>
+                      <a:pt x="966039" y="837061"/>
+                    </a:cubicBezTo>
+                    <a:cubicBezTo>
+                      <a:pt x="934339" y="820196"/>
+                      <a:pt x="910057" y="795812"/>
+                      <a:pt x="893191" y="763909"/>
+                    </a:cubicBezTo>
+                    <a:cubicBezTo>
+                      <a:pt x="876326" y="732007"/>
+                      <a:pt x="867893" y="693907"/>
+                      <a:pt x="867893" y="649609"/>
+                    </a:cubicBezTo>
+                    <a:close/>
+                    <a:moveTo>
+                      <a:pt x="1344143" y="425886"/>
+                    </a:moveTo>
+                    <a:lnTo>
+                      <a:pt x="1595298" y="425886"/>
+                    </a:lnTo>
+                    <a:cubicBezTo>
+                      <a:pt x="1641222" y="425886"/>
+                      <a:pt x="1677086" y="440923"/>
+                      <a:pt x="1702893" y="470997"/>
+                    </a:cubicBezTo>
+                    <a:cubicBezTo>
+                      <a:pt x="1728699" y="501070"/>
+                      <a:pt x="1741602" y="542929"/>
+                      <a:pt x="1741602" y="596574"/>
+                    </a:cubicBezTo>
+                    <a:cubicBezTo>
+                      <a:pt x="1741602" y="649813"/>
+                      <a:pt x="1728699" y="691367"/>
+                      <a:pt x="1702893" y="721237"/>
+                    </a:cubicBezTo>
+                    <a:cubicBezTo>
+                      <a:pt x="1677086" y="751108"/>
+                      <a:pt x="1641222" y="766043"/>
+                      <a:pt x="1595298" y="766043"/>
+                    </a:cubicBezTo>
+                    <a:lnTo>
+                      <a:pt x="1488009" y="766043"/>
+                    </a:lnTo>
+                    <a:lnTo>
+                      <a:pt x="1488009" y="852606"/>
+                    </a:lnTo>
+                    <a:lnTo>
+                      <a:pt x="1344143" y="852606"/>
+                    </a:lnTo>
+                    <a:close/>
+                    <a:moveTo>
+                      <a:pt x="1958874" y="98755"/>
+                    </a:moveTo>
+                    <a:cubicBezTo>
+                      <a:pt x="1943024" y="98755"/>
+                      <a:pt x="1930603" y="104242"/>
+                      <a:pt x="1921612" y="115214"/>
+                    </a:cubicBezTo>
+                    <a:cubicBezTo>
+                      <a:pt x="1912620" y="126187"/>
+                      <a:pt x="1908124" y="141427"/>
+                      <a:pt x="1908124" y="160934"/>
+                    </a:cubicBezTo>
+                    <a:lnTo>
+                      <a:pt x="1908124" y="195682"/>
+                    </a:lnTo>
+                    <a:lnTo>
+                      <a:pt x="2009623" y="195682"/>
+                    </a:lnTo>
+                    <a:lnTo>
+                      <a:pt x="2009623" y="160934"/>
+                    </a:lnTo>
+                    <a:cubicBezTo>
+                      <a:pt x="2009623" y="141427"/>
+                      <a:pt x="2005127" y="126187"/>
+                      <a:pt x="1996135" y="115214"/>
+                    </a:cubicBezTo>
+                    <a:cubicBezTo>
+                      <a:pt x="1987144" y="104242"/>
+                      <a:pt x="1974723" y="98755"/>
+                      <a:pt x="1958874" y="98755"/>
+                    </a:cubicBezTo>
+                    <a:close/>
+                    <a:moveTo>
+                      <a:pt x="2152650" y="7315"/>
+                    </a:moveTo>
+                    <a:lnTo>
+                      <a:pt x="2260549" y="7315"/>
+                    </a:lnTo>
+                    <a:lnTo>
+                      <a:pt x="2315413" y="129845"/>
+                    </a:lnTo>
+                    <a:lnTo>
+                      <a:pt x="2370277" y="7315"/>
+                    </a:lnTo>
+                    <a:lnTo>
+                      <a:pt x="2478177" y="7315"/>
+                    </a:lnTo>
+                    <a:lnTo>
+                      <a:pt x="2369363" y="213512"/>
+                    </a:lnTo>
+                    <a:lnTo>
+                      <a:pt x="2369363" y="327355"/>
+                    </a:lnTo>
+                    <a:lnTo>
+                      <a:pt x="2261464" y="327355"/>
+                    </a:lnTo>
+                    <a:lnTo>
+                      <a:pt x="2261464" y="213512"/>
+                    </a:lnTo>
+                    <a:close/>
+                    <a:moveTo>
+                      <a:pt x="1304925" y="7315"/>
+                    </a:moveTo>
+                    <a:lnTo>
+                      <a:pt x="1412824" y="7315"/>
+                    </a:lnTo>
+                    <a:lnTo>
+                      <a:pt x="1413281" y="190652"/>
+                    </a:lnTo>
+                    <a:cubicBezTo>
+                      <a:pt x="1413281" y="204673"/>
+                      <a:pt x="1416177" y="215722"/>
+                      <a:pt x="1421968" y="223799"/>
+                    </a:cubicBezTo>
+                    <a:cubicBezTo>
+                      <a:pt x="1427759" y="231877"/>
+                      <a:pt x="1435837" y="235915"/>
+                      <a:pt x="1446200" y="235915"/>
+                    </a:cubicBezTo>
+                    <a:cubicBezTo>
+                      <a:pt x="1456563" y="235915"/>
+                      <a:pt x="1464716" y="231953"/>
+                      <a:pt x="1470660" y="224028"/>
+                    </a:cubicBezTo>
+                    <a:cubicBezTo>
+                      <a:pt x="1476604" y="216103"/>
+                      <a:pt x="1479576" y="204978"/>
+                      <a:pt x="1479576" y="190652"/>
+                    </a:cubicBezTo>
+                    <a:lnTo>
+                      <a:pt x="1479576" y="7315"/>
+                    </a:lnTo>
+                    <a:lnTo>
+                      <a:pt x="1587018" y="7315"/>
+                    </a:lnTo>
+                    <a:lnTo>
+                      <a:pt x="1587018" y="190652"/>
+                    </a:lnTo>
+                    <a:cubicBezTo>
+                      <a:pt x="1587018" y="204978"/>
+                      <a:pt x="1589989" y="216103"/>
+                      <a:pt x="1595933" y="224028"/>
+                    </a:cubicBezTo>
+                    <a:cubicBezTo>
+                      <a:pt x="1601877" y="231953"/>
+                      <a:pt x="1610182" y="235915"/>
+                      <a:pt x="1620850" y="235915"/>
+                    </a:cubicBezTo>
+                    <a:cubicBezTo>
+                      <a:pt x="1631518" y="235915"/>
+                      <a:pt x="1639824" y="231953"/>
+                      <a:pt x="1645768" y="224028"/>
+                    </a:cubicBezTo>
+                    <a:cubicBezTo>
+                      <a:pt x="1651711" y="216103"/>
+                      <a:pt x="1654683" y="204978"/>
+                      <a:pt x="1654683" y="190652"/>
+                    </a:cubicBezTo>
+                    <a:lnTo>
+                      <a:pt x="1654683" y="7315"/>
+                    </a:lnTo>
+                    <a:lnTo>
+                      <a:pt x="1762125" y="7315"/>
+                    </a:lnTo>
+                    <a:lnTo>
+                      <a:pt x="1762125" y="173279"/>
+                    </a:lnTo>
+                    <a:cubicBezTo>
+                      <a:pt x="1762125" y="206807"/>
+                      <a:pt x="1756486" y="235687"/>
+                      <a:pt x="1745209" y="259918"/>
+                    </a:cubicBezTo>
+                    <a:cubicBezTo>
+                      <a:pt x="1733931" y="284150"/>
+                      <a:pt x="1717701" y="302666"/>
+                      <a:pt x="1696517" y="315468"/>
+                    </a:cubicBezTo>
+                    <a:cubicBezTo>
+                      <a:pt x="1675333" y="328270"/>
+                      <a:pt x="1650111" y="334670"/>
+                      <a:pt x="1620850" y="334670"/>
+                    </a:cubicBezTo>
+                    <a:cubicBezTo>
+                      <a:pt x="1599514" y="334670"/>
+                      <a:pt x="1581074" y="329413"/>
+                      <a:pt x="1565529" y="318897"/>
+                    </a:cubicBezTo>
+                    <a:cubicBezTo>
+                      <a:pt x="1549984" y="308381"/>
+                      <a:pt x="1539316" y="295961"/>
+                      <a:pt x="1533525" y="281635"/>
+                    </a:cubicBezTo>
+                    <a:cubicBezTo>
+                      <a:pt x="1528039" y="295961"/>
+                      <a:pt x="1517523" y="308381"/>
+                      <a:pt x="1501978" y="318897"/>
+                    </a:cubicBezTo>
+                    <a:cubicBezTo>
+                      <a:pt x="1486434" y="329413"/>
+                      <a:pt x="1467841" y="334670"/>
+                      <a:pt x="1446200" y="334670"/>
+                    </a:cubicBezTo>
+                    <a:cubicBezTo>
+                      <a:pt x="1416939" y="334670"/>
+                      <a:pt x="1391717" y="328270"/>
+                      <a:pt x="1370533" y="315468"/>
+                    </a:cubicBezTo>
+                    <a:cubicBezTo>
+                      <a:pt x="1349350" y="302666"/>
+                      <a:pt x="1333119" y="284150"/>
+                      <a:pt x="1321841" y="259918"/>
+                    </a:cubicBezTo>
+                    <a:cubicBezTo>
+                      <a:pt x="1310564" y="235687"/>
+                      <a:pt x="1304925" y="206807"/>
+                      <a:pt x="1304925" y="173279"/>
+                    </a:cubicBezTo>
+                    <a:close/>
+                    <a:moveTo>
+                      <a:pt x="704850" y="7315"/>
+                    </a:moveTo>
+                    <a:lnTo>
+                      <a:pt x="812749" y="7315"/>
+                    </a:lnTo>
+                    <a:lnTo>
+                      <a:pt x="812749" y="327355"/>
+                    </a:lnTo>
+                    <a:lnTo>
+                      <a:pt x="704850" y="327355"/>
+                    </a:lnTo>
+                    <a:close/>
+                    <a:moveTo>
+                      <a:pt x="352425" y="7315"/>
+                    </a:moveTo>
+                    <a:lnTo>
+                      <a:pt x="460324" y="7315"/>
+                    </a:lnTo>
+                    <a:lnTo>
+                      <a:pt x="460324" y="127102"/>
+                    </a:lnTo>
+                    <a:lnTo>
+                      <a:pt x="558622" y="127102"/>
+                    </a:lnTo>
+                    <a:lnTo>
+                      <a:pt x="558622" y="7315"/>
+                    </a:lnTo>
+                    <a:lnTo>
+                      <a:pt x="666522" y="7315"/>
+                    </a:lnTo>
+                    <a:lnTo>
+                      <a:pt x="666522" y="327355"/>
+                    </a:lnTo>
+                    <a:lnTo>
+                      <a:pt x="558622" y="327355"/>
+                    </a:lnTo>
+                    <a:lnTo>
+                      <a:pt x="558622" y="207569"/>
+                    </a:lnTo>
+                    <a:lnTo>
+                      <a:pt x="460324" y="207569"/>
+                    </a:lnTo>
+                    <a:lnTo>
+                      <a:pt x="460324" y="327355"/>
+                    </a:lnTo>
+                    <a:lnTo>
+                      <a:pt x="352425" y="327355"/>
+                    </a:lnTo>
+                    <a:close/>
+                    <a:moveTo>
+                      <a:pt x="0" y="7315"/>
+                    </a:moveTo>
+                    <a:lnTo>
+                      <a:pt x="314096" y="7315"/>
+                    </a:lnTo>
+                    <a:lnTo>
+                      <a:pt x="314096" y="87782"/>
+                    </a:lnTo>
+                    <a:lnTo>
+                      <a:pt x="211227" y="87782"/>
+                    </a:lnTo>
+                    <a:lnTo>
+                      <a:pt x="211227" y="327355"/>
+                    </a:lnTo>
+                    <a:lnTo>
+                      <a:pt x="103327" y="327355"/>
+                    </a:lnTo>
+                    <a:lnTo>
+                      <a:pt x="103327" y="87782"/>
+                    </a:lnTo>
+                    <a:lnTo>
+                      <a:pt x="0" y="87782"/>
+                    </a:lnTo>
+                    <a:close/>
+                    <a:moveTo>
+                      <a:pt x="1958874" y="1372"/>
+                    </a:moveTo>
+                    <a:cubicBezTo>
+                      <a:pt x="1991792" y="1372"/>
+                      <a:pt x="2020138" y="7696"/>
+                      <a:pt x="2043913" y="20345"/>
+                    </a:cubicBezTo>
+                    <a:cubicBezTo>
+                      <a:pt x="2067687" y="32995"/>
+                      <a:pt x="2085899" y="51283"/>
+                      <a:pt x="2098548" y="75209"/>
+                    </a:cubicBezTo>
+                    <a:cubicBezTo>
+                      <a:pt x="2111197" y="99136"/>
+                      <a:pt x="2117522" y="127711"/>
+                      <a:pt x="2117522" y="160934"/>
+                    </a:cubicBezTo>
+                    <a:lnTo>
+                      <a:pt x="2117522" y="327355"/>
+                    </a:lnTo>
+                    <a:lnTo>
+                      <a:pt x="2009623" y="327355"/>
+                    </a:lnTo>
+                    <a:lnTo>
+                      <a:pt x="2009623" y="276149"/>
+                    </a:lnTo>
+                    <a:lnTo>
+                      <a:pt x="1908124" y="276149"/>
+                    </a:lnTo>
+                    <a:lnTo>
+                      <a:pt x="1908124" y="327355"/>
+                    </a:lnTo>
+                    <a:lnTo>
+                      <a:pt x="1800225" y="327355"/>
+                    </a:lnTo>
+                    <a:lnTo>
+                      <a:pt x="1800225" y="160934"/>
+                    </a:lnTo>
+                    <a:cubicBezTo>
+                      <a:pt x="1800225" y="127711"/>
+                      <a:pt x="1806550" y="99136"/>
+                      <a:pt x="1819199" y="75209"/>
+                    </a:cubicBezTo>
+                    <a:cubicBezTo>
+                      <a:pt x="1831848" y="51283"/>
+                      <a:pt x="1850060" y="32995"/>
+                      <a:pt x="1873834" y="20345"/>
+                    </a:cubicBezTo>
+                    <a:cubicBezTo>
+                      <a:pt x="1897609" y="7696"/>
+                      <a:pt x="1925955" y="1372"/>
+                      <a:pt x="1958874" y="1372"/>
+                    </a:cubicBezTo>
+                    <a:close/>
+                    <a:moveTo>
+                      <a:pt x="1000887" y="0"/>
+                    </a:moveTo>
+                    <a:cubicBezTo>
+                      <a:pt x="1049655" y="0"/>
+                      <a:pt x="1087679" y="10973"/>
+                      <a:pt x="1114959" y="32918"/>
+                    </a:cubicBezTo>
+                    <a:cubicBezTo>
+                      <a:pt x="1142238" y="54864"/>
+                      <a:pt x="1155878" y="85496"/>
+                      <a:pt x="1155878" y="124816"/>
+                    </a:cubicBezTo>
+                    <a:lnTo>
+                      <a:pt x="1047979" y="124816"/>
+                    </a:lnTo>
+                    <a:cubicBezTo>
+                      <a:pt x="1047979" y="109576"/>
+                      <a:pt x="1043635" y="97612"/>
+                      <a:pt x="1034949" y="88925"/>
+                    </a:cubicBezTo>
+                    <a:cubicBezTo>
+                      <a:pt x="1026262" y="80239"/>
+                      <a:pt x="1014146" y="75895"/>
+                      <a:pt x="998601" y="75895"/>
+                    </a:cubicBezTo>
+                    <a:cubicBezTo>
+                      <a:pt x="981228" y="75895"/>
+                      <a:pt x="968807" y="78410"/>
+                      <a:pt x="961339" y="83439"/>
+                    </a:cubicBezTo>
+                    <a:cubicBezTo>
+                      <a:pt x="953872" y="88468"/>
+                      <a:pt x="950138" y="94945"/>
+                      <a:pt x="950138" y="102870"/>
+                    </a:cubicBezTo>
+                    <a:cubicBezTo>
+                      <a:pt x="950138" y="110490"/>
+                      <a:pt x="953491" y="116434"/>
+                      <a:pt x="960196" y="120701"/>
+                    </a:cubicBezTo>
+                    <a:cubicBezTo>
+                      <a:pt x="966902" y="124968"/>
+                      <a:pt x="975360" y="128092"/>
+                      <a:pt x="985571" y="130073"/>
+                    </a:cubicBezTo>
+                    <a:cubicBezTo>
+                      <a:pt x="995782" y="132055"/>
+                      <a:pt x="1009879" y="133960"/>
+                      <a:pt x="1027862" y="135788"/>
+                    </a:cubicBezTo>
+                    <a:cubicBezTo>
+                      <a:pt x="1055294" y="138836"/>
+                      <a:pt x="1077697" y="142494"/>
+                      <a:pt x="1095070" y="146761"/>
+                    </a:cubicBezTo>
+                    <a:cubicBezTo>
+                      <a:pt x="1112444" y="151028"/>
+                      <a:pt x="1127455" y="158877"/>
+                      <a:pt x="1140105" y="170307"/>
+                    </a:cubicBezTo>
+                    <a:cubicBezTo>
+                      <a:pt x="1152754" y="181737"/>
+                      <a:pt x="1159078" y="197968"/>
+                      <a:pt x="1159078" y="218999"/>
+                    </a:cubicBezTo>
+                    <a:cubicBezTo>
+                      <a:pt x="1159078" y="255270"/>
+                      <a:pt x="1145286" y="283616"/>
+                      <a:pt x="1117702" y="304038"/>
+                    </a:cubicBezTo>
+                    <a:cubicBezTo>
+                      <a:pt x="1090117" y="324460"/>
+                      <a:pt x="1051789" y="334670"/>
+                      <a:pt x="1002716" y="334670"/>
+                    </a:cubicBezTo>
+                    <a:cubicBezTo>
+                      <a:pt x="953948" y="334670"/>
+                      <a:pt x="915924" y="324460"/>
+                      <a:pt x="888645" y="304038"/>
+                    </a:cubicBezTo>
+                    <a:cubicBezTo>
+                      <a:pt x="861365" y="283616"/>
+                      <a:pt x="847725" y="255270"/>
+                      <a:pt x="847725" y="218999"/>
+                    </a:cubicBezTo>
+                    <a:lnTo>
+                      <a:pt x="955624" y="218999"/>
+                    </a:lnTo>
+                    <a:cubicBezTo>
+                      <a:pt x="955624" y="231496"/>
+                      <a:pt x="959739" y="241249"/>
+                      <a:pt x="967969" y="248260"/>
+                    </a:cubicBezTo>
+                    <a:cubicBezTo>
+                      <a:pt x="976198" y="255270"/>
+                      <a:pt x="987781" y="258775"/>
+                      <a:pt x="1002716" y="258775"/>
+                    </a:cubicBezTo>
+                    <a:cubicBezTo>
+                      <a:pt x="1017956" y="258775"/>
+                      <a:pt x="1029843" y="256337"/>
+                      <a:pt x="1038378" y="251460"/>
+                    </a:cubicBezTo>
+                    <a:cubicBezTo>
+                      <a:pt x="1046912" y="246583"/>
+                      <a:pt x="1051179" y="239878"/>
+                      <a:pt x="1051179" y="231343"/>
+                    </a:cubicBezTo>
+                    <a:cubicBezTo>
+                      <a:pt x="1051179" y="222809"/>
+                      <a:pt x="1046226" y="217094"/>
+                      <a:pt x="1036320" y="214198"/>
+                    </a:cubicBezTo>
+                    <a:cubicBezTo>
+                      <a:pt x="1026414" y="211303"/>
+                      <a:pt x="1010488" y="208940"/>
+                      <a:pt x="988543" y="207112"/>
+                    </a:cubicBezTo>
+                    <a:cubicBezTo>
+                      <a:pt x="960196" y="204673"/>
+                      <a:pt x="936651" y="201092"/>
+                      <a:pt x="917905" y="196367"/>
+                    </a:cubicBezTo>
+                    <a:cubicBezTo>
+                      <a:pt x="899160" y="191643"/>
+                      <a:pt x="882777" y="181661"/>
+                      <a:pt x="868756" y="166421"/>
+                    </a:cubicBezTo>
+                    <a:cubicBezTo>
+                      <a:pt x="854736" y="151181"/>
+                      <a:pt x="847725" y="128626"/>
+                      <a:pt x="847725" y="98755"/>
+                    </a:cubicBezTo>
+                    <a:cubicBezTo>
+                      <a:pt x="847725" y="67666"/>
+                      <a:pt x="861212" y="43434"/>
+                      <a:pt x="888187" y="26060"/>
+                    </a:cubicBezTo>
+                    <a:cubicBezTo>
+                      <a:pt x="915162" y="8687"/>
+                      <a:pt x="952729" y="0"/>
+                      <a:pt x="1000887" y="0"/>
+                    </a:cubicBezTo>
+                    <a:close/>
+                  </a:path>
+                </a:pathLst>
+              </a:custGeom>
+              <a:grpFill/>
+              <a:ln>
+                <a:noFill/>
+              </a:ln>
+              <a:effectLst/>
+            </p:spPr>
+            <p:txBody>
+              <a:bodyPr rot="0" spcFirstLastPara="0" vertOverflow="overflow" horzOverflow="overflow" vert="horz" wrap="square" lIns="91440" tIns="45720" rIns="91440" bIns="45720" numCol="1" spcCol="0" rtlCol="0" fromWordArt="0" anchor="t" anchorCtr="0" forceAA="0" compatLnSpc="1">
+                <a:prstTxWarp prst="textNoShape">
+                  <a:avLst/>
+                </a:prstTxWarp>
+                <a:noAutofit/>
+              </a:bodyPr>
+              <a:lstStyle/>
+              <a:p>
+                <a:pPr algn="ctr"/>
+                <a:endParaRPr lang="en-ZA" sz="3600" dirty="0">
+                  <a:solidFill>
+                    <a:schemeClr val="bg1"/>
+                  </a:solidFill>
+                  <a:latin typeface="Nura Black" pitchFamily="2" charset="0"/>
+                </a:endParaRPr>
+              </a:p>
+            </p:txBody>
+          </p:sp>
+        </p:grpSp>
+      </p:grpSp>
+    </p:spTree>
+    <p:extLst>
+      <p:ext uri="{BB962C8B-B14F-4D97-AF65-F5344CB8AC3E}">
+        <p14:creationId xmlns:p14="http://schemas.microsoft.com/office/powerpoint/2010/main" val="1006983113"/>
+      </p:ext>
+    </p:extLst>
+  </p:cSld>
+  <p:clrMapOvr>
+    <a:masterClrMapping/>
+  </p:clrMapOvr>
+</p:sld>
+</file>
+
 <file path=ppt/theme/theme1.xml><?xml version="1.0" encoding="utf-8"?>
 <a:theme xmlns:a="http://schemas.openxmlformats.org/drawingml/2006/main" name="NotAnnoying">
   <a:themeElements>

</xml_diff>